<commit_message>
In the process of finishing the second draft
</commit_message>
<xml_diff>
--- a/src/parallel_streams_presentation/p_stream_presentation.pptx
+++ b/src/parallel_streams_presentation/p_stream_presentation.pptx
@@ -7,6 +7,8 @@
   <p:sldIdLst>
     <p:sldId id="256" r:id="rId2"/>
     <p:sldId id="257" r:id="rId3"/>
+    <p:sldId id="258" r:id="rId4"/>
+    <p:sldId id="259" r:id="rId5"/>
   </p:sldIdLst>
   <p:sldSz cx="12192000" cy="6858000"/>
   <p:notesSz cx="6858000" cy="9144000"/>
@@ -105,6 +107,11 @@
       </a:defRPr>
     </a:lvl9pPr>
   </p:defaultTextStyle>
+  <p:extLst>
+    <p:ext uri="{EFAFB233-063F-42B5-8137-9DF3F51BA10A}">
+      <p15:sldGuideLst xmlns:p15="http://schemas.microsoft.com/office/powerpoint/2012/main"/>
+    </p:ext>
+  </p:extLst>
 </p:presentation>
 </file>
 
@@ -278,7 +285,7 @@
           <a:p>
             <a:fld id="{48A87A34-81AB-432B-8DAE-1953F412C126}" type="datetimeFigureOut">
               <a:rPr lang="en-US" smtClean="0"/>
-              <a:t>2/20/18</a:t>
+              <a:t>2/22/18</a:t>
             </a:fld>
             <a:endParaRPr lang="en-US" dirty="0"/>
           </a:p>
@@ -545,7 +552,7 @@
           <a:p>
             <a:fld id="{48A87A34-81AB-432B-8DAE-1953F412C126}" type="datetimeFigureOut">
               <a:rPr lang="en-US" smtClean="0"/>
-              <a:t>2/20/18</a:t>
+              <a:t>2/22/18</a:t>
             </a:fld>
             <a:endParaRPr lang="en-US" dirty="0"/>
           </a:p>
@@ -777,7 +784,7 @@
             <a:fld id="{48A87A34-81AB-432B-8DAE-1953F412C126}" type="datetimeFigureOut">
               <a:rPr lang="en-US" smtClean="0"/>
               <a:pPr/>
-              <a:t>2/20/18</a:t>
+              <a:t>2/22/18</a:t>
             </a:fld>
             <a:endParaRPr lang="en-US" dirty="0"/>
           </a:p>
@@ -1088,7 +1095,7 @@
             <a:fld id="{48A87A34-81AB-432B-8DAE-1953F412C126}" type="datetimeFigureOut">
               <a:rPr lang="en-US" smtClean="0"/>
               <a:pPr/>
-              <a:t>2/20/18</a:t>
+              <a:t>2/22/18</a:t>
             </a:fld>
             <a:endParaRPr lang="en-US" dirty="0"/>
           </a:p>
@@ -1562,7 +1569,7 @@
             <a:fld id="{48A87A34-81AB-432B-8DAE-1953F412C126}" type="datetimeFigureOut">
               <a:rPr lang="en-US" smtClean="0"/>
               <a:pPr/>
-              <a:t>2/20/18</a:t>
+              <a:t>2/22/18</a:t>
             </a:fld>
             <a:endParaRPr lang="en-US" dirty="0"/>
           </a:p>
@@ -2109,7 +2116,7 @@
           <a:p>
             <a:fld id="{48A87A34-81AB-432B-8DAE-1953F412C126}" type="datetimeFigureOut">
               <a:rPr lang="en-US" smtClean="0"/>
-              <a:t>2/20/18</a:t>
+              <a:t>2/22/18</a:t>
             </a:fld>
             <a:endParaRPr lang="en-US" dirty="0"/>
           </a:p>
@@ -2883,7 +2890,7 @@
           <a:p>
             <a:fld id="{48A87A34-81AB-432B-8DAE-1953F412C126}" type="datetimeFigureOut">
               <a:rPr lang="en-US" smtClean="0"/>
-              <a:t>2/20/18</a:t>
+              <a:t>2/22/18</a:t>
             </a:fld>
             <a:endParaRPr lang="en-US" dirty="0"/>
           </a:p>
@@ -3058,7 +3065,7 @@
           <a:p>
             <a:fld id="{48A87A34-81AB-432B-8DAE-1953F412C126}" type="datetimeFigureOut">
               <a:rPr lang="en-US" smtClean="0"/>
-              <a:t>2/20/18</a:t>
+              <a:t>2/22/18</a:t>
             </a:fld>
             <a:endParaRPr lang="en-US" dirty="0"/>
           </a:p>
@@ -3282,7 +3289,7 @@
             <a:fld id="{48A87A34-81AB-432B-8DAE-1953F412C126}" type="datetimeFigureOut">
               <a:rPr lang="en-US" smtClean="0"/>
               <a:pPr/>
-              <a:t>2/20/18</a:t>
+              <a:t>2/22/18</a:t>
             </a:fld>
             <a:endParaRPr lang="en-US" dirty="0"/>
           </a:p>
@@ -3462,7 +3469,7 @@
           <a:p>
             <a:fld id="{48A87A34-81AB-432B-8DAE-1953F412C126}" type="datetimeFigureOut">
               <a:rPr lang="en-US" smtClean="0"/>
-              <a:t>2/20/18</a:t>
+              <a:t>2/22/18</a:t>
             </a:fld>
             <a:endParaRPr lang="en-US" dirty="0"/>
           </a:p>
@@ -3752,7 +3759,7 @@
             <a:fld id="{48A87A34-81AB-432B-8DAE-1953F412C126}" type="datetimeFigureOut">
               <a:rPr lang="en-US" smtClean="0"/>
               <a:pPr/>
-              <a:t>2/20/18</a:t>
+              <a:t>2/22/18</a:t>
             </a:fld>
             <a:endParaRPr lang="en-US" dirty="0"/>
           </a:p>
@@ -3994,7 +4001,7 @@
           <a:p>
             <a:fld id="{48A87A34-81AB-432B-8DAE-1953F412C126}" type="datetimeFigureOut">
               <a:rPr lang="en-US" smtClean="0"/>
-              <a:t>2/20/18</a:t>
+              <a:t>2/22/18</a:t>
             </a:fld>
             <a:endParaRPr lang="en-US" dirty="0"/>
           </a:p>
@@ -4373,7 +4380,7 @@
           <a:p>
             <a:fld id="{48A87A34-81AB-432B-8DAE-1953F412C126}" type="datetimeFigureOut">
               <a:rPr lang="en-US" smtClean="0"/>
-              <a:t>2/20/18</a:t>
+              <a:t>2/22/18</a:t>
             </a:fld>
             <a:endParaRPr lang="en-US" dirty="0"/>
           </a:p>
@@ -4491,7 +4498,7 @@
           <a:p>
             <a:fld id="{48A87A34-81AB-432B-8DAE-1953F412C126}" type="datetimeFigureOut">
               <a:rPr lang="en-US" smtClean="0"/>
-              <a:t>2/20/18</a:t>
+              <a:t>2/22/18</a:t>
             </a:fld>
             <a:endParaRPr lang="en-US" dirty="0"/>
           </a:p>
@@ -4586,7 +4593,7 @@
           <a:p>
             <a:fld id="{48A87A34-81AB-432B-8DAE-1953F412C126}" type="datetimeFigureOut">
               <a:rPr lang="en-US" smtClean="0"/>
-              <a:t>2/20/18</a:t>
+              <a:t>2/22/18</a:t>
             </a:fld>
             <a:endParaRPr lang="en-US" dirty="0"/>
           </a:p>
@@ -4835,7 +4842,7 @@
           <a:p>
             <a:fld id="{48A87A34-81AB-432B-8DAE-1953F412C126}" type="datetimeFigureOut">
               <a:rPr lang="en-US" smtClean="0"/>
-              <a:t>2/20/18</a:t>
+              <a:t>2/22/18</a:t>
             </a:fld>
             <a:endParaRPr lang="en-US" dirty="0"/>
           </a:p>
@@ -5092,7 +5099,7 @@
           <a:p>
             <a:fld id="{48A87A34-81AB-432B-8DAE-1953F412C126}" type="datetimeFigureOut">
               <a:rPr lang="en-US" smtClean="0"/>
-              <a:t>2/20/18</a:t>
+              <a:t>2/22/18</a:t>
             </a:fld>
             <a:endParaRPr lang="en-US" dirty="0"/>
           </a:p>
@@ -5336,7 +5343,7 @@
             <a:fld id="{48A87A34-81AB-432B-8DAE-1953F412C126}" type="datetimeFigureOut">
               <a:rPr lang="en-US" smtClean="0"/>
               <a:pPr/>
-              <a:t>2/20/18</a:t>
+              <a:t>2/22/18</a:t>
             </a:fld>
             <a:endParaRPr lang="en-US" dirty="0"/>
           </a:p>
@@ -6019,18 +6026,21 @@
               <a:t>Traverses via </a:t>
             </a:r>
             <a:r>
-              <a:rPr lang="en-US" sz="1600"/>
-              <a:t>tryAdvance </a:t>
+              <a:rPr lang="en-US" sz="1600" dirty="0" err="1"/>
+              <a:t>tryAdvance</a:t>
             </a:r>
             <a:r>
               <a:rPr lang="en-US" sz="1600" dirty="0"/>
-              <a:t>or </a:t>
+              <a:t>() or </a:t>
             </a:r>
             <a:r>
               <a:rPr lang="en-US" sz="1600" dirty="0" err="1"/>
               <a:t>forEachRemaining</a:t>
             </a:r>
-            <a:endParaRPr lang="en-US" sz="1600" dirty="0"/>
+            <a:r>
+              <a:rPr lang="en-US" sz="1600" dirty="0"/>
+              <a:t>()</a:t>
+            </a:r>
           </a:p>
           <a:p>
             <a:r>
@@ -6085,6 +6095,169 @@
     <p:extLst>
       <p:ext uri="{BB962C8B-B14F-4D97-AF65-F5344CB8AC3E}">
         <p14:creationId xmlns:p14="http://schemas.microsoft.com/office/powerpoint/2010/main" val="4009905473"/>
+      </p:ext>
+    </p:extLst>
+  </p:cSld>
+  <p:clrMapOvr>
+    <a:masterClrMapping/>
+  </p:clrMapOvr>
+</p:sld>
+</file>
+
+<file path=ppt/slides/slide3.xml><?xml version="1.0" encoding="utf-8"?>
+<p:sld xmlns:a="http://schemas.openxmlformats.org/drawingml/2006/main" xmlns:r="http://schemas.openxmlformats.org/officeDocument/2006/relationships" xmlns:p="http://schemas.openxmlformats.org/presentationml/2006/main">
+  <p:cSld>
+    <p:spTree>
+      <p:nvGrpSpPr>
+        <p:cNvPr id="1" name=""/>
+        <p:cNvGrpSpPr/>
+        <p:nvPr/>
+      </p:nvGrpSpPr>
+      <p:grpSpPr>
+        <a:xfrm>
+          <a:off x="0" y="0"/>
+          <a:ext cx="0" cy="0"/>
+          <a:chOff x="0" y="0"/>
+          <a:chExt cx="0" cy="0"/>
+        </a:xfrm>
+      </p:grpSpPr>
+      <p:sp>
+        <p:nvSpPr>
+          <p:cNvPr id="2" name="Title 1">
+            <a:extLst>
+              <a:ext uri="{FF2B5EF4-FFF2-40B4-BE49-F238E27FC236}">
+                <a16:creationId xmlns:a16="http://schemas.microsoft.com/office/drawing/2014/main" id="{FC64A151-C42E-214C-A35F-51C0FC4F325E}"/>
+              </a:ext>
+            </a:extLst>
+          </p:cNvPr>
+          <p:cNvSpPr>
+            <a:spLocks noGrp="1"/>
+          </p:cNvSpPr>
+          <p:nvPr>
+            <p:ph type="title"/>
+          </p:nvPr>
+        </p:nvSpPr>
+        <p:spPr/>
+        <p:txBody>
+          <a:bodyPr/>
+          <a:lstStyle/>
+          <a:p>
+            <a:r>
+              <a:rPr lang="en-US" dirty="0"/>
+              <a:t>Collector</a:t>
+            </a:r>
+          </a:p>
+        </p:txBody>
+      </p:sp>
+      <p:sp>
+        <p:nvSpPr>
+          <p:cNvPr id="3" name="Content Placeholder 2">
+            <a:extLst>
+              <a:ext uri="{FF2B5EF4-FFF2-40B4-BE49-F238E27FC236}">
+                <a16:creationId xmlns:a16="http://schemas.microsoft.com/office/drawing/2014/main" id="{AF2376AD-6C79-734B-BD98-11F5BFE14E8D}"/>
+              </a:ext>
+            </a:extLst>
+          </p:cNvPr>
+          <p:cNvSpPr>
+            <a:spLocks noGrp="1"/>
+          </p:cNvSpPr>
+          <p:nvPr>
+            <p:ph idx="1"/>
+          </p:nvPr>
+        </p:nvSpPr>
+        <p:spPr/>
+        <p:txBody>
+          <a:bodyPr/>
+          <a:lstStyle/>
+          <a:p>
+            <a:endParaRPr lang="en-US" dirty="0"/>
+          </a:p>
+        </p:txBody>
+      </p:sp>
+    </p:spTree>
+    <p:extLst>
+      <p:ext uri="{BB962C8B-B14F-4D97-AF65-F5344CB8AC3E}">
+        <p14:creationId xmlns:p14="http://schemas.microsoft.com/office/powerpoint/2010/main" val="3207144312"/>
+      </p:ext>
+    </p:extLst>
+  </p:cSld>
+  <p:clrMapOvr>
+    <a:masterClrMapping/>
+  </p:clrMapOvr>
+</p:sld>
+</file>
+
+<file path=ppt/slides/slide4.xml><?xml version="1.0" encoding="utf-8"?>
+<p:sld xmlns:a="http://schemas.openxmlformats.org/drawingml/2006/main" xmlns:r="http://schemas.openxmlformats.org/officeDocument/2006/relationships" xmlns:p="http://schemas.openxmlformats.org/presentationml/2006/main">
+  <p:cSld>
+    <p:spTree>
+      <p:nvGrpSpPr>
+        <p:cNvPr id="1" name=""/>
+        <p:cNvGrpSpPr/>
+        <p:nvPr/>
+      </p:nvGrpSpPr>
+      <p:grpSpPr>
+        <a:xfrm>
+          <a:off x="0" y="0"/>
+          <a:ext cx="0" cy="0"/>
+          <a:chOff x="0" y="0"/>
+          <a:chExt cx="0" cy="0"/>
+        </a:xfrm>
+      </p:grpSpPr>
+      <p:sp>
+        <p:nvSpPr>
+          <p:cNvPr id="2" name="Title 1">
+            <a:extLst>
+              <a:ext uri="{FF2B5EF4-FFF2-40B4-BE49-F238E27FC236}">
+                <a16:creationId xmlns:a16="http://schemas.microsoft.com/office/drawing/2014/main" id="{F0B8AD07-3716-7448-AF3A-D5698F7B6FC3}"/>
+              </a:ext>
+            </a:extLst>
+          </p:cNvPr>
+          <p:cNvSpPr>
+            <a:spLocks noGrp="1"/>
+          </p:cNvSpPr>
+          <p:nvPr>
+            <p:ph type="title"/>
+          </p:nvPr>
+        </p:nvSpPr>
+        <p:spPr/>
+        <p:txBody>
+          <a:bodyPr/>
+          <a:lstStyle/>
+          <a:p>
+            <a:endParaRPr lang="en-US"/>
+          </a:p>
+        </p:txBody>
+      </p:sp>
+      <p:sp>
+        <p:nvSpPr>
+          <p:cNvPr id="3" name="Content Placeholder 2">
+            <a:extLst>
+              <a:ext uri="{FF2B5EF4-FFF2-40B4-BE49-F238E27FC236}">
+                <a16:creationId xmlns:a16="http://schemas.microsoft.com/office/drawing/2014/main" id="{63707592-2BBC-A241-8CD5-A6FA25C0B03B}"/>
+              </a:ext>
+            </a:extLst>
+          </p:cNvPr>
+          <p:cNvSpPr>
+            <a:spLocks noGrp="1"/>
+          </p:cNvSpPr>
+          <p:nvPr>
+            <p:ph idx="1"/>
+          </p:nvPr>
+        </p:nvSpPr>
+        <p:spPr/>
+        <p:txBody>
+          <a:bodyPr/>
+          <a:lstStyle/>
+          <a:p>
+            <a:endParaRPr lang="en-US"/>
+          </a:p>
+        </p:txBody>
+      </p:sp>
+    </p:spTree>
+    <p:extLst>
+      <p:ext uri="{BB962C8B-B14F-4D97-AF65-F5344CB8AC3E}">
+        <p14:creationId xmlns:p14="http://schemas.microsoft.com/office/powerpoint/2010/main" val="1285649568"/>
       </p:ext>
     </p:extLst>
   </p:cSld>

</xml_diff>

<commit_message>
Revised paper a bit and almost done with the powerpoint
</commit_message>
<xml_diff>
--- a/src/parallel_streams_presentation/p_stream_presentation.pptx
+++ b/src/parallel_streams_presentation/p_stream_presentation.pptx
@@ -4,11 +4,21 @@
   <p:sldMasterIdLst>
     <p:sldMasterId id="2147483687" r:id="rId1"/>
   </p:sldMasterIdLst>
+  <p:notesMasterIdLst>
+    <p:notesMasterId r:id="rId13"/>
+  </p:notesMasterIdLst>
   <p:sldIdLst>
     <p:sldId id="256" r:id="rId2"/>
-    <p:sldId id="257" r:id="rId3"/>
-    <p:sldId id="258" r:id="rId4"/>
-    <p:sldId id="259" r:id="rId5"/>
+    <p:sldId id="264" r:id="rId3"/>
+    <p:sldId id="260" r:id="rId4"/>
+    <p:sldId id="257" r:id="rId5"/>
+    <p:sldId id="261" r:id="rId6"/>
+    <p:sldId id="258" r:id="rId7"/>
+    <p:sldId id="265" r:id="rId8"/>
+    <p:sldId id="259" r:id="rId9"/>
+    <p:sldId id="262" r:id="rId10"/>
+    <p:sldId id="263" r:id="rId11"/>
+    <p:sldId id="266" r:id="rId12"/>
   </p:sldIdLst>
   <p:sldSz cx="12192000" cy="6858000"/>
   <p:notesSz cx="6858000" cy="9144000"/>
@@ -115,6 +125,732 @@
 </p:presentation>
 </file>
 
+<file path=ppt/notesMasters/notesMaster1.xml><?xml version="1.0" encoding="utf-8"?>
+<p:notesMaster xmlns:a="http://schemas.openxmlformats.org/drawingml/2006/main" xmlns:r="http://schemas.openxmlformats.org/officeDocument/2006/relationships" xmlns:p="http://schemas.openxmlformats.org/presentationml/2006/main">
+  <p:cSld>
+    <p:bg>
+      <p:bgRef idx="1001">
+        <a:schemeClr val="bg1"/>
+      </p:bgRef>
+    </p:bg>
+    <p:spTree>
+      <p:nvGrpSpPr>
+        <p:cNvPr id="1" name=""/>
+        <p:cNvGrpSpPr/>
+        <p:nvPr/>
+      </p:nvGrpSpPr>
+      <p:grpSpPr>
+        <a:xfrm>
+          <a:off x="0" y="0"/>
+          <a:ext cx="0" cy="0"/>
+          <a:chOff x="0" y="0"/>
+          <a:chExt cx="0" cy="0"/>
+        </a:xfrm>
+      </p:grpSpPr>
+      <p:sp>
+        <p:nvSpPr>
+          <p:cNvPr id="2" name="Header Placeholder 1"/>
+          <p:cNvSpPr>
+            <a:spLocks noGrp="1"/>
+          </p:cNvSpPr>
+          <p:nvPr>
+            <p:ph type="hdr" sz="quarter"/>
+          </p:nvPr>
+        </p:nvSpPr>
+        <p:spPr>
+          <a:xfrm>
+            <a:off x="0" y="0"/>
+            <a:ext cx="2971800" cy="458788"/>
+          </a:xfrm>
+          <a:prstGeom prst="rect">
+            <a:avLst/>
+          </a:prstGeom>
+        </p:spPr>
+        <p:txBody>
+          <a:bodyPr vert="horz" lIns="91440" tIns="45720" rIns="91440" bIns="45720" rtlCol="0"/>
+          <a:lstStyle>
+            <a:lvl1pPr algn="l">
+              <a:defRPr sz="1200"/>
+            </a:lvl1pPr>
+          </a:lstStyle>
+          <a:p>
+            <a:endParaRPr lang="en-US"/>
+          </a:p>
+        </p:txBody>
+      </p:sp>
+      <p:sp>
+        <p:nvSpPr>
+          <p:cNvPr id="3" name="Date Placeholder 2"/>
+          <p:cNvSpPr>
+            <a:spLocks noGrp="1"/>
+          </p:cNvSpPr>
+          <p:nvPr>
+            <p:ph type="dt" idx="1"/>
+          </p:nvPr>
+        </p:nvSpPr>
+        <p:spPr>
+          <a:xfrm>
+            <a:off x="3884613" y="0"/>
+            <a:ext cx="2971800" cy="458788"/>
+          </a:xfrm>
+          <a:prstGeom prst="rect">
+            <a:avLst/>
+          </a:prstGeom>
+        </p:spPr>
+        <p:txBody>
+          <a:bodyPr vert="horz" lIns="91440" tIns="45720" rIns="91440" bIns="45720" rtlCol="0"/>
+          <a:lstStyle>
+            <a:lvl1pPr algn="r">
+              <a:defRPr sz="1200"/>
+            </a:lvl1pPr>
+          </a:lstStyle>
+          <a:p>
+            <a:fld id="{246D8781-F40A-1048-8D07-8A9EBDE2FB53}" type="datetimeFigureOut">
+              <a:rPr lang="en-US" smtClean="0"/>
+              <a:t>2/27/18</a:t>
+            </a:fld>
+            <a:endParaRPr lang="en-US"/>
+          </a:p>
+        </p:txBody>
+      </p:sp>
+      <p:sp>
+        <p:nvSpPr>
+          <p:cNvPr id="4" name="Slide Image Placeholder 3"/>
+          <p:cNvSpPr>
+            <a:spLocks noGrp="1" noRot="1" noChangeAspect="1"/>
+          </p:cNvSpPr>
+          <p:nvPr>
+            <p:ph type="sldImg" idx="2"/>
+          </p:nvPr>
+        </p:nvSpPr>
+        <p:spPr>
+          <a:xfrm>
+            <a:off x="685800" y="1143000"/>
+            <a:ext cx="5486400" cy="3086100"/>
+          </a:xfrm>
+          <a:prstGeom prst="rect">
+            <a:avLst/>
+          </a:prstGeom>
+          <a:noFill/>
+          <a:ln w="12700">
+            <a:solidFill>
+              <a:prstClr val="black"/>
+            </a:solidFill>
+          </a:ln>
+        </p:spPr>
+        <p:txBody>
+          <a:bodyPr vert="horz" lIns="91440" tIns="45720" rIns="91440" bIns="45720" rtlCol="0" anchor="ctr"/>
+          <a:lstStyle/>
+          <a:p>
+            <a:endParaRPr lang="en-US"/>
+          </a:p>
+        </p:txBody>
+      </p:sp>
+      <p:sp>
+        <p:nvSpPr>
+          <p:cNvPr id="5" name="Notes Placeholder 4"/>
+          <p:cNvSpPr>
+            <a:spLocks noGrp="1"/>
+          </p:cNvSpPr>
+          <p:nvPr>
+            <p:ph type="body" sz="quarter" idx="3"/>
+          </p:nvPr>
+        </p:nvSpPr>
+        <p:spPr>
+          <a:xfrm>
+            <a:off x="685800" y="4400550"/>
+            <a:ext cx="5486400" cy="3600450"/>
+          </a:xfrm>
+          <a:prstGeom prst="rect">
+            <a:avLst/>
+          </a:prstGeom>
+        </p:spPr>
+        <p:txBody>
+          <a:bodyPr vert="horz" lIns="91440" tIns="45720" rIns="91440" bIns="45720" rtlCol="0"/>
+          <a:lstStyle/>
+          <a:p>
+            <a:pPr lvl="0"/>
+            <a:r>
+              <a:rPr lang="en-US"/>
+              <a:t>Edit Master text styles</a:t>
+            </a:r>
+          </a:p>
+          <a:p>
+            <a:pPr lvl="1"/>
+            <a:r>
+              <a:rPr lang="en-US"/>
+              <a:t>Second level</a:t>
+            </a:r>
+          </a:p>
+          <a:p>
+            <a:pPr lvl="2"/>
+            <a:r>
+              <a:rPr lang="en-US"/>
+              <a:t>Third level</a:t>
+            </a:r>
+          </a:p>
+          <a:p>
+            <a:pPr lvl="3"/>
+            <a:r>
+              <a:rPr lang="en-US"/>
+              <a:t>Fourth level</a:t>
+            </a:r>
+          </a:p>
+          <a:p>
+            <a:pPr lvl="4"/>
+            <a:r>
+              <a:rPr lang="en-US"/>
+              <a:t>Fifth level</a:t>
+            </a:r>
+          </a:p>
+        </p:txBody>
+      </p:sp>
+      <p:sp>
+        <p:nvSpPr>
+          <p:cNvPr id="6" name="Footer Placeholder 5"/>
+          <p:cNvSpPr>
+            <a:spLocks noGrp="1"/>
+          </p:cNvSpPr>
+          <p:nvPr>
+            <p:ph type="ftr" sz="quarter" idx="4"/>
+          </p:nvPr>
+        </p:nvSpPr>
+        <p:spPr>
+          <a:xfrm>
+            <a:off x="0" y="8685213"/>
+            <a:ext cx="2971800" cy="458787"/>
+          </a:xfrm>
+          <a:prstGeom prst="rect">
+            <a:avLst/>
+          </a:prstGeom>
+        </p:spPr>
+        <p:txBody>
+          <a:bodyPr vert="horz" lIns="91440" tIns="45720" rIns="91440" bIns="45720" rtlCol="0" anchor="b"/>
+          <a:lstStyle>
+            <a:lvl1pPr algn="l">
+              <a:defRPr sz="1200"/>
+            </a:lvl1pPr>
+          </a:lstStyle>
+          <a:p>
+            <a:endParaRPr lang="en-US"/>
+          </a:p>
+        </p:txBody>
+      </p:sp>
+      <p:sp>
+        <p:nvSpPr>
+          <p:cNvPr id="7" name="Slide Number Placeholder 6"/>
+          <p:cNvSpPr>
+            <a:spLocks noGrp="1"/>
+          </p:cNvSpPr>
+          <p:nvPr>
+            <p:ph type="sldNum" sz="quarter" idx="5"/>
+          </p:nvPr>
+        </p:nvSpPr>
+        <p:spPr>
+          <a:xfrm>
+            <a:off x="3884613" y="8685213"/>
+            <a:ext cx="2971800" cy="458787"/>
+          </a:xfrm>
+          <a:prstGeom prst="rect">
+            <a:avLst/>
+          </a:prstGeom>
+        </p:spPr>
+        <p:txBody>
+          <a:bodyPr vert="horz" lIns="91440" tIns="45720" rIns="91440" bIns="45720" rtlCol="0" anchor="b"/>
+          <a:lstStyle>
+            <a:lvl1pPr algn="r">
+              <a:defRPr sz="1200"/>
+            </a:lvl1pPr>
+          </a:lstStyle>
+          <a:p>
+            <a:fld id="{B1DBF306-6F9F-5B40-90B5-598FDD091CE2}" type="slidenum">
+              <a:rPr lang="en-US" smtClean="0"/>
+              <a:t>‹#›</a:t>
+            </a:fld>
+            <a:endParaRPr lang="en-US"/>
+          </a:p>
+        </p:txBody>
+      </p:sp>
+    </p:spTree>
+    <p:extLst>
+      <p:ext uri="{BB962C8B-B14F-4D97-AF65-F5344CB8AC3E}">
+        <p14:creationId xmlns:p14="http://schemas.microsoft.com/office/powerpoint/2010/main" val="2527082749"/>
+      </p:ext>
+    </p:extLst>
+  </p:cSld>
+  <p:clrMap bg1="lt1" tx1="dk1" bg2="lt2" tx2="dk2" accent1="accent1" accent2="accent2" accent3="accent3" accent4="accent4" accent5="accent5" accent6="accent6" hlink="hlink" folHlink="folHlink"/>
+  <p:notesStyle>
+    <a:lvl1pPr marL="0" algn="l" defTabSz="914400" rtl="0" eaLnBrk="1" latinLnBrk="0" hangingPunct="1">
+      <a:defRPr sz="1200" kern="1200">
+        <a:solidFill>
+          <a:schemeClr val="tx1"/>
+        </a:solidFill>
+        <a:latin typeface="+mn-lt"/>
+        <a:ea typeface="+mn-ea"/>
+        <a:cs typeface="+mn-cs"/>
+      </a:defRPr>
+    </a:lvl1pPr>
+    <a:lvl2pPr marL="457200" algn="l" defTabSz="914400" rtl="0" eaLnBrk="1" latinLnBrk="0" hangingPunct="1">
+      <a:defRPr sz="1200" kern="1200">
+        <a:solidFill>
+          <a:schemeClr val="tx1"/>
+        </a:solidFill>
+        <a:latin typeface="+mn-lt"/>
+        <a:ea typeface="+mn-ea"/>
+        <a:cs typeface="+mn-cs"/>
+      </a:defRPr>
+    </a:lvl2pPr>
+    <a:lvl3pPr marL="914400" algn="l" defTabSz="914400" rtl="0" eaLnBrk="1" latinLnBrk="0" hangingPunct="1">
+      <a:defRPr sz="1200" kern="1200">
+        <a:solidFill>
+          <a:schemeClr val="tx1"/>
+        </a:solidFill>
+        <a:latin typeface="+mn-lt"/>
+        <a:ea typeface="+mn-ea"/>
+        <a:cs typeface="+mn-cs"/>
+      </a:defRPr>
+    </a:lvl3pPr>
+    <a:lvl4pPr marL="1371600" algn="l" defTabSz="914400" rtl="0" eaLnBrk="1" latinLnBrk="0" hangingPunct="1">
+      <a:defRPr sz="1200" kern="1200">
+        <a:solidFill>
+          <a:schemeClr val="tx1"/>
+        </a:solidFill>
+        <a:latin typeface="+mn-lt"/>
+        <a:ea typeface="+mn-ea"/>
+        <a:cs typeface="+mn-cs"/>
+      </a:defRPr>
+    </a:lvl4pPr>
+    <a:lvl5pPr marL="1828800" algn="l" defTabSz="914400" rtl="0" eaLnBrk="1" latinLnBrk="0" hangingPunct="1">
+      <a:defRPr sz="1200" kern="1200">
+        <a:solidFill>
+          <a:schemeClr val="tx1"/>
+        </a:solidFill>
+        <a:latin typeface="+mn-lt"/>
+        <a:ea typeface="+mn-ea"/>
+        <a:cs typeface="+mn-cs"/>
+      </a:defRPr>
+    </a:lvl5pPr>
+    <a:lvl6pPr marL="2286000" algn="l" defTabSz="914400" rtl="0" eaLnBrk="1" latinLnBrk="0" hangingPunct="1">
+      <a:defRPr sz="1200" kern="1200">
+        <a:solidFill>
+          <a:schemeClr val="tx1"/>
+        </a:solidFill>
+        <a:latin typeface="+mn-lt"/>
+        <a:ea typeface="+mn-ea"/>
+        <a:cs typeface="+mn-cs"/>
+      </a:defRPr>
+    </a:lvl6pPr>
+    <a:lvl7pPr marL="2743200" algn="l" defTabSz="914400" rtl="0" eaLnBrk="1" latinLnBrk="0" hangingPunct="1">
+      <a:defRPr sz="1200" kern="1200">
+        <a:solidFill>
+          <a:schemeClr val="tx1"/>
+        </a:solidFill>
+        <a:latin typeface="+mn-lt"/>
+        <a:ea typeface="+mn-ea"/>
+        <a:cs typeface="+mn-cs"/>
+      </a:defRPr>
+    </a:lvl7pPr>
+    <a:lvl8pPr marL="3200400" algn="l" defTabSz="914400" rtl="0" eaLnBrk="1" latinLnBrk="0" hangingPunct="1">
+      <a:defRPr sz="1200" kern="1200">
+        <a:solidFill>
+          <a:schemeClr val="tx1"/>
+        </a:solidFill>
+        <a:latin typeface="+mn-lt"/>
+        <a:ea typeface="+mn-ea"/>
+        <a:cs typeface="+mn-cs"/>
+      </a:defRPr>
+    </a:lvl8pPr>
+    <a:lvl9pPr marL="3657600" algn="l" defTabSz="914400" rtl="0" eaLnBrk="1" latinLnBrk="0" hangingPunct="1">
+      <a:defRPr sz="1200" kern="1200">
+        <a:solidFill>
+          <a:schemeClr val="tx1"/>
+        </a:solidFill>
+        <a:latin typeface="+mn-lt"/>
+        <a:ea typeface="+mn-ea"/>
+        <a:cs typeface="+mn-cs"/>
+      </a:defRPr>
+    </a:lvl9pPr>
+  </p:notesStyle>
+</p:notesMaster>
+</file>
+
+<file path=ppt/notesSlides/notesSlide1.xml><?xml version="1.0" encoding="utf-8"?>
+<p:notes xmlns:a="http://schemas.openxmlformats.org/drawingml/2006/main" xmlns:r="http://schemas.openxmlformats.org/officeDocument/2006/relationships" xmlns:p="http://schemas.openxmlformats.org/presentationml/2006/main">
+  <p:cSld>
+    <p:spTree>
+      <p:nvGrpSpPr>
+        <p:cNvPr id="1" name=""/>
+        <p:cNvGrpSpPr/>
+        <p:nvPr/>
+      </p:nvGrpSpPr>
+      <p:grpSpPr>
+        <a:xfrm>
+          <a:off x="0" y="0"/>
+          <a:ext cx="0" cy="0"/>
+          <a:chOff x="0" y="0"/>
+          <a:chExt cx="0" cy="0"/>
+        </a:xfrm>
+      </p:grpSpPr>
+      <p:sp>
+        <p:nvSpPr>
+          <p:cNvPr id="2" name="Slide Image Placeholder 1"/>
+          <p:cNvSpPr>
+            <a:spLocks noGrp="1" noRot="1" noChangeAspect="1"/>
+          </p:cNvSpPr>
+          <p:nvPr>
+            <p:ph type="sldImg"/>
+          </p:nvPr>
+        </p:nvSpPr>
+        <p:spPr/>
+      </p:sp>
+      <p:sp>
+        <p:nvSpPr>
+          <p:cNvPr id="3" name="Notes Placeholder 2"/>
+          <p:cNvSpPr>
+            <a:spLocks noGrp="1"/>
+          </p:cNvSpPr>
+          <p:nvPr>
+            <p:ph type="body" idx="1"/>
+          </p:nvPr>
+        </p:nvSpPr>
+        <p:spPr/>
+        <p:txBody>
+          <a:bodyPr/>
+          <a:lstStyle/>
+          <a:p>
+            <a:r>
+              <a:rPr lang="en-US" dirty="0"/>
+              <a:t>I’m Ethan and today I’m presenting on parallel streams in Java, which was introduced to make it easy for developers to take advantage of concurrency in their applications. </a:t>
+            </a:r>
+          </a:p>
+        </p:txBody>
+      </p:sp>
+      <p:sp>
+        <p:nvSpPr>
+          <p:cNvPr id="4" name="Slide Number Placeholder 3"/>
+          <p:cNvSpPr>
+            <a:spLocks noGrp="1"/>
+          </p:cNvSpPr>
+          <p:nvPr>
+            <p:ph type="sldNum" sz="quarter" idx="10"/>
+          </p:nvPr>
+        </p:nvSpPr>
+        <p:spPr/>
+        <p:txBody>
+          <a:bodyPr/>
+          <a:lstStyle/>
+          <a:p>
+            <a:fld id="{B1DBF306-6F9F-5B40-90B5-598FDD091CE2}" type="slidenum">
+              <a:rPr lang="en-US" smtClean="0"/>
+              <a:t>1</a:t>
+            </a:fld>
+            <a:endParaRPr lang="en-US"/>
+          </a:p>
+        </p:txBody>
+      </p:sp>
+    </p:spTree>
+    <p:extLst>
+      <p:ext uri="{BB962C8B-B14F-4D97-AF65-F5344CB8AC3E}">
+        <p14:creationId xmlns:p14="http://schemas.microsoft.com/office/powerpoint/2010/main" val="646587462"/>
+      </p:ext>
+    </p:extLst>
+  </p:cSld>
+  <p:clrMapOvr>
+    <a:masterClrMapping/>
+  </p:clrMapOvr>
+</p:notes>
+</file>
+
+<file path=ppt/notesSlides/notesSlide2.xml><?xml version="1.0" encoding="utf-8"?>
+<p:notes xmlns:a="http://schemas.openxmlformats.org/drawingml/2006/main" xmlns:r="http://schemas.openxmlformats.org/officeDocument/2006/relationships" xmlns:p="http://schemas.openxmlformats.org/presentationml/2006/main">
+  <p:cSld>
+    <p:spTree>
+      <p:nvGrpSpPr>
+        <p:cNvPr id="1" name=""/>
+        <p:cNvGrpSpPr/>
+        <p:nvPr/>
+      </p:nvGrpSpPr>
+      <p:grpSpPr>
+        <a:xfrm>
+          <a:off x="0" y="0"/>
+          <a:ext cx="0" cy="0"/>
+          <a:chOff x="0" y="0"/>
+          <a:chExt cx="0" cy="0"/>
+        </a:xfrm>
+      </p:grpSpPr>
+      <p:sp>
+        <p:nvSpPr>
+          <p:cNvPr id="2" name="Slide Image Placeholder 1"/>
+          <p:cNvSpPr>
+            <a:spLocks noGrp="1" noRot="1" noChangeAspect="1"/>
+          </p:cNvSpPr>
+          <p:nvPr>
+            <p:ph type="sldImg"/>
+          </p:nvPr>
+        </p:nvSpPr>
+        <p:spPr/>
+      </p:sp>
+      <p:sp>
+        <p:nvSpPr>
+          <p:cNvPr id="3" name="Notes Placeholder 2"/>
+          <p:cNvSpPr>
+            <a:spLocks noGrp="1"/>
+          </p:cNvSpPr>
+          <p:nvPr>
+            <p:ph type="body" idx="1"/>
+          </p:nvPr>
+        </p:nvSpPr>
+        <p:spPr/>
+        <p:txBody>
+          <a:bodyPr/>
+          <a:lstStyle/>
+          <a:p>
+            <a:r>
+              <a:rPr lang="en-US" dirty="0"/>
+              <a:t>And they did a really good job at it. The serial stream simply prints off the name off all Person objects who have a job. Making this run in parallel is as easy as adding the parallel method(). After this the developer gives up responsibility for threading to the JVM.</a:t>
+            </a:r>
+          </a:p>
+        </p:txBody>
+      </p:sp>
+      <p:sp>
+        <p:nvSpPr>
+          <p:cNvPr id="4" name="Slide Number Placeholder 3"/>
+          <p:cNvSpPr>
+            <a:spLocks noGrp="1"/>
+          </p:cNvSpPr>
+          <p:nvPr>
+            <p:ph type="sldNum" sz="quarter" idx="10"/>
+          </p:nvPr>
+        </p:nvSpPr>
+        <p:spPr/>
+        <p:txBody>
+          <a:bodyPr/>
+          <a:lstStyle/>
+          <a:p>
+            <a:fld id="{B1DBF306-6F9F-5B40-90B5-598FDD091CE2}" type="slidenum">
+              <a:rPr lang="en-US" smtClean="0"/>
+              <a:t>2</a:t>
+            </a:fld>
+            <a:endParaRPr lang="en-US"/>
+          </a:p>
+        </p:txBody>
+      </p:sp>
+    </p:spTree>
+    <p:extLst>
+      <p:ext uri="{BB962C8B-B14F-4D97-AF65-F5344CB8AC3E}">
+        <p14:creationId xmlns:p14="http://schemas.microsoft.com/office/powerpoint/2010/main" val="2150711441"/>
+      </p:ext>
+    </p:extLst>
+  </p:cSld>
+  <p:clrMapOvr>
+    <a:masterClrMapping/>
+  </p:clrMapOvr>
+</p:notes>
+</file>
+
+<file path=ppt/notesSlides/notesSlide3.xml><?xml version="1.0" encoding="utf-8"?>
+<p:notes xmlns:a="http://schemas.openxmlformats.org/drawingml/2006/main" xmlns:r="http://schemas.openxmlformats.org/officeDocument/2006/relationships" xmlns:p="http://schemas.openxmlformats.org/presentationml/2006/main">
+  <p:cSld>
+    <p:spTree>
+      <p:nvGrpSpPr>
+        <p:cNvPr id="1" name=""/>
+        <p:cNvGrpSpPr/>
+        <p:nvPr/>
+      </p:nvGrpSpPr>
+      <p:grpSpPr>
+        <a:xfrm>
+          <a:off x="0" y="0"/>
+          <a:ext cx="0" cy="0"/>
+          <a:chOff x="0" y="0"/>
+          <a:chExt cx="0" cy="0"/>
+        </a:xfrm>
+      </p:grpSpPr>
+      <p:sp>
+        <p:nvSpPr>
+          <p:cNvPr id="2" name="Slide Image Placeholder 1"/>
+          <p:cNvSpPr>
+            <a:spLocks noGrp="1" noRot="1" noChangeAspect="1"/>
+          </p:cNvSpPr>
+          <p:nvPr>
+            <p:ph type="sldImg"/>
+          </p:nvPr>
+        </p:nvSpPr>
+        <p:spPr/>
+      </p:sp>
+      <p:sp>
+        <p:nvSpPr>
+          <p:cNvPr id="3" name="Notes Placeholder 2"/>
+          <p:cNvSpPr>
+            <a:spLocks noGrp="1"/>
+          </p:cNvSpPr>
+          <p:nvPr>
+            <p:ph type="body" idx="1"/>
+          </p:nvPr>
+        </p:nvSpPr>
+        <p:spPr/>
+        <p:txBody>
+          <a:bodyPr/>
+          <a:lstStyle/>
+          <a:p>
+            <a:r>
+              <a:rPr lang="en-US" dirty="0"/>
+              <a:t>When the JVM gets a parallel stream it uses an object called a Spliterator to break up the full stream into </a:t>
+            </a:r>
+            <a:r>
+              <a:rPr lang="en-US" dirty="0" err="1"/>
+              <a:t>substreams</a:t>
+            </a:r>
+            <a:r>
+              <a:rPr lang="en-US" dirty="0"/>
+              <a:t> that all assume responsibility for a part of the original stream. Note that a </a:t>
+            </a:r>
+            <a:r>
+              <a:rPr lang="en-US" dirty="0" err="1"/>
+              <a:t>substream</a:t>
+            </a:r>
+            <a:r>
+              <a:rPr lang="en-US" dirty="0"/>
+              <a:t> is not actually a new Stream object but just references a part of the original Stream, the reason will be explained shortly. Each new </a:t>
+            </a:r>
+            <a:r>
+              <a:rPr lang="en-US" dirty="0" err="1"/>
+              <a:t>substream</a:t>
+            </a:r>
+            <a:r>
+              <a:rPr lang="en-US" dirty="0"/>
+              <a:t> that is broken off is processed by a different thread from the common fork join pool. The new thread can either split again or start to process elements. Once each </a:t>
+            </a:r>
+            <a:r>
+              <a:rPr lang="en-US" dirty="0" err="1"/>
+              <a:t>substream</a:t>
+            </a:r>
+            <a:r>
+              <a:rPr lang="en-US" dirty="0"/>
+              <a:t> is finished processing they are assembled together into the final data form.</a:t>
+            </a:r>
+          </a:p>
+        </p:txBody>
+      </p:sp>
+      <p:sp>
+        <p:nvSpPr>
+          <p:cNvPr id="4" name="Slide Number Placeholder 3"/>
+          <p:cNvSpPr>
+            <a:spLocks noGrp="1"/>
+          </p:cNvSpPr>
+          <p:nvPr>
+            <p:ph type="sldNum" sz="quarter" idx="10"/>
+          </p:nvPr>
+        </p:nvSpPr>
+        <p:spPr/>
+        <p:txBody>
+          <a:bodyPr/>
+          <a:lstStyle/>
+          <a:p>
+            <a:fld id="{B1DBF306-6F9F-5B40-90B5-598FDD091CE2}" type="slidenum">
+              <a:rPr lang="en-US" smtClean="0"/>
+              <a:t>3</a:t>
+            </a:fld>
+            <a:endParaRPr lang="en-US"/>
+          </a:p>
+        </p:txBody>
+      </p:sp>
+    </p:spTree>
+    <p:extLst>
+      <p:ext uri="{BB962C8B-B14F-4D97-AF65-F5344CB8AC3E}">
+        <p14:creationId xmlns:p14="http://schemas.microsoft.com/office/powerpoint/2010/main" val="4044590478"/>
+      </p:ext>
+    </p:extLst>
+  </p:cSld>
+  <p:clrMapOvr>
+    <a:masterClrMapping/>
+  </p:clrMapOvr>
+</p:notes>
+</file>
+
+<file path=ppt/notesSlides/notesSlide4.xml><?xml version="1.0" encoding="utf-8"?>
+<p:notes xmlns:a="http://schemas.openxmlformats.org/drawingml/2006/main" xmlns:r="http://schemas.openxmlformats.org/officeDocument/2006/relationships" xmlns:p="http://schemas.openxmlformats.org/presentationml/2006/main">
+  <p:cSld>
+    <p:spTree>
+      <p:nvGrpSpPr>
+        <p:cNvPr id="1" name=""/>
+        <p:cNvGrpSpPr/>
+        <p:nvPr/>
+      </p:nvGrpSpPr>
+      <p:grpSpPr>
+        <a:xfrm>
+          <a:off x="0" y="0"/>
+          <a:ext cx="0" cy="0"/>
+          <a:chOff x="0" y="0"/>
+          <a:chExt cx="0" cy="0"/>
+        </a:xfrm>
+      </p:grpSpPr>
+      <p:sp>
+        <p:nvSpPr>
+          <p:cNvPr id="2" name="Slide Image Placeholder 1"/>
+          <p:cNvSpPr>
+            <a:spLocks noGrp="1" noRot="1" noChangeAspect="1"/>
+          </p:cNvSpPr>
+          <p:nvPr>
+            <p:ph type="sldImg"/>
+          </p:nvPr>
+        </p:nvSpPr>
+        <p:spPr/>
+      </p:sp>
+      <p:sp>
+        <p:nvSpPr>
+          <p:cNvPr id="3" name="Notes Placeholder 2"/>
+          <p:cNvSpPr>
+            <a:spLocks noGrp="1"/>
+          </p:cNvSpPr>
+          <p:nvPr>
+            <p:ph type="body" idx="1"/>
+          </p:nvPr>
+        </p:nvSpPr>
+        <p:spPr/>
+        <p:txBody>
+          <a:bodyPr/>
+          <a:lstStyle/>
+          <a:p>
+            <a:endParaRPr lang="en-US" dirty="0"/>
+          </a:p>
+        </p:txBody>
+      </p:sp>
+      <p:sp>
+        <p:nvSpPr>
+          <p:cNvPr id="4" name="Slide Number Placeholder 3"/>
+          <p:cNvSpPr>
+            <a:spLocks noGrp="1"/>
+          </p:cNvSpPr>
+          <p:nvPr>
+            <p:ph type="sldNum" sz="quarter" idx="10"/>
+          </p:nvPr>
+        </p:nvSpPr>
+        <p:spPr/>
+        <p:txBody>
+          <a:bodyPr/>
+          <a:lstStyle/>
+          <a:p>
+            <a:fld id="{B1DBF306-6F9F-5B40-90B5-598FDD091CE2}" type="slidenum">
+              <a:rPr lang="en-US" smtClean="0"/>
+              <a:t>8</a:t>
+            </a:fld>
+            <a:endParaRPr lang="en-US"/>
+          </a:p>
+        </p:txBody>
+      </p:sp>
+    </p:spTree>
+    <p:extLst>
+      <p:ext uri="{BB962C8B-B14F-4D97-AF65-F5344CB8AC3E}">
+        <p14:creationId xmlns:p14="http://schemas.microsoft.com/office/powerpoint/2010/main" val="733504183"/>
+      </p:ext>
+    </p:extLst>
+  </p:cSld>
+  <p:clrMapOvr>
+    <a:masterClrMapping/>
+  </p:clrMapOvr>
+</p:notes>
+</file>
+
 <file path=ppt/slideLayouts/slideLayout1.xml><?xml version="1.0" encoding="utf-8"?>
 <p:sldLayout xmlns:a="http://schemas.openxmlformats.org/drawingml/2006/main" xmlns:r="http://schemas.openxmlformats.org/officeDocument/2006/relationships" xmlns:p="http://schemas.openxmlformats.org/presentationml/2006/main" type="title" preserve="1">
   <p:cSld name="Title Slide">
@@ -285,7 +1021,7 @@
           <a:p>
             <a:fld id="{48A87A34-81AB-432B-8DAE-1953F412C126}" type="datetimeFigureOut">
               <a:rPr lang="en-US" smtClean="0"/>
-              <a:t>2/22/18</a:t>
+              <a:t>2/27/18</a:t>
             </a:fld>
             <a:endParaRPr lang="en-US" dirty="0"/>
           </a:p>
@@ -552,7 +1288,7 @@
           <a:p>
             <a:fld id="{48A87A34-81AB-432B-8DAE-1953F412C126}" type="datetimeFigureOut">
               <a:rPr lang="en-US" smtClean="0"/>
-              <a:t>2/22/18</a:t>
+              <a:t>2/27/18</a:t>
             </a:fld>
             <a:endParaRPr lang="en-US" dirty="0"/>
           </a:p>
@@ -784,7 +1520,7 @@
             <a:fld id="{48A87A34-81AB-432B-8DAE-1953F412C126}" type="datetimeFigureOut">
               <a:rPr lang="en-US" smtClean="0"/>
               <a:pPr/>
-              <a:t>2/22/18</a:t>
+              <a:t>2/27/18</a:t>
             </a:fld>
             <a:endParaRPr lang="en-US" dirty="0"/>
           </a:p>
@@ -1095,7 +1831,7 @@
             <a:fld id="{48A87A34-81AB-432B-8DAE-1953F412C126}" type="datetimeFigureOut">
               <a:rPr lang="en-US" smtClean="0"/>
               <a:pPr/>
-              <a:t>2/22/18</a:t>
+              <a:t>2/27/18</a:t>
             </a:fld>
             <a:endParaRPr lang="en-US" dirty="0"/>
           </a:p>
@@ -1569,7 +2305,7 @@
             <a:fld id="{48A87A34-81AB-432B-8DAE-1953F412C126}" type="datetimeFigureOut">
               <a:rPr lang="en-US" smtClean="0"/>
               <a:pPr/>
-              <a:t>2/22/18</a:t>
+              <a:t>2/27/18</a:t>
             </a:fld>
             <a:endParaRPr lang="en-US" dirty="0"/>
           </a:p>
@@ -2116,7 +2852,7 @@
           <a:p>
             <a:fld id="{48A87A34-81AB-432B-8DAE-1953F412C126}" type="datetimeFigureOut">
               <a:rPr lang="en-US" smtClean="0"/>
-              <a:t>2/22/18</a:t>
+              <a:t>2/27/18</a:t>
             </a:fld>
             <a:endParaRPr lang="en-US" dirty="0"/>
           </a:p>
@@ -2890,7 +3626,7 @@
           <a:p>
             <a:fld id="{48A87A34-81AB-432B-8DAE-1953F412C126}" type="datetimeFigureOut">
               <a:rPr lang="en-US" smtClean="0"/>
-              <a:t>2/22/18</a:t>
+              <a:t>2/27/18</a:t>
             </a:fld>
             <a:endParaRPr lang="en-US" dirty="0"/>
           </a:p>
@@ -3065,7 +3801,7 @@
           <a:p>
             <a:fld id="{48A87A34-81AB-432B-8DAE-1953F412C126}" type="datetimeFigureOut">
               <a:rPr lang="en-US" smtClean="0"/>
-              <a:t>2/22/18</a:t>
+              <a:t>2/27/18</a:t>
             </a:fld>
             <a:endParaRPr lang="en-US" dirty="0"/>
           </a:p>
@@ -3289,7 +4025,7 @@
             <a:fld id="{48A87A34-81AB-432B-8DAE-1953F412C126}" type="datetimeFigureOut">
               <a:rPr lang="en-US" smtClean="0"/>
               <a:pPr/>
-              <a:t>2/22/18</a:t>
+              <a:t>2/27/18</a:t>
             </a:fld>
             <a:endParaRPr lang="en-US" dirty="0"/>
           </a:p>
@@ -3469,7 +4205,7 @@
           <a:p>
             <a:fld id="{48A87A34-81AB-432B-8DAE-1953F412C126}" type="datetimeFigureOut">
               <a:rPr lang="en-US" smtClean="0"/>
-              <a:t>2/22/18</a:t>
+              <a:t>2/27/18</a:t>
             </a:fld>
             <a:endParaRPr lang="en-US" dirty="0"/>
           </a:p>
@@ -3759,7 +4495,7 @@
             <a:fld id="{48A87A34-81AB-432B-8DAE-1953F412C126}" type="datetimeFigureOut">
               <a:rPr lang="en-US" smtClean="0"/>
               <a:pPr/>
-              <a:t>2/22/18</a:t>
+              <a:t>2/27/18</a:t>
             </a:fld>
             <a:endParaRPr lang="en-US" dirty="0"/>
           </a:p>
@@ -4001,7 +4737,7 @@
           <a:p>
             <a:fld id="{48A87A34-81AB-432B-8DAE-1953F412C126}" type="datetimeFigureOut">
               <a:rPr lang="en-US" smtClean="0"/>
-              <a:t>2/22/18</a:t>
+              <a:t>2/27/18</a:t>
             </a:fld>
             <a:endParaRPr lang="en-US" dirty="0"/>
           </a:p>
@@ -4380,7 +5116,7 @@
           <a:p>
             <a:fld id="{48A87A34-81AB-432B-8DAE-1953F412C126}" type="datetimeFigureOut">
               <a:rPr lang="en-US" smtClean="0"/>
-              <a:t>2/22/18</a:t>
+              <a:t>2/27/18</a:t>
             </a:fld>
             <a:endParaRPr lang="en-US" dirty="0"/>
           </a:p>
@@ -4498,7 +5234,7 @@
           <a:p>
             <a:fld id="{48A87A34-81AB-432B-8DAE-1953F412C126}" type="datetimeFigureOut">
               <a:rPr lang="en-US" smtClean="0"/>
-              <a:t>2/22/18</a:t>
+              <a:t>2/27/18</a:t>
             </a:fld>
             <a:endParaRPr lang="en-US" dirty="0"/>
           </a:p>
@@ -4593,7 +5329,7 @@
           <a:p>
             <a:fld id="{48A87A34-81AB-432B-8DAE-1953F412C126}" type="datetimeFigureOut">
               <a:rPr lang="en-US" smtClean="0"/>
-              <a:t>2/22/18</a:t>
+              <a:t>2/27/18</a:t>
             </a:fld>
             <a:endParaRPr lang="en-US" dirty="0"/>
           </a:p>
@@ -4842,7 +5578,7 @@
           <a:p>
             <a:fld id="{48A87A34-81AB-432B-8DAE-1953F412C126}" type="datetimeFigureOut">
               <a:rPr lang="en-US" smtClean="0"/>
-              <a:t>2/22/18</a:t>
+              <a:t>2/27/18</a:t>
             </a:fld>
             <a:endParaRPr lang="en-US" dirty="0"/>
           </a:p>
@@ -5099,7 +5835,7 @@
           <a:p>
             <a:fld id="{48A87A34-81AB-432B-8DAE-1953F412C126}" type="datetimeFigureOut">
               <a:rPr lang="en-US" smtClean="0"/>
-              <a:t>2/22/18</a:t>
+              <a:t>2/27/18</a:t>
             </a:fld>
             <a:endParaRPr lang="en-US" dirty="0"/>
           </a:p>
@@ -5343,7 +6079,7 @@
             <a:fld id="{48A87A34-81AB-432B-8DAE-1953F412C126}" type="datetimeFigureOut">
               <a:rPr lang="en-US" smtClean="0"/>
               <a:pPr/>
-              <a:t>2/22/18</a:t>
+              <a:t>2/27/18</a:t>
             </a:fld>
             <a:endParaRPr lang="en-US" dirty="0"/>
           </a:p>
@@ -5777,7 +6513,11 @@
           <a:lstStyle/>
           <a:p>
             <a:r>
-              <a:rPr lang="en-US" dirty="0"/>
+              <a:rPr lang="en-US" dirty="0">
+                <a:solidFill>
+                  <a:srgbClr val="0D009F"/>
+                </a:solidFill>
+              </a:rPr>
               <a:t>Java 8 parallel streams</a:t>
             </a:r>
           </a:p>
@@ -5805,7 +6545,11 @@
           <a:lstStyle/>
           <a:p>
             <a:r>
-              <a:rPr lang="en-US" dirty="0"/>
+              <a:rPr lang="en-US" dirty="0">
+                <a:solidFill>
+                  <a:srgbClr val="FF32B4"/>
+                </a:solidFill>
+              </a:rPr>
               <a:t>Ethan Williams</a:t>
             </a:r>
           </a:p>
@@ -5824,7 +6568,546 @@
 </p:sld>
 </file>
 
+<file path=ppt/slides/slide10.xml><?xml version="1.0" encoding="utf-8"?>
+<p:sld xmlns:a="http://schemas.openxmlformats.org/drawingml/2006/main" xmlns:r="http://schemas.openxmlformats.org/officeDocument/2006/relationships" xmlns:p="http://schemas.openxmlformats.org/presentationml/2006/main">
+  <p:cSld>
+    <p:spTree>
+      <p:nvGrpSpPr>
+        <p:cNvPr id="1" name=""/>
+        <p:cNvGrpSpPr/>
+        <p:nvPr/>
+      </p:nvGrpSpPr>
+      <p:grpSpPr>
+        <a:xfrm>
+          <a:off x="0" y="0"/>
+          <a:ext cx="0" cy="0"/>
+          <a:chOff x="0" y="0"/>
+          <a:chExt cx="0" cy="0"/>
+        </a:xfrm>
+      </p:grpSpPr>
+      <p:sp>
+        <p:nvSpPr>
+          <p:cNvPr id="3" name="Content Placeholder 2">
+            <a:extLst>
+              <a:ext uri="{FF2B5EF4-FFF2-40B4-BE49-F238E27FC236}">
+                <a16:creationId xmlns:a16="http://schemas.microsoft.com/office/drawing/2014/main" id="{F825007E-9610-794C-A4FA-CC0B330916B2}"/>
+              </a:ext>
+            </a:extLst>
+          </p:cNvPr>
+          <p:cNvSpPr>
+            <a:spLocks noGrp="1"/>
+          </p:cNvSpPr>
+          <p:nvPr>
+            <p:ph idx="1"/>
+          </p:nvPr>
+        </p:nvSpPr>
+        <p:spPr/>
+        <p:txBody>
+          <a:bodyPr/>
+          <a:lstStyle/>
+          <a:p>
+            <a:r>
+              <a:rPr lang="en-US" dirty="0"/>
+              <a:t>ADD EXPLANATION OF STATEFUL EXPRESSIONS AND CODE EXAMPLE</a:t>
+            </a:r>
+          </a:p>
+        </p:txBody>
+      </p:sp>
+      <p:sp>
+        <p:nvSpPr>
+          <p:cNvPr id="6" name="Title 1">
+            <a:extLst>
+              <a:ext uri="{FF2B5EF4-FFF2-40B4-BE49-F238E27FC236}">
+                <a16:creationId xmlns:a16="http://schemas.microsoft.com/office/drawing/2014/main" id="{5D2ABDC9-5163-DC4C-AFD9-CFE4FFECDDA5}"/>
+              </a:ext>
+            </a:extLst>
+          </p:cNvPr>
+          <p:cNvSpPr>
+            <a:spLocks noGrp="1"/>
+          </p:cNvSpPr>
+          <p:nvPr>
+            <p:ph type="title"/>
+          </p:nvPr>
+        </p:nvSpPr>
+        <p:spPr>
+          <a:xfrm>
+            <a:off x="3402610" y="217962"/>
+            <a:ext cx="8294648" cy="1733500"/>
+          </a:xfrm>
+        </p:spPr>
+        <p:txBody>
+          <a:bodyPr>
+            <a:noAutofit/>
+          </a:bodyPr>
+          <a:lstStyle/>
+          <a:p>
+            <a:r>
+              <a:rPr lang="en-US" sz="3600" dirty="0">
+                <a:solidFill>
+                  <a:srgbClr val="0D009F"/>
+                </a:solidFill>
+              </a:rPr>
+              <a:t>Practical Considerations </a:t>
+            </a:r>
+            <a:r>
+              <a:rPr lang="en-US" sz="3600" dirty="0">
+                <a:solidFill>
+                  <a:srgbClr val="FF32B4"/>
+                </a:solidFill>
+              </a:rPr>
+              <a:t> </a:t>
+            </a:r>
+            <a:r>
+              <a:rPr lang="en-US" sz="3600" dirty="0" err="1">
+                <a:solidFill>
+                  <a:srgbClr val="FF32B4"/>
+                </a:solidFill>
+              </a:rPr>
+              <a:t>Stateful</a:t>
+            </a:r>
+            <a:r>
+              <a:rPr lang="en-US" sz="3600" dirty="0">
+                <a:solidFill>
+                  <a:srgbClr val="FF32B4"/>
+                </a:solidFill>
+              </a:rPr>
+              <a:t> Expressions</a:t>
+            </a:r>
+          </a:p>
+        </p:txBody>
+      </p:sp>
+    </p:spTree>
+    <p:extLst>
+      <p:ext uri="{BB962C8B-B14F-4D97-AF65-F5344CB8AC3E}">
+        <p14:creationId xmlns:p14="http://schemas.microsoft.com/office/powerpoint/2010/main" val="3576358113"/>
+      </p:ext>
+    </p:extLst>
+  </p:cSld>
+  <p:clrMapOvr>
+    <a:masterClrMapping/>
+  </p:clrMapOvr>
+</p:sld>
+</file>
+
+<file path=ppt/slides/slide11.xml><?xml version="1.0" encoding="utf-8"?>
+<p:sld xmlns:a="http://schemas.openxmlformats.org/drawingml/2006/main" xmlns:r="http://schemas.openxmlformats.org/officeDocument/2006/relationships" xmlns:p="http://schemas.openxmlformats.org/presentationml/2006/main">
+  <p:cSld>
+    <p:spTree>
+      <p:nvGrpSpPr>
+        <p:cNvPr id="1" name=""/>
+        <p:cNvGrpSpPr/>
+        <p:nvPr/>
+      </p:nvGrpSpPr>
+      <p:grpSpPr>
+        <a:xfrm>
+          <a:off x="0" y="0"/>
+          <a:ext cx="0" cy="0"/>
+          <a:chOff x="0" y="0"/>
+          <a:chExt cx="0" cy="0"/>
+        </a:xfrm>
+      </p:grpSpPr>
+      <p:sp>
+        <p:nvSpPr>
+          <p:cNvPr id="2" name="Title 1">
+            <a:extLst>
+              <a:ext uri="{FF2B5EF4-FFF2-40B4-BE49-F238E27FC236}">
+                <a16:creationId xmlns:a16="http://schemas.microsoft.com/office/drawing/2014/main" id="{4C8212CC-24BE-5945-97B2-E699AE51BB62}"/>
+              </a:ext>
+            </a:extLst>
+          </p:cNvPr>
+          <p:cNvSpPr>
+            <a:spLocks noGrp="1"/>
+          </p:cNvSpPr>
+          <p:nvPr>
+            <p:ph type="title"/>
+          </p:nvPr>
+        </p:nvSpPr>
+        <p:spPr>
+          <a:xfrm>
+            <a:off x="1992774" y="498155"/>
+            <a:ext cx="8610600" cy="1293028"/>
+          </a:xfrm>
+        </p:spPr>
+        <p:txBody>
+          <a:bodyPr/>
+          <a:lstStyle/>
+          <a:p>
+            <a:r>
+              <a:rPr lang="en-US" dirty="0">
+                <a:solidFill>
+                  <a:srgbClr val="0D009F"/>
+                </a:solidFill>
+              </a:rPr>
+              <a:t>conclusion</a:t>
+            </a:r>
+          </a:p>
+        </p:txBody>
+      </p:sp>
+      <p:sp>
+        <p:nvSpPr>
+          <p:cNvPr id="3" name="Content Placeholder 2">
+            <a:extLst>
+              <a:ext uri="{FF2B5EF4-FFF2-40B4-BE49-F238E27FC236}">
+                <a16:creationId xmlns:a16="http://schemas.microsoft.com/office/drawing/2014/main" id="{712B4908-6308-6A47-96EE-78BDB5597976}"/>
+              </a:ext>
+            </a:extLst>
+          </p:cNvPr>
+          <p:cNvSpPr>
+            <a:spLocks noGrp="1"/>
+          </p:cNvSpPr>
+          <p:nvPr>
+            <p:ph idx="1"/>
+          </p:nvPr>
+        </p:nvSpPr>
+        <p:spPr>
+          <a:xfrm>
+            <a:off x="685800" y="2622823"/>
+            <a:ext cx="10820400" cy="4024125"/>
+          </a:xfrm>
+        </p:spPr>
+        <p:txBody>
+          <a:bodyPr>
+            <a:normAutofit/>
+          </a:bodyPr>
+          <a:lstStyle/>
+          <a:p>
+            <a:pPr marL="0" indent="0" algn="ctr">
+              <a:buNone/>
+            </a:pPr>
+            <a:r>
+              <a:rPr lang="en-US" sz="3200" dirty="0">
+                <a:solidFill>
+                  <a:srgbClr val="FF32B4"/>
+                </a:solidFill>
+              </a:rPr>
+              <a:t>Using parallel streams is dope</a:t>
+            </a:r>
+          </a:p>
+          <a:p>
+            <a:pPr marL="0" indent="0" algn="ctr">
+              <a:buNone/>
+            </a:pPr>
+            <a:endParaRPr lang="en-US" sz="3200" dirty="0">
+              <a:solidFill>
+                <a:srgbClr val="FF32B4"/>
+              </a:solidFill>
+            </a:endParaRPr>
+          </a:p>
+          <a:p>
+            <a:pPr marL="0" indent="0" algn="ctr">
+              <a:buNone/>
+            </a:pPr>
+            <a:r>
+              <a:rPr lang="en-US" sz="3200" dirty="0">
+                <a:solidFill>
+                  <a:srgbClr val="FF32B4"/>
+                </a:solidFill>
+              </a:rPr>
+              <a:t>They’ll also help you improve performance</a:t>
+            </a:r>
+          </a:p>
+          <a:p>
+            <a:pPr marL="0" indent="0" algn="ctr">
+              <a:buNone/>
+            </a:pPr>
+            <a:endParaRPr lang="en-US" sz="3200" dirty="0">
+              <a:solidFill>
+                <a:srgbClr val="FF32B4"/>
+              </a:solidFill>
+            </a:endParaRPr>
+          </a:p>
+          <a:p>
+            <a:pPr marL="0" indent="0" algn="ctr">
+              <a:buNone/>
+            </a:pPr>
+            <a:r>
+              <a:rPr lang="en-US" sz="3200" dirty="0">
+                <a:solidFill>
+                  <a:srgbClr val="FF32B4"/>
+                </a:solidFill>
+              </a:rPr>
+              <a:t>Don’t make mistakes</a:t>
+            </a:r>
+          </a:p>
+        </p:txBody>
+      </p:sp>
+    </p:spTree>
+    <p:extLst>
+      <p:ext uri="{BB962C8B-B14F-4D97-AF65-F5344CB8AC3E}">
+        <p14:creationId xmlns:p14="http://schemas.microsoft.com/office/powerpoint/2010/main" val="748686273"/>
+      </p:ext>
+    </p:extLst>
+  </p:cSld>
+  <p:clrMapOvr>
+    <a:masterClrMapping/>
+  </p:clrMapOvr>
+</p:sld>
+</file>
+
 <file path=ppt/slides/slide2.xml><?xml version="1.0" encoding="utf-8"?>
+<p:sld xmlns:a="http://schemas.openxmlformats.org/drawingml/2006/main" xmlns:r="http://schemas.openxmlformats.org/officeDocument/2006/relationships" xmlns:p="http://schemas.openxmlformats.org/presentationml/2006/main">
+  <p:cSld>
+    <p:spTree>
+      <p:nvGrpSpPr>
+        <p:cNvPr id="1" name=""/>
+        <p:cNvGrpSpPr/>
+        <p:nvPr/>
+      </p:nvGrpSpPr>
+      <p:grpSpPr>
+        <a:xfrm>
+          <a:off x="0" y="0"/>
+          <a:ext cx="0" cy="0"/>
+          <a:chOff x="0" y="0"/>
+          <a:chExt cx="0" cy="0"/>
+        </a:xfrm>
+      </p:grpSpPr>
+      <p:sp>
+        <p:nvSpPr>
+          <p:cNvPr id="2" name="Title 1">
+            <a:extLst>
+              <a:ext uri="{FF2B5EF4-FFF2-40B4-BE49-F238E27FC236}">
+                <a16:creationId xmlns:a16="http://schemas.microsoft.com/office/drawing/2014/main" id="{22BD710D-8FFB-244D-8A7F-C295DE83DAF9}"/>
+              </a:ext>
+            </a:extLst>
+          </p:cNvPr>
+          <p:cNvSpPr>
+            <a:spLocks noGrp="1"/>
+          </p:cNvSpPr>
+          <p:nvPr>
+            <p:ph type="title"/>
+          </p:nvPr>
+        </p:nvSpPr>
+        <p:spPr>
+          <a:xfrm>
+            <a:off x="2349905" y="533823"/>
+            <a:ext cx="8610600" cy="1293028"/>
+          </a:xfrm>
+        </p:spPr>
+        <p:txBody>
+          <a:bodyPr/>
+          <a:lstStyle/>
+          <a:p>
+            <a:r>
+              <a:rPr lang="en-US" dirty="0">
+                <a:solidFill>
+                  <a:srgbClr val="0D009F"/>
+                </a:solidFill>
+              </a:rPr>
+              <a:t>HOW TO UTILIZE THEM</a:t>
+            </a:r>
+            <a:br>
+              <a:rPr lang="en-US" dirty="0">
+                <a:solidFill>
+                  <a:srgbClr val="0D009F"/>
+                </a:solidFill>
+              </a:rPr>
+            </a:br>
+            <a:r>
+              <a:rPr lang="en-US" dirty="0">
+                <a:solidFill>
+                  <a:srgbClr val="FF32B4"/>
+                </a:solidFill>
+              </a:rPr>
+              <a:t>it’s easy</a:t>
+            </a:r>
+            <a:endParaRPr lang="en-US" dirty="0">
+              <a:solidFill>
+                <a:srgbClr val="0D009F"/>
+              </a:solidFill>
+            </a:endParaRPr>
+          </a:p>
+        </p:txBody>
+      </p:sp>
+      <p:pic>
+        <p:nvPicPr>
+          <p:cNvPr id="4" name="Picture 3">
+            <a:extLst>
+              <a:ext uri="{FF2B5EF4-FFF2-40B4-BE49-F238E27FC236}">
+                <a16:creationId xmlns:a16="http://schemas.microsoft.com/office/drawing/2014/main" id="{5850E714-3B15-E043-ACCA-161DB768A355}"/>
+              </a:ext>
+            </a:extLst>
+          </p:cNvPr>
+          <p:cNvPicPr>
+            <a:picLocks noChangeAspect="1"/>
+          </p:cNvPicPr>
+          <p:nvPr/>
+        </p:nvPicPr>
+        <p:blipFill>
+          <a:blip r:embed="rId3"/>
+          <a:stretch>
+            <a:fillRect/>
+          </a:stretch>
+        </p:blipFill>
+        <p:spPr>
+          <a:xfrm>
+            <a:off x="787584" y="4761126"/>
+            <a:ext cx="10172921" cy="956310"/>
+          </a:xfrm>
+          <a:prstGeom prst="rect">
+            <a:avLst/>
+          </a:prstGeom>
+        </p:spPr>
+      </p:pic>
+      <p:pic>
+        <p:nvPicPr>
+          <p:cNvPr id="5" name="Picture 4">
+            <a:extLst>
+              <a:ext uri="{FF2B5EF4-FFF2-40B4-BE49-F238E27FC236}">
+                <a16:creationId xmlns:a16="http://schemas.microsoft.com/office/drawing/2014/main" id="{9F2C6CC8-FABD-5042-AAED-3717DD97815F}"/>
+              </a:ext>
+            </a:extLst>
+          </p:cNvPr>
+          <p:cNvPicPr>
+            <a:picLocks noChangeAspect="1"/>
+          </p:cNvPicPr>
+          <p:nvPr/>
+        </p:nvPicPr>
+        <p:blipFill>
+          <a:blip r:embed="rId4"/>
+          <a:stretch>
+            <a:fillRect/>
+          </a:stretch>
+        </p:blipFill>
+        <p:spPr>
+          <a:xfrm>
+            <a:off x="787584" y="2749798"/>
+            <a:ext cx="10046829" cy="739140"/>
+          </a:xfrm>
+          <a:prstGeom prst="rect">
+            <a:avLst/>
+          </a:prstGeom>
+        </p:spPr>
+      </p:pic>
+      <p:sp>
+        <p:nvSpPr>
+          <p:cNvPr id="8" name="Title 1">
+            <a:extLst>
+              <a:ext uri="{FF2B5EF4-FFF2-40B4-BE49-F238E27FC236}">
+                <a16:creationId xmlns:a16="http://schemas.microsoft.com/office/drawing/2014/main" id="{6F2AFF4F-7C87-674A-9FDF-78E1578F775E}"/>
+              </a:ext>
+            </a:extLst>
+          </p:cNvPr>
+          <p:cNvSpPr txBox="1">
+            <a:spLocks/>
+          </p:cNvSpPr>
+          <p:nvPr/>
+        </p:nvSpPr>
+        <p:spPr>
+          <a:xfrm>
+            <a:off x="479501" y="1941360"/>
+            <a:ext cx="2636892" cy="923458"/>
+          </a:xfrm>
+          <a:prstGeom prst="rect">
+            <a:avLst/>
+          </a:prstGeom>
+        </p:spPr>
+        <p:txBody>
+          <a:bodyPr vert="horz" lIns="91440" tIns="45720" rIns="91440" bIns="45720" rtlCol="0" anchor="ctr">
+            <a:normAutofit/>
+          </a:bodyPr>
+          <a:lstStyle>
+            <a:lvl1pPr algn="r" defTabSz="914400" rtl="0" eaLnBrk="1" latinLnBrk="0" hangingPunct="1">
+              <a:lnSpc>
+                <a:spcPct val="90000"/>
+              </a:lnSpc>
+              <a:spcBef>
+                <a:spcPct val="0"/>
+              </a:spcBef>
+              <a:buNone/>
+              <a:defRPr sz="4000" kern="1200" cap="all" baseline="0">
+                <a:solidFill>
+                  <a:schemeClr val="tx1"/>
+                </a:solidFill>
+                <a:latin typeface="+mj-lt"/>
+                <a:ea typeface="+mj-ea"/>
+                <a:cs typeface="+mj-cs"/>
+              </a:defRPr>
+            </a:lvl1pPr>
+          </a:lstStyle>
+          <a:p>
+            <a:r>
+              <a:rPr lang="en-US" sz="2400" dirty="0">
+                <a:solidFill>
+                  <a:srgbClr val="FF32B4"/>
+                </a:solidFill>
+              </a:rPr>
+              <a:t>Serial Stream</a:t>
+            </a:r>
+          </a:p>
+        </p:txBody>
+      </p:sp>
+      <p:sp>
+        <p:nvSpPr>
+          <p:cNvPr id="9" name="Title 1">
+            <a:extLst>
+              <a:ext uri="{FF2B5EF4-FFF2-40B4-BE49-F238E27FC236}">
+                <a16:creationId xmlns:a16="http://schemas.microsoft.com/office/drawing/2014/main" id="{6C2BF706-7094-4E49-80A9-4EFC57B815D4}"/>
+              </a:ext>
+            </a:extLst>
+          </p:cNvPr>
+          <p:cNvSpPr txBox="1">
+            <a:spLocks/>
+          </p:cNvSpPr>
+          <p:nvPr/>
+        </p:nvSpPr>
+        <p:spPr>
+          <a:xfrm>
+            <a:off x="591013" y="4041805"/>
+            <a:ext cx="2977377" cy="923458"/>
+          </a:xfrm>
+          <a:prstGeom prst="rect">
+            <a:avLst/>
+          </a:prstGeom>
+        </p:spPr>
+        <p:txBody>
+          <a:bodyPr vert="horz" lIns="91440" tIns="45720" rIns="91440" bIns="45720" rtlCol="0" anchor="ctr">
+            <a:normAutofit/>
+          </a:bodyPr>
+          <a:lstStyle>
+            <a:lvl1pPr algn="r" defTabSz="914400" rtl="0" eaLnBrk="1" latinLnBrk="0" hangingPunct="1">
+              <a:lnSpc>
+                <a:spcPct val="90000"/>
+              </a:lnSpc>
+              <a:spcBef>
+                <a:spcPct val="0"/>
+              </a:spcBef>
+              <a:buNone/>
+              <a:defRPr sz="4000" kern="1200" cap="all" baseline="0">
+                <a:solidFill>
+                  <a:schemeClr val="tx1"/>
+                </a:solidFill>
+                <a:latin typeface="+mj-lt"/>
+                <a:ea typeface="+mj-ea"/>
+                <a:cs typeface="+mj-cs"/>
+              </a:defRPr>
+            </a:lvl1pPr>
+          </a:lstStyle>
+          <a:p>
+            <a:r>
+              <a:rPr lang="en-US" sz="2400" dirty="0">
+                <a:solidFill>
+                  <a:srgbClr val="FF32B4"/>
+                </a:solidFill>
+              </a:rPr>
+              <a:t>Parallel Stream</a:t>
+            </a:r>
+          </a:p>
+        </p:txBody>
+      </p:sp>
+    </p:spTree>
+    <p:extLst>
+      <p:ext uri="{BB962C8B-B14F-4D97-AF65-F5344CB8AC3E}">
+        <p14:creationId xmlns:p14="http://schemas.microsoft.com/office/powerpoint/2010/main" val="517127859"/>
+      </p:ext>
+    </p:extLst>
+  </p:cSld>
+  <p:clrMapOvr>
+    <a:masterClrMapping/>
+  </p:clrMapOvr>
+</p:sld>
+</file>
+
+<file path=ppt/slides/slide3.xml><?xml version="1.0" encoding="utf-8"?>
 <p:sld xmlns:a="http://schemas.openxmlformats.org/drawingml/2006/main" xmlns:r="http://schemas.openxmlformats.org/officeDocument/2006/relationships" xmlns:p="http://schemas.openxmlformats.org/presentationml/2006/main">
   <p:cSld>
     <p:bg>
@@ -5851,7 +7134,7 @@
       </p:grpSpPr>
       <p:sp>
         <p:nvSpPr>
-          <p:cNvPr id="17" name="Rectangle 16">
+          <p:cNvPr id="13" name="Rectangle 12">
             <a:extLst>
               <a:ext uri="{FF2B5EF4-FFF2-40B4-BE49-F238E27FC236}">
                 <a16:creationId xmlns:a16="http://schemas.microsoft.com/office/drawing/2014/main" id="{86817BFA-9939-42FC-97E6-1DDD23A38EB9}"/>
@@ -5911,6 +7194,306 @@
       </p:sp>
       <p:pic>
         <p:nvPicPr>
+          <p:cNvPr id="15" name="Picture 14">
+            <a:extLst>
+              <a:ext uri="{FF2B5EF4-FFF2-40B4-BE49-F238E27FC236}">
+                <a16:creationId xmlns:a16="http://schemas.microsoft.com/office/drawing/2014/main" id="{A4C4F977-CDDE-402E-B4F0-84B5572E77C3}"/>
+              </a:ext>
+            </a:extLst>
+          </p:cNvPr>
+          <p:cNvPicPr>
+            <a:picLocks noGrp="1" noRot="1" noChangeAspect="1" noMove="1" noResize="1" noEditPoints="1" noAdjustHandles="1" noChangeArrowheads="1" noChangeShapeType="1" noCrop="1"/>
+          </p:cNvPicPr>
+          <p:nvPr>
+            <p:extLst>
+              <p:ext uri="{386F3935-93C4-4BCD-93E2-E3B085C9AB24}">
+                <p16:designElem xmlns:p16="http://schemas.microsoft.com/office/powerpoint/2015/main" val="1"/>
+              </p:ext>
+            </p:extLst>
+          </p:nvPr>
+        </p:nvPicPr>
+        <p:blipFill>
+          <a:blip r:embed="rId3">
+            <a:extLst>
+              <a:ext uri="{28A0092B-C50C-407E-A947-70E740481C1C}">
+                <a14:useLocalDpi xmlns:a14="http://schemas.microsoft.com/office/drawing/2010/main" val="0"/>
+              </a:ext>
+            </a:extLst>
+          </a:blip>
+          <a:stretch>
+            <a:fillRect/>
+          </a:stretch>
+        </p:blipFill>
+        <p:spPr>
+          <a:xfrm>
+            <a:off x="0" y="0"/>
+            <a:ext cx="12192000" cy="1441450"/>
+          </a:xfrm>
+          <a:prstGeom prst="rect">
+            <a:avLst/>
+          </a:prstGeom>
+        </p:spPr>
+      </p:pic>
+      <p:sp>
+        <p:nvSpPr>
+          <p:cNvPr id="2" name="Title 1">
+            <a:extLst>
+              <a:ext uri="{FF2B5EF4-FFF2-40B4-BE49-F238E27FC236}">
+                <a16:creationId xmlns:a16="http://schemas.microsoft.com/office/drawing/2014/main" id="{EF04A279-BD41-8346-A75D-603BC6CA6228}"/>
+              </a:ext>
+            </a:extLst>
+          </p:cNvPr>
+          <p:cNvSpPr>
+            <a:spLocks noGrp="1"/>
+          </p:cNvSpPr>
+          <p:nvPr>
+            <p:ph type="title"/>
+          </p:nvPr>
+        </p:nvSpPr>
+        <p:spPr>
+          <a:xfrm>
+            <a:off x="312234" y="764373"/>
+            <a:ext cx="4594303" cy="1600200"/>
+          </a:xfrm>
+        </p:spPr>
+        <p:txBody>
+          <a:bodyPr anchor="b">
+            <a:normAutofit/>
+          </a:bodyPr>
+          <a:lstStyle/>
+          <a:p>
+            <a:pPr algn="l"/>
+            <a:r>
+              <a:rPr lang="en-US" dirty="0">
+                <a:solidFill>
+                  <a:srgbClr val="0D009F"/>
+                </a:solidFill>
+              </a:rPr>
+              <a:t>How they work</a:t>
+            </a:r>
+          </a:p>
+        </p:txBody>
+      </p:sp>
+      <p:sp>
+        <p:nvSpPr>
+          <p:cNvPr id="10" name="Content Placeholder 9">
+            <a:extLst>
+              <a:ext uri="{FF2B5EF4-FFF2-40B4-BE49-F238E27FC236}">
+                <a16:creationId xmlns:a16="http://schemas.microsoft.com/office/drawing/2014/main" id="{566A5FDE-D08E-4A9E-917A-44A1E586D1C5}"/>
+              </a:ext>
+            </a:extLst>
+          </p:cNvPr>
+          <p:cNvSpPr>
+            <a:spLocks noGrp="1"/>
+          </p:cNvSpPr>
+          <p:nvPr>
+            <p:ph idx="1"/>
+          </p:nvPr>
+        </p:nvSpPr>
+        <p:spPr>
+          <a:xfrm>
+            <a:off x="620565" y="2515684"/>
+            <a:ext cx="3977639" cy="3854112"/>
+          </a:xfrm>
+        </p:spPr>
+        <p:txBody>
+          <a:bodyPr>
+            <a:normAutofit fontScale="92500" lnSpcReduction="10000"/>
+          </a:bodyPr>
+          <a:lstStyle/>
+          <a:p>
+            <a:r>
+              <a:rPr lang="en-US" sz="2400" dirty="0"/>
+              <a:t>Stream is broken up by the Spliterator into </a:t>
+            </a:r>
+            <a:r>
+              <a:rPr lang="en-US" sz="2400" dirty="0" err="1"/>
+              <a:t>substreams</a:t>
+            </a:r>
+            <a:endParaRPr lang="en-US" sz="2400" dirty="0"/>
+          </a:p>
+          <a:p>
+            <a:r>
+              <a:rPr lang="en-US" sz="2400" dirty="0"/>
+              <a:t>Extra </a:t>
+            </a:r>
+            <a:r>
+              <a:rPr lang="en-US" sz="2400" dirty="0" err="1"/>
+              <a:t>substreams</a:t>
+            </a:r>
+            <a:r>
+              <a:rPr lang="en-US" sz="2400" dirty="0"/>
+              <a:t> are handed to </a:t>
+            </a:r>
+            <a:r>
+              <a:rPr lang="en-US" sz="2400" dirty="0" err="1"/>
+              <a:t>ForkJoinPool.common</a:t>
+            </a:r>
+            <a:r>
+              <a:rPr lang="en-US" sz="2400" dirty="0"/>
+              <a:t>()</a:t>
+            </a:r>
+          </a:p>
+          <a:p>
+            <a:r>
+              <a:rPr lang="en-US" sz="2400" dirty="0"/>
+              <a:t>Each </a:t>
+            </a:r>
+            <a:r>
+              <a:rPr lang="en-US" sz="2400" dirty="0" err="1"/>
+              <a:t>substream</a:t>
+            </a:r>
+            <a:r>
+              <a:rPr lang="en-US" sz="2400" dirty="0"/>
+              <a:t> is processed like a singular serial stream</a:t>
+            </a:r>
+          </a:p>
+          <a:p>
+            <a:r>
+              <a:rPr lang="en-US" sz="2400" dirty="0"/>
+              <a:t>JVM combines all </a:t>
+            </a:r>
+            <a:r>
+              <a:rPr lang="en-US" sz="2400" dirty="0" err="1"/>
+              <a:t>substreams</a:t>
+            </a:r>
+            <a:r>
+              <a:rPr lang="en-US" sz="2400" dirty="0"/>
+              <a:t> together to serialize the stream</a:t>
+            </a:r>
+          </a:p>
+        </p:txBody>
+      </p:sp>
+      <p:pic>
+        <p:nvPicPr>
+          <p:cNvPr id="4" name="Picture 3">
+            <a:extLst>
+              <a:ext uri="{FF2B5EF4-FFF2-40B4-BE49-F238E27FC236}">
+                <a16:creationId xmlns:a16="http://schemas.microsoft.com/office/drawing/2014/main" id="{46EE2368-68B2-2849-B72D-74CF5FFFDE1D}"/>
+              </a:ext>
+            </a:extLst>
+          </p:cNvPr>
+          <p:cNvPicPr>
+            <a:picLocks noChangeAspect="1"/>
+          </p:cNvPicPr>
+          <p:nvPr/>
+        </p:nvPicPr>
+        <p:blipFill>
+          <a:blip r:embed="rId4"/>
+          <a:stretch>
+            <a:fillRect/>
+          </a:stretch>
+        </p:blipFill>
+        <p:spPr>
+          <a:xfrm>
+            <a:off x="5218769" y="963752"/>
+            <a:ext cx="6246813" cy="5193979"/>
+          </a:xfrm>
+          <a:prstGeom prst="rect">
+            <a:avLst/>
+          </a:prstGeom>
+        </p:spPr>
+      </p:pic>
+    </p:spTree>
+    <p:extLst>
+      <p:ext uri="{BB962C8B-B14F-4D97-AF65-F5344CB8AC3E}">
+        <p14:creationId xmlns:p14="http://schemas.microsoft.com/office/powerpoint/2010/main" val="3171065684"/>
+      </p:ext>
+    </p:extLst>
+  </p:cSld>
+  <p:clrMapOvr>
+    <a:masterClrMapping/>
+  </p:clrMapOvr>
+</p:sld>
+</file>
+
+<file path=ppt/slides/slide4.xml><?xml version="1.0" encoding="utf-8"?>
+<p:sld xmlns:a="http://schemas.openxmlformats.org/drawingml/2006/main" xmlns:r="http://schemas.openxmlformats.org/officeDocument/2006/relationships" xmlns:p="http://schemas.openxmlformats.org/presentationml/2006/main">
+  <p:cSld>
+    <p:bg>
+      <p:bgPr>
+        <a:solidFill>
+          <a:schemeClr val="bg1"/>
+        </a:solidFill>
+        <a:effectLst/>
+      </p:bgPr>
+    </p:bg>
+    <p:spTree>
+      <p:nvGrpSpPr>
+        <p:cNvPr id="1" name=""/>
+        <p:cNvGrpSpPr/>
+        <p:nvPr/>
+      </p:nvGrpSpPr>
+      <p:grpSpPr>
+        <a:xfrm>
+          <a:off x="0" y="0"/>
+          <a:ext cx="0" cy="0"/>
+          <a:chOff x="0" y="0"/>
+          <a:chExt cx="0" cy="0"/>
+        </a:xfrm>
+      </p:grpSpPr>
+      <p:sp>
+        <p:nvSpPr>
+          <p:cNvPr id="17" name="Rectangle 16">
+            <a:extLst>
+              <a:ext uri="{FF2B5EF4-FFF2-40B4-BE49-F238E27FC236}">
+                <a16:creationId xmlns:a16="http://schemas.microsoft.com/office/drawing/2014/main" id="{86817BFA-9939-42FC-97E6-1DDD23A38EB9}"/>
+              </a:ext>
+            </a:extLst>
+          </p:cNvPr>
+          <p:cNvSpPr>
+            <a:spLocks noGrp="1" noRot="1" noChangeAspect="1" noMove="1" noResize="1" noEditPoints="1" noAdjustHandles="1" noChangeArrowheads="1" noChangeShapeType="1" noTextEdit="1"/>
+          </p:cNvSpPr>
+          <p:nvPr>
+            <p:extLst>
+              <p:ext uri="{386F3935-93C4-4BCD-93E2-E3B085C9AB24}">
+                <p16:designElem xmlns:p16="http://schemas.microsoft.com/office/powerpoint/2015/main" val="1"/>
+              </p:ext>
+            </p:extLst>
+          </p:nvPr>
+        </p:nvSpPr>
+        <p:spPr>
+          <a:xfrm>
+            <a:off x="0" y="0"/>
+            <a:ext cx="12192000" cy="6858000"/>
+          </a:xfrm>
+          <a:prstGeom prst="rect">
+            <a:avLst/>
+          </a:prstGeom>
+          <a:solidFill>
+            <a:schemeClr val="bg1"/>
+          </a:solidFill>
+          <a:ln>
+            <a:noFill/>
+          </a:ln>
+        </p:spPr>
+        <p:style>
+          <a:lnRef idx="2">
+            <a:schemeClr val="accent1">
+              <a:shade val="50000"/>
+            </a:schemeClr>
+          </a:lnRef>
+          <a:fillRef idx="1">
+            <a:schemeClr val="accent1"/>
+          </a:fillRef>
+          <a:effectRef idx="0">
+            <a:schemeClr val="accent1"/>
+          </a:effectRef>
+          <a:fontRef idx="minor">
+            <a:schemeClr val="lt1"/>
+          </a:fontRef>
+        </p:style>
+        <p:txBody>
+          <a:bodyPr rtlCol="0" anchor="ctr"/>
+          <a:lstStyle/>
+          <a:p>
+            <a:pPr algn="ctr"/>
+            <a:endParaRPr lang="en-US"/>
+          </a:p>
+        </p:txBody>
+      </p:sp>
+      <p:pic>
+        <p:nvPicPr>
           <p:cNvPr id="19" name="Picture 18">
             <a:extLst>
               <a:ext uri="{FF2B5EF4-FFF2-40B4-BE49-F238E27FC236}">
@@ -5981,7 +7564,11 @@
           <a:p>
             <a:pPr algn="l"/>
             <a:r>
-              <a:rPr lang="en-US" sz="3200" dirty="0"/>
+              <a:rPr lang="en-US" dirty="0">
+                <a:solidFill>
+                  <a:srgbClr val="0D009F"/>
+                </a:solidFill>
+              </a:rPr>
               <a:t>Spliterator</a:t>
             </a:r>
           </a:p>
@@ -5999,63 +7586,65 @@
         </p:nvSpPr>
         <p:spPr>
           <a:xfrm>
-            <a:off x="685799" y="2462545"/>
-            <a:ext cx="3977639" cy="3854112"/>
+            <a:off x="685799" y="2462544"/>
+            <a:ext cx="4176133" cy="4105523"/>
           </a:xfrm>
         </p:spPr>
         <p:txBody>
           <a:bodyPr>
-            <a:normAutofit/>
+            <a:normAutofit fontScale="92500" lnSpcReduction="10000"/>
           </a:bodyPr>
           <a:lstStyle/>
           <a:p>
             <a:r>
-              <a:rPr lang="en-US" sz="1600" dirty="0"/>
-              <a:t>”Split + iterator”</a:t>
-            </a:r>
-          </a:p>
-          <a:p>
-            <a:r>
-              <a:rPr lang="en-US" sz="1600" dirty="0"/>
-              <a:t>Has backing list, current index in list, fence, and expected mod count</a:t>
-            </a:r>
-          </a:p>
-          <a:p>
-            <a:r>
-              <a:rPr lang="en-US" sz="1600" dirty="0"/>
+              <a:rPr lang="en-US" sz="2400" dirty="0"/>
+              <a:t>”Split + iterator”- Used to traverse and split </a:t>
+            </a:r>
+            <a:r>
+              <a:rPr lang="en-US" sz="2400" dirty="0" err="1"/>
+              <a:t>substreams</a:t>
+            </a:r>
+            <a:endParaRPr lang="en-US" sz="2400" dirty="0"/>
+          </a:p>
+          <a:p>
+            <a:r>
+              <a:rPr lang="en-US" sz="2400" dirty="0"/>
               <a:t>Traverses via </a:t>
             </a:r>
             <a:r>
-              <a:rPr lang="en-US" sz="1600" dirty="0" err="1"/>
+              <a:rPr lang="en-US" sz="2400" dirty="0" err="1"/>
               <a:t>tryAdvance</a:t>
             </a:r>
             <a:r>
-              <a:rPr lang="en-US" sz="1600" dirty="0"/>
+              <a:rPr lang="en-US" sz="2400" dirty="0"/>
               <a:t>() or </a:t>
             </a:r>
             <a:r>
-              <a:rPr lang="en-US" sz="1600" dirty="0" err="1"/>
+              <a:rPr lang="en-US" sz="2400" dirty="0" err="1"/>
               <a:t>forEachRemaining</a:t>
             </a:r>
             <a:r>
-              <a:rPr lang="en-US" sz="1600" dirty="0"/>
+              <a:rPr lang="en-US" sz="2400" dirty="0"/>
               <a:t>()</a:t>
             </a:r>
           </a:p>
           <a:p>
             <a:r>
-              <a:rPr lang="en-US" sz="1600" dirty="0"/>
+              <a:rPr lang="en-US" sz="2400" dirty="0"/>
               <a:t>Can split itself into two spliterators via </a:t>
             </a:r>
             <a:r>
-              <a:rPr lang="en-US" sz="1600" dirty="0" err="1"/>
+              <a:rPr lang="en-US" sz="2400" dirty="0" err="1"/>
               <a:t>trySplit</a:t>
             </a:r>
-            <a:endParaRPr lang="en-US" sz="1600" dirty="0"/>
-          </a:p>
-          <a:p>
-            <a:r>
-              <a:rPr lang="en-US" sz="1600" dirty="0"/>
+            <a:r>
+              <a:rPr lang="en-US" sz="2400" dirty="0"/>
+              <a:t>()</a:t>
+            </a:r>
+          </a:p>
+          <a:p>
+            <a:r>
+              <a:rPr lang="en-US" sz="2400" dirty="0"/>
               <a:t>Contains same characteristics as a Stream (ORDERED, DISTINCT, SORTED, SIZED, NONNULL, IMMUTABLE, CONCURRENT, SUBSIZED)</a:t>
             </a:r>
           </a:p>
@@ -6063,10 +7652,10 @@
       </p:sp>
       <p:pic>
         <p:nvPicPr>
-          <p:cNvPr id="21" name="Picture 20">
+          <p:cNvPr id="4" name="Picture 3">
             <a:extLst>
               <a:ext uri="{FF2B5EF4-FFF2-40B4-BE49-F238E27FC236}">
-                <a16:creationId xmlns:a16="http://schemas.microsoft.com/office/drawing/2014/main" id="{E624B2AC-EC0F-B048-A59A-47F48ED00FB1}"/>
+                <a16:creationId xmlns:a16="http://schemas.microsoft.com/office/drawing/2014/main" id="{377832FA-B4C2-164D-BFCF-B446A6C5010A}"/>
               </a:ext>
             </a:extLst>
           </p:cNvPr>
@@ -6083,8 +7672,8 @@
         </p:blipFill>
         <p:spPr>
           <a:xfrm>
-            <a:off x="5601152" y="560268"/>
-            <a:ext cx="5513161" cy="5756389"/>
+            <a:off x="6020170" y="764373"/>
+            <a:ext cx="5150749" cy="5445078"/>
           </a:xfrm>
           <a:prstGeom prst="rect">
             <a:avLst/>
@@ -6104,7 +7693,504 @@
 </p:sld>
 </file>
 
-<file path=ppt/slides/slide3.xml><?xml version="1.0" encoding="utf-8"?>
+<file path=ppt/slides/slide5.xml><?xml version="1.0" encoding="utf-8"?>
+<p:sld xmlns:a="http://schemas.openxmlformats.org/drawingml/2006/main" xmlns:r="http://schemas.openxmlformats.org/officeDocument/2006/relationships" xmlns:p="http://schemas.openxmlformats.org/presentationml/2006/main">
+  <p:cSld>
+    <p:bg>
+      <p:bgPr>
+        <a:solidFill>
+          <a:schemeClr val="bg1"/>
+        </a:solidFill>
+        <a:effectLst/>
+      </p:bgPr>
+    </p:bg>
+    <p:spTree>
+      <p:nvGrpSpPr>
+        <p:cNvPr id="1" name=""/>
+        <p:cNvGrpSpPr/>
+        <p:nvPr/>
+      </p:nvGrpSpPr>
+      <p:grpSpPr>
+        <a:xfrm>
+          <a:off x="0" y="0"/>
+          <a:ext cx="0" cy="0"/>
+          <a:chOff x="0" y="0"/>
+          <a:chExt cx="0" cy="0"/>
+        </a:xfrm>
+      </p:grpSpPr>
+      <p:sp>
+        <p:nvSpPr>
+          <p:cNvPr id="2" name="Title 1">
+            <a:extLst>
+              <a:ext uri="{FF2B5EF4-FFF2-40B4-BE49-F238E27FC236}">
+                <a16:creationId xmlns:a16="http://schemas.microsoft.com/office/drawing/2014/main" id="{0A373FDB-51C1-D047-A9AB-0A34B3201FF9}"/>
+              </a:ext>
+            </a:extLst>
+          </p:cNvPr>
+          <p:cNvSpPr>
+            <a:spLocks noGrp="1"/>
+          </p:cNvSpPr>
+          <p:nvPr>
+            <p:ph type="title"/>
+          </p:nvPr>
+        </p:nvSpPr>
+        <p:spPr>
+          <a:xfrm>
+            <a:off x="1958474" y="188036"/>
+            <a:ext cx="8567854" cy="1499326"/>
+          </a:xfrm>
+        </p:spPr>
+        <p:txBody>
+          <a:bodyPr>
+            <a:normAutofit/>
+          </a:bodyPr>
+          <a:lstStyle/>
+          <a:p>
+            <a:r>
+              <a:rPr lang="en-US" dirty="0">
+                <a:solidFill>
+                  <a:srgbClr val="0D009F"/>
+                </a:solidFill>
+              </a:rPr>
+              <a:t>Spliterator</a:t>
+            </a:r>
+            <a:br>
+              <a:rPr lang="en-US" dirty="0">
+                <a:solidFill>
+                  <a:srgbClr val="0D009F"/>
+                </a:solidFill>
+              </a:rPr>
+            </a:br>
+            <a:r>
+              <a:rPr lang="en-US" dirty="0">
+                <a:solidFill>
+                  <a:srgbClr val="FF32B4"/>
+                </a:solidFill>
+              </a:rPr>
+              <a:t>Continued</a:t>
+            </a:r>
+          </a:p>
+        </p:txBody>
+      </p:sp>
+      <p:pic>
+        <p:nvPicPr>
+          <p:cNvPr id="11" name="Picture 10">
+            <a:extLst>
+              <a:ext uri="{FF2B5EF4-FFF2-40B4-BE49-F238E27FC236}">
+                <a16:creationId xmlns:a16="http://schemas.microsoft.com/office/drawing/2014/main" id="{90B5701D-AD11-7D4B-97D1-FEA00A9A5EA2}"/>
+              </a:ext>
+            </a:extLst>
+          </p:cNvPr>
+          <p:cNvPicPr>
+            <a:picLocks noChangeAspect="1"/>
+          </p:cNvPicPr>
+          <p:nvPr/>
+        </p:nvPicPr>
+        <p:blipFill rotWithShape="1">
+          <a:blip r:embed="rId2"/>
+          <a:srcRect r="8426"/>
+          <a:stretch/>
+        </p:blipFill>
+        <p:spPr>
+          <a:xfrm>
+            <a:off x="7747321" y="3393502"/>
+            <a:ext cx="4444679" cy="1697638"/>
+          </a:xfrm>
+          <a:prstGeom prst="rect">
+            <a:avLst/>
+          </a:prstGeom>
+        </p:spPr>
+      </p:pic>
+      <p:cxnSp>
+        <p:nvCxnSpPr>
+          <p:cNvPr id="13" name="Straight Arrow Connector 12">
+            <a:extLst>
+              <a:ext uri="{FF2B5EF4-FFF2-40B4-BE49-F238E27FC236}">
+                <a16:creationId xmlns:a16="http://schemas.microsoft.com/office/drawing/2014/main" id="{6551FB2B-6138-C544-8578-5D91186372E4}"/>
+              </a:ext>
+            </a:extLst>
+          </p:cNvPr>
+          <p:cNvCxnSpPr>
+            <a:cxnSpLocks/>
+          </p:cNvCxnSpPr>
+          <p:nvPr/>
+        </p:nvCxnSpPr>
+        <p:spPr>
+          <a:xfrm>
+            <a:off x="5529998" y="4317357"/>
+            <a:ext cx="2062994" cy="0"/>
+          </a:xfrm>
+          <a:prstGeom prst="straightConnector1">
+            <a:avLst/>
+          </a:prstGeom>
+          <a:ln>
+            <a:solidFill>
+              <a:srgbClr val="FF32B4"/>
+            </a:solidFill>
+            <a:tailEnd type="triangle"/>
+          </a:ln>
+        </p:spPr>
+        <p:style>
+          <a:lnRef idx="1">
+            <a:schemeClr val="accent1"/>
+          </a:lnRef>
+          <a:fillRef idx="0">
+            <a:schemeClr val="accent1"/>
+          </a:fillRef>
+          <a:effectRef idx="0">
+            <a:schemeClr val="accent1"/>
+          </a:effectRef>
+          <a:fontRef idx="minor">
+            <a:schemeClr val="tx1"/>
+          </a:fontRef>
+        </p:style>
+      </p:cxnSp>
+      <p:sp>
+        <p:nvSpPr>
+          <p:cNvPr id="20" name="TextBox 19">
+            <a:extLst>
+              <a:ext uri="{FF2B5EF4-FFF2-40B4-BE49-F238E27FC236}">
+                <a16:creationId xmlns:a16="http://schemas.microsoft.com/office/drawing/2014/main" id="{A977AE86-0FA3-8541-9725-F817B5920664}"/>
+              </a:ext>
+            </a:extLst>
+          </p:cNvPr>
+          <p:cNvSpPr txBox="1"/>
+          <p:nvPr/>
+        </p:nvSpPr>
+        <p:spPr>
+          <a:xfrm>
+            <a:off x="5924153" y="4490976"/>
+            <a:ext cx="1541518" cy="1200329"/>
+          </a:xfrm>
+          <a:prstGeom prst="rect">
+            <a:avLst/>
+          </a:prstGeom>
+          <a:noFill/>
+        </p:spPr>
+        <p:txBody>
+          <a:bodyPr wrap="square" rtlCol="0">
+            <a:spAutoFit/>
+          </a:bodyPr>
+          <a:lstStyle/>
+          <a:p>
+            <a:r>
+              <a:rPr lang="en-US" dirty="0">
+                <a:solidFill>
+                  <a:srgbClr val="FF32B4"/>
+                </a:solidFill>
+              </a:rPr>
+              <a:t>Run on random 10,000 String list</a:t>
+            </a:r>
+          </a:p>
+        </p:txBody>
+      </p:sp>
+      <p:pic>
+        <p:nvPicPr>
+          <p:cNvPr id="21" name="Picture 20">
+            <a:extLst>
+              <a:ext uri="{FF2B5EF4-FFF2-40B4-BE49-F238E27FC236}">
+                <a16:creationId xmlns:a16="http://schemas.microsoft.com/office/drawing/2014/main" id="{9BD695A8-68A6-D945-A775-EFA6067DEC3A}"/>
+              </a:ext>
+            </a:extLst>
+          </p:cNvPr>
+          <p:cNvPicPr>
+            <a:picLocks noChangeAspect="1"/>
+          </p:cNvPicPr>
+          <p:nvPr/>
+        </p:nvPicPr>
+        <p:blipFill>
+          <a:blip r:embed="rId3"/>
+          <a:stretch>
+            <a:fillRect/>
+          </a:stretch>
+        </p:blipFill>
+        <p:spPr>
+          <a:xfrm>
+            <a:off x="128634" y="1833064"/>
+            <a:ext cx="5247035" cy="4467355"/>
+          </a:xfrm>
+          <a:prstGeom prst="rect">
+            <a:avLst/>
+          </a:prstGeom>
+        </p:spPr>
+      </p:pic>
+    </p:spTree>
+    <p:extLst>
+      <p:ext uri="{BB962C8B-B14F-4D97-AF65-F5344CB8AC3E}">
+        <p14:creationId xmlns:p14="http://schemas.microsoft.com/office/powerpoint/2010/main" val="2029637267"/>
+      </p:ext>
+    </p:extLst>
+  </p:cSld>
+  <p:clrMapOvr>
+    <a:masterClrMapping/>
+  </p:clrMapOvr>
+</p:sld>
+</file>
+
+<file path=ppt/slides/slide6.xml><?xml version="1.0" encoding="utf-8"?>
+<p:sld xmlns:a="http://schemas.openxmlformats.org/drawingml/2006/main" xmlns:r="http://schemas.openxmlformats.org/officeDocument/2006/relationships" xmlns:p="http://schemas.openxmlformats.org/presentationml/2006/main">
+  <p:cSld>
+    <p:bg>
+      <p:bgPr>
+        <a:solidFill>
+          <a:schemeClr val="bg1"/>
+        </a:solidFill>
+        <a:effectLst/>
+      </p:bgPr>
+    </p:bg>
+    <p:spTree>
+      <p:nvGrpSpPr>
+        <p:cNvPr id="1" name=""/>
+        <p:cNvGrpSpPr/>
+        <p:nvPr/>
+      </p:nvGrpSpPr>
+      <p:grpSpPr>
+        <a:xfrm>
+          <a:off x="0" y="0"/>
+          <a:ext cx="0" cy="0"/>
+          <a:chOff x="0" y="0"/>
+          <a:chExt cx="0" cy="0"/>
+        </a:xfrm>
+      </p:grpSpPr>
+      <p:sp>
+        <p:nvSpPr>
+          <p:cNvPr id="13" name="Rectangle 12">
+            <a:extLst>
+              <a:ext uri="{FF2B5EF4-FFF2-40B4-BE49-F238E27FC236}">
+                <a16:creationId xmlns:a16="http://schemas.microsoft.com/office/drawing/2014/main" id="{86817BFA-9939-42FC-97E6-1DDD23A38EB9}"/>
+              </a:ext>
+            </a:extLst>
+          </p:cNvPr>
+          <p:cNvSpPr>
+            <a:spLocks noGrp="1" noRot="1" noChangeAspect="1" noMove="1" noResize="1" noEditPoints="1" noAdjustHandles="1" noChangeArrowheads="1" noChangeShapeType="1" noTextEdit="1"/>
+          </p:cNvSpPr>
+          <p:nvPr>
+            <p:extLst>
+              <p:ext uri="{386F3935-93C4-4BCD-93E2-E3B085C9AB24}">
+                <p16:designElem xmlns:p16="http://schemas.microsoft.com/office/powerpoint/2015/main" val="1"/>
+              </p:ext>
+            </p:extLst>
+          </p:nvPr>
+        </p:nvSpPr>
+        <p:spPr>
+          <a:xfrm>
+            <a:off x="0" y="0"/>
+            <a:ext cx="12192000" cy="6858000"/>
+          </a:xfrm>
+          <a:prstGeom prst="rect">
+            <a:avLst/>
+          </a:prstGeom>
+          <a:solidFill>
+            <a:schemeClr val="bg1"/>
+          </a:solidFill>
+          <a:ln>
+            <a:noFill/>
+          </a:ln>
+        </p:spPr>
+        <p:style>
+          <a:lnRef idx="2">
+            <a:schemeClr val="accent1">
+              <a:shade val="50000"/>
+            </a:schemeClr>
+          </a:lnRef>
+          <a:fillRef idx="1">
+            <a:schemeClr val="accent1"/>
+          </a:fillRef>
+          <a:effectRef idx="0">
+            <a:schemeClr val="accent1"/>
+          </a:effectRef>
+          <a:fontRef idx="minor">
+            <a:schemeClr val="lt1"/>
+          </a:fontRef>
+        </p:style>
+        <p:txBody>
+          <a:bodyPr rtlCol="0" anchor="ctr"/>
+          <a:lstStyle/>
+          <a:p>
+            <a:pPr algn="ctr"/>
+            <a:endParaRPr lang="en-US"/>
+          </a:p>
+        </p:txBody>
+      </p:sp>
+      <p:pic>
+        <p:nvPicPr>
+          <p:cNvPr id="15" name="Picture 14">
+            <a:extLst>
+              <a:ext uri="{FF2B5EF4-FFF2-40B4-BE49-F238E27FC236}">
+                <a16:creationId xmlns:a16="http://schemas.microsoft.com/office/drawing/2014/main" id="{A4C4F977-CDDE-402E-B4F0-84B5572E77C3}"/>
+              </a:ext>
+            </a:extLst>
+          </p:cNvPr>
+          <p:cNvPicPr>
+            <a:picLocks noGrp="1" noRot="1" noChangeAspect="1" noMove="1" noResize="1" noEditPoints="1" noAdjustHandles="1" noChangeArrowheads="1" noChangeShapeType="1" noCrop="1"/>
+          </p:cNvPicPr>
+          <p:nvPr>
+            <p:extLst>
+              <p:ext uri="{386F3935-93C4-4BCD-93E2-E3B085C9AB24}">
+                <p16:designElem xmlns:p16="http://schemas.microsoft.com/office/powerpoint/2015/main" val="1"/>
+              </p:ext>
+            </p:extLst>
+          </p:nvPr>
+        </p:nvPicPr>
+        <p:blipFill>
+          <a:blip r:embed="rId2">
+            <a:extLst>
+              <a:ext uri="{28A0092B-C50C-407E-A947-70E740481C1C}">
+                <a14:useLocalDpi xmlns:a14="http://schemas.microsoft.com/office/drawing/2010/main" val="0"/>
+              </a:ext>
+            </a:extLst>
+          </a:blip>
+          <a:stretch>
+            <a:fillRect/>
+          </a:stretch>
+        </p:blipFill>
+        <p:spPr>
+          <a:xfrm>
+            <a:off x="0" y="0"/>
+            <a:ext cx="12192000" cy="1441450"/>
+          </a:xfrm>
+          <a:prstGeom prst="rect">
+            <a:avLst/>
+          </a:prstGeom>
+        </p:spPr>
+      </p:pic>
+      <p:pic>
+        <p:nvPicPr>
+          <p:cNvPr id="8" name="Content Placeholder 4">
+            <a:extLst>
+              <a:ext uri="{FF2B5EF4-FFF2-40B4-BE49-F238E27FC236}">
+                <a16:creationId xmlns:a16="http://schemas.microsoft.com/office/drawing/2014/main" id="{0E7C4968-CE98-3C4B-9322-430ED3092106}"/>
+              </a:ext>
+            </a:extLst>
+          </p:cNvPr>
+          <p:cNvPicPr>
+            <a:picLocks noChangeAspect="1"/>
+          </p:cNvPicPr>
+          <p:nvPr/>
+        </p:nvPicPr>
+        <p:blipFill>
+          <a:blip r:embed="rId3"/>
+          <a:stretch>
+            <a:fillRect/>
+          </a:stretch>
+        </p:blipFill>
+        <p:spPr>
+          <a:xfrm>
+            <a:off x="4972699" y="1277349"/>
+            <a:ext cx="6533501" cy="4410112"/>
+          </a:xfrm>
+          <a:prstGeom prst="rect">
+            <a:avLst/>
+          </a:prstGeom>
+        </p:spPr>
+      </p:pic>
+      <p:sp>
+        <p:nvSpPr>
+          <p:cNvPr id="2" name="Title 1">
+            <a:extLst>
+              <a:ext uri="{FF2B5EF4-FFF2-40B4-BE49-F238E27FC236}">
+                <a16:creationId xmlns:a16="http://schemas.microsoft.com/office/drawing/2014/main" id="{FC64A151-C42E-214C-A35F-51C0FC4F325E}"/>
+              </a:ext>
+            </a:extLst>
+          </p:cNvPr>
+          <p:cNvSpPr>
+            <a:spLocks noGrp="1"/>
+          </p:cNvSpPr>
+          <p:nvPr>
+            <p:ph type="title"/>
+          </p:nvPr>
+        </p:nvSpPr>
+        <p:spPr>
+          <a:xfrm>
+            <a:off x="685799" y="764373"/>
+            <a:ext cx="3977639" cy="1600200"/>
+          </a:xfrm>
+        </p:spPr>
+        <p:txBody>
+          <a:bodyPr anchor="b">
+            <a:normAutofit/>
+          </a:bodyPr>
+          <a:lstStyle/>
+          <a:p>
+            <a:pPr algn="l"/>
+            <a:r>
+              <a:rPr lang="en-US" dirty="0">
+                <a:solidFill>
+                  <a:srgbClr val="0D009F"/>
+                </a:solidFill>
+              </a:rPr>
+              <a:t>Collector</a:t>
+            </a:r>
+          </a:p>
+        </p:txBody>
+      </p:sp>
+      <p:sp>
+        <p:nvSpPr>
+          <p:cNvPr id="10" name="Content Placeholder 9">
+            <a:extLst>
+              <a:ext uri="{FF2B5EF4-FFF2-40B4-BE49-F238E27FC236}">
+                <a16:creationId xmlns:a16="http://schemas.microsoft.com/office/drawing/2014/main" id="{FD86C557-A65B-4848-9559-2DF1CA60BEF3}"/>
+              </a:ext>
+            </a:extLst>
+          </p:cNvPr>
+          <p:cNvSpPr>
+            <a:spLocks noGrp="1"/>
+          </p:cNvSpPr>
+          <p:nvPr>
+            <p:ph idx="1"/>
+          </p:nvPr>
+        </p:nvSpPr>
+        <p:spPr>
+          <a:xfrm>
+            <a:off x="685799" y="2464935"/>
+            <a:ext cx="3977639" cy="3854112"/>
+          </a:xfrm>
+        </p:spPr>
+        <p:txBody>
+          <a:bodyPr>
+            <a:normAutofit lnSpcReduction="10000"/>
+          </a:bodyPr>
+          <a:lstStyle/>
+          <a:p>
+            <a:r>
+              <a:rPr lang="en-US" sz="2400" dirty="0"/>
+              <a:t>Defines a mutable reduction operation for a stream</a:t>
+            </a:r>
+          </a:p>
+          <a:p>
+            <a:r>
+              <a:rPr lang="en-US" sz="2400" dirty="0"/>
+              <a:t>Functionality derived from 4 main functions</a:t>
+            </a:r>
+          </a:p>
+          <a:p>
+            <a:r>
+              <a:rPr lang="en-US" sz="2400" dirty="0"/>
+              <a:t>Main reduction operation for parallel streams</a:t>
+            </a:r>
+          </a:p>
+          <a:p>
+            <a:r>
+              <a:rPr lang="en-US" sz="2400" dirty="0"/>
+              <a:t>Contains same characteristics as Spliterator</a:t>
+            </a:r>
+          </a:p>
+        </p:txBody>
+      </p:sp>
+    </p:spTree>
+    <p:extLst>
+      <p:ext uri="{BB962C8B-B14F-4D97-AF65-F5344CB8AC3E}">
+        <p14:creationId xmlns:p14="http://schemas.microsoft.com/office/powerpoint/2010/main" val="3207144312"/>
+      </p:ext>
+    </p:extLst>
+  </p:cSld>
+  <p:clrMapOvr>
+    <a:masterClrMapping/>
+  </p:clrMapOvr>
+</p:sld>
+</file>
+
+<file path=ppt/slides/slide7.xml><?xml version="1.0" encoding="utf-8"?>
 <p:sld xmlns:a="http://schemas.openxmlformats.org/drawingml/2006/main" xmlns:r="http://schemas.openxmlformats.org/officeDocument/2006/relationships" xmlns:p="http://schemas.openxmlformats.org/presentationml/2006/main">
   <p:cSld>
     <p:spTree>
@@ -6126,7 +8212,7 @@
           <p:cNvPr id="2" name="Title 1">
             <a:extLst>
               <a:ext uri="{FF2B5EF4-FFF2-40B4-BE49-F238E27FC236}">
-                <a16:creationId xmlns:a16="http://schemas.microsoft.com/office/drawing/2014/main" id="{FC64A151-C42E-214C-A35F-51C0FC4F325E}"/>
+                <a16:creationId xmlns:a16="http://schemas.microsoft.com/office/drawing/2014/main" id="{DD7E1C04-0460-E645-AA08-45BDCAA2C457}"/>
               </a:ext>
             </a:extLst>
           </p:cNvPr>
@@ -6137,47 +8223,185 @@
             <p:ph type="title"/>
           </p:nvPr>
         </p:nvSpPr>
-        <p:spPr/>
+        <p:spPr>
+          <a:xfrm>
+            <a:off x="2159619" y="284869"/>
+            <a:ext cx="8610600" cy="1633139"/>
+          </a:xfrm>
+        </p:spPr>
         <p:txBody>
           <a:bodyPr/>
           <a:lstStyle/>
           <a:p>
             <a:r>
+              <a:rPr lang="en-US" dirty="0">
+                <a:solidFill>
+                  <a:srgbClr val="0D009F"/>
+                </a:solidFill>
+              </a:rPr>
+              <a:t>Collector</a:t>
+            </a:r>
+            <a:br>
               <a:rPr lang="en-US" dirty="0"/>
-              <a:t>Collector</a:t>
-            </a:r>
-          </a:p>
-        </p:txBody>
-      </p:sp>
-      <p:sp>
-        <p:nvSpPr>
-          <p:cNvPr id="3" name="Content Placeholder 2">
+            </a:br>
+            <a:r>
+              <a:rPr lang="en-US" dirty="0">
+                <a:solidFill>
+                  <a:srgbClr val="FF32B4"/>
+                </a:solidFill>
+              </a:rPr>
+              <a:t>Continued</a:t>
+            </a:r>
+          </a:p>
+        </p:txBody>
+      </p:sp>
+      <p:pic>
+        <p:nvPicPr>
+          <p:cNvPr id="7" name="Picture 6">
             <a:extLst>
               <a:ext uri="{FF2B5EF4-FFF2-40B4-BE49-F238E27FC236}">
-                <a16:creationId xmlns:a16="http://schemas.microsoft.com/office/drawing/2014/main" id="{AF2376AD-6C79-734B-BD98-11F5BFE14E8D}"/>
+                <a16:creationId xmlns:a16="http://schemas.microsoft.com/office/drawing/2014/main" id="{B9EB1BE8-7B2F-274D-96C4-A41FF1D82B2E}"/>
               </a:ext>
             </a:extLst>
           </p:cNvPr>
-          <p:cNvSpPr>
-            <a:spLocks noGrp="1"/>
-          </p:cNvSpPr>
-          <p:nvPr>
-            <p:ph idx="1"/>
-          </p:nvPr>
-        </p:nvSpPr>
-        <p:spPr/>
-        <p:txBody>
-          <a:bodyPr/>
-          <a:lstStyle/>
-          <a:p>
-            <a:endParaRPr lang="en-US" dirty="0"/>
-          </a:p>
-        </p:txBody>
-      </p:sp>
+          <p:cNvPicPr>
+            <a:picLocks noChangeAspect="1"/>
+          </p:cNvPicPr>
+          <p:nvPr/>
+        </p:nvPicPr>
+        <p:blipFill>
+          <a:blip r:embed="rId2"/>
+          <a:stretch>
+            <a:fillRect/>
+          </a:stretch>
+        </p:blipFill>
+        <p:spPr>
+          <a:xfrm>
+            <a:off x="7137723" y="5600214"/>
+            <a:ext cx="4914900" cy="1066800"/>
+          </a:xfrm>
+          <a:prstGeom prst="rect">
+            <a:avLst/>
+          </a:prstGeom>
+        </p:spPr>
+      </p:pic>
+      <p:cxnSp>
+        <p:nvCxnSpPr>
+          <p:cNvPr id="9" name="Straight Arrow Connector 8">
+            <a:extLst>
+              <a:ext uri="{FF2B5EF4-FFF2-40B4-BE49-F238E27FC236}">
+                <a16:creationId xmlns:a16="http://schemas.microsoft.com/office/drawing/2014/main" id="{6980298C-C200-A84B-AAAA-2A314CDE113F}"/>
+              </a:ext>
+            </a:extLst>
+          </p:cNvPr>
+          <p:cNvCxnSpPr>
+            <a:cxnSpLocks/>
+          </p:cNvCxnSpPr>
+          <p:nvPr/>
+        </p:nvCxnSpPr>
+        <p:spPr>
+          <a:xfrm>
+            <a:off x="5515395" y="4487476"/>
+            <a:ext cx="1464139" cy="1112738"/>
+          </a:xfrm>
+          <a:prstGeom prst="straightConnector1">
+            <a:avLst/>
+          </a:prstGeom>
+          <a:ln>
+            <a:solidFill>
+              <a:srgbClr val="FF32B4"/>
+            </a:solidFill>
+            <a:tailEnd type="triangle"/>
+          </a:ln>
+        </p:spPr>
+        <p:style>
+          <a:lnRef idx="1">
+            <a:schemeClr val="accent1"/>
+          </a:lnRef>
+          <a:fillRef idx="0">
+            <a:schemeClr val="accent1"/>
+          </a:fillRef>
+          <a:effectRef idx="0">
+            <a:schemeClr val="accent1"/>
+          </a:effectRef>
+          <a:fontRef idx="minor">
+            <a:schemeClr val="tx1"/>
+          </a:fontRef>
+        </p:style>
+      </p:cxnSp>
+      <p:sp>
+        <p:nvSpPr>
+          <p:cNvPr id="10" name="TextBox 9">
+            <a:extLst>
+              <a:ext uri="{FF2B5EF4-FFF2-40B4-BE49-F238E27FC236}">
+                <a16:creationId xmlns:a16="http://schemas.microsoft.com/office/drawing/2014/main" id="{80A4A8B0-AC2E-524A-B302-981FEC5D6C1D}"/>
+              </a:ext>
+            </a:extLst>
+          </p:cNvPr>
+          <p:cNvSpPr txBox="1"/>
+          <p:nvPr/>
+        </p:nvSpPr>
+        <p:spPr>
+          <a:xfrm>
+            <a:off x="4566271" y="5235793"/>
+            <a:ext cx="1898248" cy="923330"/>
+          </a:xfrm>
+          <a:prstGeom prst="rect">
+            <a:avLst/>
+          </a:prstGeom>
+          <a:noFill/>
+        </p:spPr>
+        <p:txBody>
+          <a:bodyPr wrap="square" rtlCol="0">
+            <a:spAutoFit/>
+          </a:bodyPr>
+          <a:lstStyle/>
+          <a:p>
+            <a:r>
+              <a:rPr lang="en-US" dirty="0">
+                <a:solidFill>
+                  <a:srgbClr val="FF32B4"/>
+                </a:solidFill>
+              </a:rPr>
+              <a:t>Run on 26,000 Employee array</a:t>
+            </a:r>
+          </a:p>
+        </p:txBody>
+      </p:sp>
+      <p:pic>
+        <p:nvPicPr>
+          <p:cNvPr id="17" name="Picture 16">
+            <a:extLst>
+              <a:ext uri="{FF2B5EF4-FFF2-40B4-BE49-F238E27FC236}">
+                <a16:creationId xmlns:a16="http://schemas.microsoft.com/office/drawing/2014/main" id="{2817710E-7F87-D045-998A-2BA6696610A4}"/>
+              </a:ext>
+            </a:extLst>
+          </p:cNvPr>
+          <p:cNvPicPr>
+            <a:picLocks noChangeAspect="1"/>
+          </p:cNvPicPr>
+          <p:nvPr/>
+        </p:nvPicPr>
+        <p:blipFill>
+          <a:blip r:embed="rId3"/>
+          <a:stretch>
+            <a:fillRect/>
+          </a:stretch>
+        </p:blipFill>
+        <p:spPr>
+          <a:xfrm>
+            <a:off x="166708" y="1566476"/>
+            <a:ext cx="5816600" cy="2921000"/>
+          </a:xfrm>
+          <a:prstGeom prst="rect">
+            <a:avLst/>
+          </a:prstGeom>
+        </p:spPr>
+      </p:pic>
     </p:spTree>
     <p:extLst>
       <p:ext uri="{BB962C8B-B14F-4D97-AF65-F5344CB8AC3E}">
-        <p14:creationId xmlns:p14="http://schemas.microsoft.com/office/powerpoint/2010/main" val="3207144312"/>
+        <p14:creationId xmlns:p14="http://schemas.microsoft.com/office/powerpoint/2010/main" val="1675373992"/>
       </p:ext>
     </p:extLst>
   </p:cSld>
@@ -6187,7 +8411,7 @@
 </p:sld>
 </file>
 
-<file path=ppt/slides/slide4.xml><?xml version="1.0" encoding="utf-8"?>
+<file path=ppt/slides/slide8.xml><?xml version="1.0" encoding="utf-8"?>
 <p:sld xmlns:a="http://schemas.openxmlformats.org/drawingml/2006/main" xmlns:r="http://schemas.openxmlformats.org/officeDocument/2006/relationships" xmlns:p="http://schemas.openxmlformats.org/presentationml/2006/main">
   <p:cSld>
     <p:spTree>
@@ -6220,24 +8444,79 @@
             <p:ph type="title"/>
           </p:nvPr>
         </p:nvSpPr>
-        <p:spPr/>
-        <p:txBody>
-          <a:bodyPr/>
-          <a:lstStyle/>
-          <a:p>
-            <a:endParaRPr lang="en-US"/>
-          </a:p>
-        </p:txBody>
-      </p:sp>
-      <p:sp>
-        <p:nvSpPr>
-          <p:cNvPr id="3" name="Content Placeholder 2">
+        <p:spPr>
+          <a:xfrm>
+            <a:off x="3424912" y="429836"/>
+            <a:ext cx="8294648" cy="1733500"/>
+          </a:xfrm>
+        </p:spPr>
+        <p:txBody>
+          <a:bodyPr>
+            <a:normAutofit fontScale="90000"/>
+          </a:bodyPr>
+          <a:lstStyle/>
+          <a:p>
+            <a:r>
+              <a:rPr lang="en-US" dirty="0">
+                <a:solidFill>
+                  <a:srgbClr val="0D009F"/>
+                </a:solidFill>
+              </a:rPr>
+              <a:t>Practical Considerations </a:t>
+            </a:r>
+            <a:r>
+              <a:rPr lang="en-US" dirty="0">
+                <a:solidFill>
+                  <a:srgbClr val="FF32B4"/>
+                </a:solidFill>
+              </a:rPr>
+              <a:t>Long-Running/Blocking operations</a:t>
+            </a:r>
+          </a:p>
+        </p:txBody>
+      </p:sp>
+      <p:pic>
+        <p:nvPicPr>
+          <p:cNvPr id="14" name="Picture 13">
             <a:extLst>
               <a:ext uri="{FF2B5EF4-FFF2-40B4-BE49-F238E27FC236}">
-                <a16:creationId xmlns:a16="http://schemas.microsoft.com/office/drawing/2014/main" id="{63707592-2BBC-A241-8CD5-A6FA25C0B03B}"/>
+                <a16:creationId xmlns:a16="http://schemas.microsoft.com/office/drawing/2014/main" id="{DBB821A3-96B2-7348-98B5-F79F0C94745F}"/>
               </a:ext>
             </a:extLst>
           </p:cNvPr>
+          <p:cNvPicPr>
+            <a:picLocks noChangeAspect="1"/>
+          </p:cNvPicPr>
+          <p:nvPr/>
+        </p:nvPicPr>
+        <p:blipFill>
+          <a:blip r:embed="rId3"/>
+          <a:stretch>
+            <a:fillRect/>
+          </a:stretch>
+        </p:blipFill>
+        <p:spPr>
+          <a:xfrm>
+            <a:off x="7358875" y="3427762"/>
+            <a:ext cx="4360685" cy="1283589"/>
+          </a:xfrm>
+          <a:prstGeom prst="rect">
+            <a:avLst/>
+          </a:prstGeom>
+          <a:ln>
+            <a:noFill/>
+          </a:ln>
+        </p:spPr>
+      </p:pic>
+      <p:sp>
+        <p:nvSpPr>
+          <p:cNvPr id="4" name="Content Placeholder 3">
+            <a:extLst>
+              <a:ext uri="{FF2B5EF4-FFF2-40B4-BE49-F238E27FC236}">
+                <a16:creationId xmlns:a16="http://schemas.microsoft.com/office/drawing/2014/main" id="{E889ABFB-6A0B-E74A-8A9E-1D0D6D73B6F0}"/>
+              </a:ext>
+            </a:extLst>
+          </p:cNvPr>
           <p:cNvSpPr>
             <a:spLocks noGrp="1"/>
           </p:cNvSpPr>
@@ -6250,7 +8529,10 @@
           <a:bodyPr/>
           <a:lstStyle/>
           <a:p>
-            <a:endParaRPr lang="en-US"/>
+            <a:r>
+              <a:rPr lang="en-US" dirty="0"/>
+              <a:t>Make code example more succinct</a:t>
+            </a:r>
           </a:p>
         </p:txBody>
       </p:sp>
@@ -6258,6 +8540,111 @@
     <p:extLst>
       <p:ext uri="{BB962C8B-B14F-4D97-AF65-F5344CB8AC3E}">
         <p14:creationId xmlns:p14="http://schemas.microsoft.com/office/powerpoint/2010/main" val="1285649568"/>
+      </p:ext>
+    </p:extLst>
+  </p:cSld>
+  <p:clrMapOvr>
+    <a:masterClrMapping/>
+  </p:clrMapOvr>
+</p:sld>
+</file>
+
+<file path=ppt/slides/slide9.xml><?xml version="1.0" encoding="utf-8"?>
+<p:sld xmlns:a="http://schemas.openxmlformats.org/drawingml/2006/main" xmlns:r="http://schemas.openxmlformats.org/officeDocument/2006/relationships" xmlns:p="http://schemas.openxmlformats.org/presentationml/2006/main">
+  <p:cSld>
+    <p:spTree>
+      <p:nvGrpSpPr>
+        <p:cNvPr id="1" name=""/>
+        <p:cNvGrpSpPr/>
+        <p:nvPr/>
+      </p:nvGrpSpPr>
+      <p:grpSpPr>
+        <a:xfrm>
+          <a:off x="0" y="0"/>
+          <a:ext cx="0" cy="0"/>
+          <a:chOff x="0" y="0"/>
+          <a:chExt cx="0" cy="0"/>
+        </a:xfrm>
+      </p:grpSpPr>
+      <p:sp>
+        <p:nvSpPr>
+          <p:cNvPr id="3" name="Content Placeholder 2">
+            <a:extLst>
+              <a:ext uri="{FF2B5EF4-FFF2-40B4-BE49-F238E27FC236}">
+                <a16:creationId xmlns:a16="http://schemas.microsoft.com/office/drawing/2014/main" id="{F825007E-9610-794C-A4FA-CC0B330916B2}"/>
+              </a:ext>
+            </a:extLst>
+          </p:cNvPr>
+          <p:cNvSpPr>
+            <a:spLocks noGrp="1"/>
+          </p:cNvSpPr>
+          <p:nvPr>
+            <p:ph idx="1"/>
+          </p:nvPr>
+        </p:nvSpPr>
+        <p:spPr/>
+        <p:txBody>
+          <a:bodyPr/>
+          <a:lstStyle/>
+          <a:p>
+            <a:r>
+              <a:rPr lang="en-US" dirty="0"/>
+              <a:t>ADD EXPLANATION OF INTERFERENCE AND CODE EXAMPLE</a:t>
+            </a:r>
+          </a:p>
+        </p:txBody>
+      </p:sp>
+      <p:sp>
+        <p:nvSpPr>
+          <p:cNvPr id="8" name="Title 1">
+            <a:extLst>
+              <a:ext uri="{FF2B5EF4-FFF2-40B4-BE49-F238E27FC236}">
+                <a16:creationId xmlns:a16="http://schemas.microsoft.com/office/drawing/2014/main" id="{F3BDA1AF-0761-244D-97B6-8F65627BDC6F}"/>
+              </a:ext>
+            </a:extLst>
+          </p:cNvPr>
+          <p:cNvSpPr>
+            <a:spLocks noGrp="1"/>
+          </p:cNvSpPr>
+          <p:nvPr>
+            <p:ph type="title"/>
+          </p:nvPr>
+        </p:nvSpPr>
+        <p:spPr>
+          <a:xfrm>
+            <a:off x="3402610" y="217962"/>
+            <a:ext cx="8294648" cy="1733500"/>
+          </a:xfrm>
+        </p:spPr>
+        <p:txBody>
+          <a:bodyPr>
+            <a:noAutofit/>
+          </a:bodyPr>
+          <a:lstStyle/>
+          <a:p>
+            <a:r>
+              <a:rPr lang="en-US" sz="3600" dirty="0">
+                <a:solidFill>
+                  <a:srgbClr val="0D009F"/>
+                </a:solidFill>
+              </a:rPr>
+              <a:t>Practical Considerations </a:t>
+            </a:r>
+            <a:r>
+              <a:rPr lang="en-US" sz="3600" dirty="0">
+                <a:solidFill>
+                  <a:srgbClr val="FF32B4"/>
+                </a:solidFill>
+              </a:rPr>
+              <a:t> interference</a:t>
+            </a:r>
+          </a:p>
+        </p:txBody>
+      </p:sp>
+    </p:spTree>
+    <p:extLst>
+      <p:ext uri="{BB962C8B-B14F-4D97-AF65-F5344CB8AC3E}">
+        <p14:creationId xmlns:p14="http://schemas.microsoft.com/office/powerpoint/2010/main" val="196559877"/>
       </p:ext>
     </p:extLst>
   </p:cSld>
@@ -6535,4 +8922,299 @@
     </a:ext>
   </a:extLst>
 </a:theme>
+</file>
+
+<file path=ppt/theme/theme2.xml><?xml version="1.0" encoding="utf-8"?>
+<a:theme xmlns:a="http://schemas.openxmlformats.org/drawingml/2006/main" name="Office Theme">
+  <a:themeElements>
+    <a:clrScheme name="Office">
+      <a:dk1>
+        <a:sysClr val="windowText" lastClr="000000"/>
+      </a:dk1>
+      <a:lt1>
+        <a:sysClr val="window" lastClr="FFFFFF"/>
+      </a:lt1>
+      <a:dk2>
+        <a:srgbClr val="44546A"/>
+      </a:dk2>
+      <a:lt2>
+        <a:srgbClr val="E7E6E6"/>
+      </a:lt2>
+      <a:accent1>
+        <a:srgbClr val="4472C4"/>
+      </a:accent1>
+      <a:accent2>
+        <a:srgbClr val="ED7D31"/>
+      </a:accent2>
+      <a:accent3>
+        <a:srgbClr val="A5A5A5"/>
+      </a:accent3>
+      <a:accent4>
+        <a:srgbClr val="FFC000"/>
+      </a:accent4>
+      <a:accent5>
+        <a:srgbClr val="5B9BD5"/>
+      </a:accent5>
+      <a:accent6>
+        <a:srgbClr val="70AD47"/>
+      </a:accent6>
+      <a:hlink>
+        <a:srgbClr val="0563C1"/>
+      </a:hlink>
+      <a:folHlink>
+        <a:srgbClr val="954F72"/>
+      </a:folHlink>
+    </a:clrScheme>
+    <a:fontScheme name="Office">
+      <a:majorFont>
+        <a:latin typeface="Calibri Light" panose="020F0302020204030204"/>
+        <a:ea typeface=""/>
+        <a:cs typeface=""/>
+        <a:font script="Jpan" typeface="游ゴシック Light"/>
+        <a:font script="Hang" typeface="맑은 고딕"/>
+        <a:font script="Hans" typeface="等线 Light"/>
+        <a:font script="Hant" typeface="新細明體"/>
+        <a:font script="Arab" typeface="Times New Roman"/>
+        <a:font script="Hebr" typeface="Times New Roman"/>
+        <a:font script="Thai" typeface="Angsana New"/>
+        <a:font script="Ethi" typeface="Nyala"/>
+        <a:font script="Beng" typeface="Vrinda"/>
+        <a:font script="Gujr" typeface="Shruti"/>
+        <a:font script="Khmr" typeface="MoolBoran"/>
+        <a:font script="Knda" typeface="Tunga"/>
+        <a:font script="Guru" typeface="Raavi"/>
+        <a:font script="Cans" typeface="Euphemia"/>
+        <a:font script="Cher" typeface="Plantagenet Cherokee"/>
+        <a:font script="Yiii" typeface="Microsoft Yi Baiti"/>
+        <a:font script="Tibt" typeface="Microsoft Himalaya"/>
+        <a:font script="Thaa" typeface="MV Boli"/>
+        <a:font script="Deva" typeface="Mangal"/>
+        <a:font script="Telu" typeface="Gautami"/>
+        <a:font script="Taml" typeface="Latha"/>
+        <a:font script="Syrc" typeface="Estrangelo Edessa"/>
+        <a:font script="Orya" typeface="Kalinga"/>
+        <a:font script="Mlym" typeface="Kartika"/>
+        <a:font script="Laoo" typeface="DokChampa"/>
+        <a:font script="Sinh" typeface="Iskoola Pota"/>
+        <a:font script="Mong" typeface="Mongolian Baiti"/>
+        <a:font script="Viet" typeface="Times New Roman"/>
+        <a:font script="Uigh" typeface="Microsoft Uighur"/>
+        <a:font script="Geor" typeface="Sylfaen"/>
+        <a:font script="Armn" typeface="Arial"/>
+        <a:font script="Bugi" typeface="Leelawadee UI"/>
+        <a:font script="Bopo" typeface="Microsoft JhengHei"/>
+        <a:font script="Java" typeface="Javanese Text"/>
+        <a:font script="Lisu" typeface="Segoe UI"/>
+        <a:font script="Mymr" typeface="Myanmar Text"/>
+        <a:font script="Nkoo" typeface="Ebrima"/>
+        <a:font script="Olck" typeface="Nirmala UI"/>
+        <a:font script="Osma" typeface="Ebrima"/>
+        <a:font script="Phag" typeface="Phagspa"/>
+        <a:font script="Syrn" typeface="Estrangelo Edessa"/>
+        <a:font script="Syrj" typeface="Estrangelo Edessa"/>
+        <a:font script="Syre" typeface="Estrangelo Edessa"/>
+        <a:font script="Sora" typeface="Nirmala UI"/>
+        <a:font script="Tale" typeface="Microsoft Tai Le"/>
+        <a:font script="Talu" typeface="Microsoft New Tai Lue"/>
+        <a:font script="Tfng" typeface="Ebrima"/>
+      </a:majorFont>
+      <a:minorFont>
+        <a:latin typeface="Calibri" panose="020F0502020204030204"/>
+        <a:ea typeface=""/>
+        <a:cs typeface=""/>
+        <a:font script="Jpan" typeface="游ゴシック"/>
+        <a:font script="Hang" typeface="맑은 고딕"/>
+        <a:font script="Hans" typeface="等线"/>
+        <a:font script="Hant" typeface="新細明體"/>
+        <a:font script="Arab" typeface="Arial"/>
+        <a:font script="Hebr" typeface="Arial"/>
+        <a:font script="Thai" typeface="Cordia New"/>
+        <a:font script="Ethi" typeface="Nyala"/>
+        <a:font script="Beng" typeface="Vrinda"/>
+        <a:font script="Gujr" typeface="Shruti"/>
+        <a:font script="Khmr" typeface="DaunPenh"/>
+        <a:font script="Knda" typeface="Tunga"/>
+        <a:font script="Guru" typeface="Raavi"/>
+        <a:font script="Cans" typeface="Euphemia"/>
+        <a:font script="Cher" typeface="Plantagenet Cherokee"/>
+        <a:font script="Yiii" typeface="Microsoft Yi Baiti"/>
+        <a:font script="Tibt" typeface="Microsoft Himalaya"/>
+        <a:font script="Thaa" typeface="MV Boli"/>
+        <a:font script="Deva" typeface="Mangal"/>
+        <a:font script="Telu" typeface="Gautami"/>
+        <a:font script="Taml" typeface="Latha"/>
+        <a:font script="Syrc" typeface="Estrangelo Edessa"/>
+        <a:font script="Orya" typeface="Kalinga"/>
+        <a:font script="Mlym" typeface="Kartika"/>
+        <a:font script="Laoo" typeface="DokChampa"/>
+        <a:font script="Sinh" typeface="Iskoola Pota"/>
+        <a:font script="Mong" typeface="Mongolian Baiti"/>
+        <a:font script="Viet" typeface="Arial"/>
+        <a:font script="Uigh" typeface="Microsoft Uighur"/>
+        <a:font script="Geor" typeface="Sylfaen"/>
+        <a:font script="Armn" typeface="Arial"/>
+        <a:font script="Bugi" typeface="Leelawadee UI"/>
+        <a:font script="Bopo" typeface="Microsoft JhengHei"/>
+        <a:font script="Java" typeface="Javanese Text"/>
+        <a:font script="Lisu" typeface="Segoe UI"/>
+        <a:font script="Mymr" typeface="Myanmar Text"/>
+        <a:font script="Nkoo" typeface="Ebrima"/>
+        <a:font script="Olck" typeface="Nirmala UI"/>
+        <a:font script="Osma" typeface="Ebrima"/>
+        <a:font script="Phag" typeface="Phagspa"/>
+        <a:font script="Syrn" typeface="Estrangelo Edessa"/>
+        <a:font script="Syrj" typeface="Estrangelo Edessa"/>
+        <a:font script="Syre" typeface="Estrangelo Edessa"/>
+        <a:font script="Sora" typeface="Nirmala UI"/>
+        <a:font script="Tale" typeface="Microsoft Tai Le"/>
+        <a:font script="Talu" typeface="Microsoft New Tai Lue"/>
+        <a:font script="Tfng" typeface="Ebrima"/>
+      </a:minorFont>
+    </a:fontScheme>
+    <a:fmtScheme name="Office">
+      <a:fillStyleLst>
+        <a:solidFill>
+          <a:schemeClr val="phClr"/>
+        </a:solidFill>
+        <a:gradFill rotWithShape="1">
+          <a:gsLst>
+            <a:gs pos="0">
+              <a:schemeClr val="phClr">
+                <a:lumMod val="110000"/>
+                <a:satMod val="105000"/>
+                <a:tint val="67000"/>
+              </a:schemeClr>
+            </a:gs>
+            <a:gs pos="50000">
+              <a:schemeClr val="phClr">
+                <a:lumMod val="105000"/>
+                <a:satMod val="103000"/>
+                <a:tint val="73000"/>
+              </a:schemeClr>
+            </a:gs>
+            <a:gs pos="100000">
+              <a:schemeClr val="phClr">
+                <a:lumMod val="105000"/>
+                <a:satMod val="109000"/>
+                <a:tint val="81000"/>
+              </a:schemeClr>
+            </a:gs>
+          </a:gsLst>
+          <a:lin ang="5400000" scaled="0"/>
+        </a:gradFill>
+        <a:gradFill rotWithShape="1">
+          <a:gsLst>
+            <a:gs pos="0">
+              <a:schemeClr val="phClr">
+                <a:satMod val="103000"/>
+                <a:lumMod val="102000"/>
+                <a:tint val="94000"/>
+              </a:schemeClr>
+            </a:gs>
+            <a:gs pos="50000">
+              <a:schemeClr val="phClr">
+                <a:satMod val="110000"/>
+                <a:lumMod val="100000"/>
+                <a:shade val="100000"/>
+              </a:schemeClr>
+            </a:gs>
+            <a:gs pos="100000">
+              <a:schemeClr val="phClr">
+                <a:lumMod val="99000"/>
+                <a:satMod val="120000"/>
+                <a:shade val="78000"/>
+              </a:schemeClr>
+            </a:gs>
+          </a:gsLst>
+          <a:lin ang="5400000" scaled="0"/>
+        </a:gradFill>
+      </a:fillStyleLst>
+      <a:lnStyleLst>
+        <a:ln w="6350" cap="flat" cmpd="sng" algn="ctr">
+          <a:solidFill>
+            <a:schemeClr val="phClr"/>
+          </a:solidFill>
+          <a:prstDash val="solid"/>
+          <a:miter lim="800000"/>
+        </a:ln>
+        <a:ln w="12700" cap="flat" cmpd="sng" algn="ctr">
+          <a:solidFill>
+            <a:schemeClr val="phClr"/>
+          </a:solidFill>
+          <a:prstDash val="solid"/>
+          <a:miter lim="800000"/>
+        </a:ln>
+        <a:ln w="19050" cap="flat" cmpd="sng" algn="ctr">
+          <a:solidFill>
+            <a:schemeClr val="phClr"/>
+          </a:solidFill>
+          <a:prstDash val="solid"/>
+          <a:miter lim="800000"/>
+        </a:ln>
+      </a:lnStyleLst>
+      <a:effectStyleLst>
+        <a:effectStyle>
+          <a:effectLst/>
+        </a:effectStyle>
+        <a:effectStyle>
+          <a:effectLst/>
+        </a:effectStyle>
+        <a:effectStyle>
+          <a:effectLst>
+            <a:outerShdw blurRad="57150" dist="19050" dir="5400000" algn="ctr" rotWithShape="0">
+              <a:srgbClr val="000000">
+                <a:alpha val="63000"/>
+              </a:srgbClr>
+            </a:outerShdw>
+          </a:effectLst>
+        </a:effectStyle>
+      </a:effectStyleLst>
+      <a:bgFillStyleLst>
+        <a:solidFill>
+          <a:schemeClr val="phClr"/>
+        </a:solidFill>
+        <a:solidFill>
+          <a:schemeClr val="phClr">
+            <a:tint val="95000"/>
+            <a:satMod val="170000"/>
+          </a:schemeClr>
+        </a:solidFill>
+        <a:gradFill rotWithShape="1">
+          <a:gsLst>
+            <a:gs pos="0">
+              <a:schemeClr val="phClr">
+                <a:tint val="93000"/>
+                <a:satMod val="150000"/>
+                <a:shade val="98000"/>
+                <a:lumMod val="102000"/>
+              </a:schemeClr>
+            </a:gs>
+            <a:gs pos="50000">
+              <a:schemeClr val="phClr">
+                <a:tint val="98000"/>
+                <a:satMod val="130000"/>
+                <a:shade val="90000"/>
+                <a:lumMod val="103000"/>
+              </a:schemeClr>
+            </a:gs>
+            <a:gs pos="100000">
+              <a:schemeClr val="phClr">
+                <a:shade val="63000"/>
+                <a:satMod val="120000"/>
+              </a:schemeClr>
+            </a:gs>
+          </a:gsLst>
+          <a:lin ang="5400000" scaled="0"/>
+        </a:gradFill>
+      </a:bgFillStyleLst>
+    </a:fmtScheme>
+  </a:themeElements>
+  <a:objectDefaults/>
+  <a:extraClrSchemeLst/>
+  <a:extLst>
+    <a:ext uri="{05A4C25C-085E-4340-85A3-A5531E510DB2}">
+      <thm15:themeFamily xmlns:thm15="http://schemas.microsoft.com/office/thememl/2012/main" name="Office Theme" id="{62F939B6-93AF-4DB8-9C6B-D6C7DFDC589F}" vid="{4A3C46E8-61CC-4603-A589-7422A47A8E4A}"/>
+    </a:ext>
+  </a:extLst>
+</a:theme>
 </file>
</xml_diff>

<commit_message>
Going to try running benchmarks on od pC
</commit_message>
<xml_diff>
--- a/src/parallel_streams_presentation/p_stream_presentation.pptx
+++ b/src/parallel_streams_presentation/p_stream_presentation.pptx
@@ -5,20 +5,21 @@
     <p:sldMasterId id="2147483687" r:id="rId1"/>
   </p:sldMasterIdLst>
   <p:notesMasterIdLst>
-    <p:notesMasterId r:id="rId13"/>
+    <p:notesMasterId r:id="rId14"/>
   </p:notesMasterIdLst>
   <p:sldIdLst>
     <p:sldId id="256" r:id="rId2"/>
-    <p:sldId id="264" r:id="rId3"/>
-    <p:sldId id="260" r:id="rId4"/>
-    <p:sldId id="257" r:id="rId5"/>
-    <p:sldId id="261" r:id="rId6"/>
-    <p:sldId id="258" r:id="rId7"/>
-    <p:sldId id="265" r:id="rId8"/>
-    <p:sldId id="259" r:id="rId9"/>
-    <p:sldId id="262" r:id="rId10"/>
-    <p:sldId id="263" r:id="rId11"/>
-    <p:sldId id="266" r:id="rId12"/>
+    <p:sldId id="267" r:id="rId3"/>
+    <p:sldId id="264" r:id="rId4"/>
+    <p:sldId id="260" r:id="rId5"/>
+    <p:sldId id="257" r:id="rId6"/>
+    <p:sldId id="261" r:id="rId7"/>
+    <p:sldId id="258" r:id="rId8"/>
+    <p:sldId id="265" r:id="rId9"/>
+    <p:sldId id="259" r:id="rId10"/>
+    <p:sldId id="262" r:id="rId11"/>
+    <p:sldId id="263" r:id="rId12"/>
+    <p:sldId id="266" r:id="rId13"/>
   </p:sldIdLst>
   <p:sldSz cx="12192000" cy="6858000"/>
   <p:notesSz cx="6858000" cy="9144000"/>
@@ -207,7 +208,7 @@
           <a:p>
             <a:fld id="{246D8781-F40A-1048-8D07-8A9EBDE2FB53}" type="datetimeFigureOut">
               <a:rPr lang="en-US" smtClean="0"/>
-              <a:t>2/27/18</a:t>
+              <a:t>2/28/18</a:t>
             </a:fld>
             <a:endParaRPr lang="en-US"/>
           </a:p>
@@ -629,7 +630,7 @@
           <a:p>
             <a:fld id="{B1DBF306-6F9F-5B40-90B5-598FDD091CE2}" type="slidenum">
               <a:rPr lang="en-US" smtClean="0"/>
-              <a:t>2</a:t>
+              <a:t>3</a:t>
             </a:fld>
             <a:endParaRPr lang="en-US"/>
           </a:p>
@@ -748,7 +749,7 @@
           <a:p>
             <a:fld id="{B1DBF306-6F9F-5B40-90B5-598FDD091CE2}" type="slidenum">
               <a:rPr lang="en-US" smtClean="0"/>
-              <a:t>3</a:t>
+              <a:t>4</a:t>
             </a:fld>
             <a:endParaRPr lang="en-US"/>
           </a:p>
@@ -832,7 +833,7 @@
           <a:p>
             <a:fld id="{B1DBF306-6F9F-5B40-90B5-598FDD091CE2}" type="slidenum">
               <a:rPr lang="en-US" smtClean="0"/>
-              <a:t>8</a:t>
+              <a:t>9</a:t>
             </a:fld>
             <a:endParaRPr lang="en-US"/>
           </a:p>
@@ -1021,7 +1022,7 @@
           <a:p>
             <a:fld id="{48A87A34-81AB-432B-8DAE-1953F412C126}" type="datetimeFigureOut">
               <a:rPr lang="en-US" smtClean="0"/>
-              <a:t>2/27/18</a:t>
+              <a:t>2/28/18</a:t>
             </a:fld>
             <a:endParaRPr lang="en-US" dirty="0"/>
           </a:p>
@@ -1288,7 +1289,7 @@
           <a:p>
             <a:fld id="{48A87A34-81AB-432B-8DAE-1953F412C126}" type="datetimeFigureOut">
               <a:rPr lang="en-US" smtClean="0"/>
-              <a:t>2/27/18</a:t>
+              <a:t>2/28/18</a:t>
             </a:fld>
             <a:endParaRPr lang="en-US" dirty="0"/>
           </a:p>
@@ -1520,7 +1521,7 @@
             <a:fld id="{48A87A34-81AB-432B-8DAE-1953F412C126}" type="datetimeFigureOut">
               <a:rPr lang="en-US" smtClean="0"/>
               <a:pPr/>
-              <a:t>2/27/18</a:t>
+              <a:t>2/28/18</a:t>
             </a:fld>
             <a:endParaRPr lang="en-US" dirty="0"/>
           </a:p>
@@ -1831,7 +1832,7 @@
             <a:fld id="{48A87A34-81AB-432B-8DAE-1953F412C126}" type="datetimeFigureOut">
               <a:rPr lang="en-US" smtClean="0"/>
               <a:pPr/>
-              <a:t>2/27/18</a:t>
+              <a:t>2/28/18</a:t>
             </a:fld>
             <a:endParaRPr lang="en-US" dirty="0"/>
           </a:p>
@@ -2305,7 +2306,7 @@
             <a:fld id="{48A87A34-81AB-432B-8DAE-1953F412C126}" type="datetimeFigureOut">
               <a:rPr lang="en-US" smtClean="0"/>
               <a:pPr/>
-              <a:t>2/27/18</a:t>
+              <a:t>2/28/18</a:t>
             </a:fld>
             <a:endParaRPr lang="en-US" dirty="0"/>
           </a:p>
@@ -2852,7 +2853,7 @@
           <a:p>
             <a:fld id="{48A87A34-81AB-432B-8DAE-1953F412C126}" type="datetimeFigureOut">
               <a:rPr lang="en-US" smtClean="0"/>
-              <a:t>2/27/18</a:t>
+              <a:t>2/28/18</a:t>
             </a:fld>
             <a:endParaRPr lang="en-US" dirty="0"/>
           </a:p>
@@ -3626,7 +3627,7 @@
           <a:p>
             <a:fld id="{48A87A34-81AB-432B-8DAE-1953F412C126}" type="datetimeFigureOut">
               <a:rPr lang="en-US" smtClean="0"/>
-              <a:t>2/27/18</a:t>
+              <a:t>2/28/18</a:t>
             </a:fld>
             <a:endParaRPr lang="en-US" dirty="0"/>
           </a:p>
@@ -3801,7 +3802,7 @@
           <a:p>
             <a:fld id="{48A87A34-81AB-432B-8DAE-1953F412C126}" type="datetimeFigureOut">
               <a:rPr lang="en-US" smtClean="0"/>
-              <a:t>2/27/18</a:t>
+              <a:t>2/28/18</a:t>
             </a:fld>
             <a:endParaRPr lang="en-US" dirty="0"/>
           </a:p>
@@ -4025,7 +4026,7 @@
             <a:fld id="{48A87A34-81AB-432B-8DAE-1953F412C126}" type="datetimeFigureOut">
               <a:rPr lang="en-US" smtClean="0"/>
               <a:pPr/>
-              <a:t>2/27/18</a:t>
+              <a:t>2/28/18</a:t>
             </a:fld>
             <a:endParaRPr lang="en-US" dirty="0"/>
           </a:p>
@@ -4205,7 +4206,7 @@
           <a:p>
             <a:fld id="{48A87A34-81AB-432B-8DAE-1953F412C126}" type="datetimeFigureOut">
               <a:rPr lang="en-US" smtClean="0"/>
-              <a:t>2/27/18</a:t>
+              <a:t>2/28/18</a:t>
             </a:fld>
             <a:endParaRPr lang="en-US" dirty="0"/>
           </a:p>
@@ -4495,7 +4496,7 @@
             <a:fld id="{48A87A34-81AB-432B-8DAE-1953F412C126}" type="datetimeFigureOut">
               <a:rPr lang="en-US" smtClean="0"/>
               <a:pPr/>
-              <a:t>2/27/18</a:t>
+              <a:t>2/28/18</a:t>
             </a:fld>
             <a:endParaRPr lang="en-US" dirty="0"/>
           </a:p>
@@ -4737,7 +4738,7 @@
           <a:p>
             <a:fld id="{48A87A34-81AB-432B-8DAE-1953F412C126}" type="datetimeFigureOut">
               <a:rPr lang="en-US" smtClean="0"/>
-              <a:t>2/27/18</a:t>
+              <a:t>2/28/18</a:t>
             </a:fld>
             <a:endParaRPr lang="en-US" dirty="0"/>
           </a:p>
@@ -5116,7 +5117,7 @@
           <a:p>
             <a:fld id="{48A87A34-81AB-432B-8DAE-1953F412C126}" type="datetimeFigureOut">
               <a:rPr lang="en-US" smtClean="0"/>
-              <a:t>2/27/18</a:t>
+              <a:t>2/28/18</a:t>
             </a:fld>
             <a:endParaRPr lang="en-US" dirty="0"/>
           </a:p>
@@ -5234,7 +5235,7 @@
           <a:p>
             <a:fld id="{48A87A34-81AB-432B-8DAE-1953F412C126}" type="datetimeFigureOut">
               <a:rPr lang="en-US" smtClean="0"/>
-              <a:t>2/27/18</a:t>
+              <a:t>2/28/18</a:t>
             </a:fld>
             <a:endParaRPr lang="en-US" dirty="0"/>
           </a:p>
@@ -5329,7 +5330,7 @@
           <a:p>
             <a:fld id="{48A87A34-81AB-432B-8DAE-1953F412C126}" type="datetimeFigureOut">
               <a:rPr lang="en-US" smtClean="0"/>
-              <a:t>2/27/18</a:t>
+              <a:t>2/28/18</a:t>
             </a:fld>
             <a:endParaRPr lang="en-US" dirty="0"/>
           </a:p>
@@ -5578,7 +5579,7 @@
           <a:p>
             <a:fld id="{48A87A34-81AB-432B-8DAE-1953F412C126}" type="datetimeFigureOut">
               <a:rPr lang="en-US" smtClean="0"/>
-              <a:t>2/27/18</a:t>
+              <a:t>2/28/18</a:t>
             </a:fld>
             <a:endParaRPr lang="en-US" dirty="0"/>
           </a:p>
@@ -5835,7 +5836,7 @@
           <a:p>
             <a:fld id="{48A87A34-81AB-432B-8DAE-1953F412C126}" type="datetimeFigureOut">
               <a:rPr lang="en-US" smtClean="0"/>
-              <a:t>2/27/18</a:t>
+              <a:t>2/28/18</a:t>
             </a:fld>
             <a:endParaRPr lang="en-US" dirty="0"/>
           </a:p>
@@ -6079,7 +6080,7 @@
             <a:fld id="{48A87A34-81AB-432B-8DAE-1953F412C126}" type="datetimeFigureOut">
               <a:rPr lang="en-US" smtClean="0"/>
               <a:pPr/>
-              <a:t>2/27/18</a:t>
+              <a:t>2/28/18</a:t>
             </a:fld>
             <a:endParaRPr lang="en-US" dirty="0"/>
           </a:p>
@@ -6587,10 +6588,10 @@
       </p:grpSpPr>
       <p:sp>
         <p:nvSpPr>
-          <p:cNvPr id="3" name="Content Placeholder 2">
+          <p:cNvPr id="8" name="Title 1">
             <a:extLst>
               <a:ext uri="{FF2B5EF4-FFF2-40B4-BE49-F238E27FC236}">
-                <a16:creationId xmlns:a16="http://schemas.microsoft.com/office/drawing/2014/main" id="{F825007E-9610-794C-A4FA-CC0B330916B2}"/>
+                <a16:creationId xmlns:a16="http://schemas.microsoft.com/office/drawing/2014/main" id="{F3BDA1AF-0761-244D-97B6-8F65627BDC6F}"/>
               </a:ext>
             </a:extLst>
           </p:cNvPr>
@@ -6598,34 +6599,6 @@
             <a:spLocks noGrp="1"/>
           </p:cNvSpPr>
           <p:nvPr>
-            <p:ph idx="1"/>
-          </p:nvPr>
-        </p:nvSpPr>
-        <p:spPr/>
-        <p:txBody>
-          <a:bodyPr/>
-          <a:lstStyle/>
-          <a:p>
-            <a:r>
-              <a:rPr lang="en-US" dirty="0"/>
-              <a:t>ADD EXPLANATION OF STATEFUL EXPRESSIONS AND CODE EXAMPLE</a:t>
-            </a:r>
-          </a:p>
-        </p:txBody>
-      </p:sp>
-      <p:sp>
-        <p:nvSpPr>
-          <p:cNvPr id="6" name="Title 1">
-            <a:extLst>
-              <a:ext uri="{FF2B5EF4-FFF2-40B4-BE49-F238E27FC236}">
-                <a16:creationId xmlns:a16="http://schemas.microsoft.com/office/drawing/2014/main" id="{5D2ABDC9-5163-DC4C-AFD9-CFE4FFECDDA5}"/>
-              </a:ext>
-            </a:extLst>
-          </p:cNvPr>
-          <p:cNvSpPr>
-            <a:spLocks noGrp="1"/>
-          </p:cNvSpPr>
-          <p:nvPr>
             <p:ph type="title"/>
           </p:nvPr>
         </p:nvSpPr>
@@ -6642,7 +6615,7 @@
           <a:lstStyle/>
           <a:p>
             <a:r>
-              <a:rPr lang="en-US" sz="3600" dirty="0">
+              <a:rPr lang="en-US" sz="3600">
                 <a:solidFill>
                   <a:srgbClr val="0D009F"/>
                 </a:solidFill>
@@ -6650,36 +6623,85 @@
               <a:t>Practical Considerations </a:t>
             </a:r>
             <a:r>
-              <a:rPr lang="en-US" sz="3600" dirty="0">
+              <a:rPr lang="en-US" sz="3600">
                 <a:solidFill>
                   <a:srgbClr val="FF32B4"/>
                 </a:solidFill>
               </a:rPr>
-              <a:t> </a:t>
-            </a:r>
-            <a:r>
-              <a:rPr lang="en-US" sz="3600" dirty="0" err="1">
-                <a:solidFill>
-                  <a:srgbClr val="FF32B4"/>
-                </a:solidFill>
-              </a:rPr>
-              <a:t>Stateful</a:t>
-            </a:r>
-            <a:r>
-              <a:rPr lang="en-US" sz="3600" dirty="0">
-                <a:solidFill>
-                  <a:srgbClr val="FF32B4"/>
-                </a:solidFill>
-              </a:rPr>
-              <a:t> Expressions</a:t>
-            </a:r>
-          </a:p>
-        </p:txBody>
-      </p:sp>
+              <a:t> interference</a:t>
+            </a:r>
+            <a:endParaRPr lang="en-US" sz="3600" dirty="0">
+              <a:solidFill>
+                <a:srgbClr val="FF32B4"/>
+              </a:solidFill>
+            </a:endParaRPr>
+          </a:p>
+        </p:txBody>
+      </p:sp>
+      <p:pic>
+        <p:nvPicPr>
+          <p:cNvPr id="9" name="Picture 8">
+            <a:extLst>
+              <a:ext uri="{FF2B5EF4-FFF2-40B4-BE49-F238E27FC236}">
+                <a16:creationId xmlns:a16="http://schemas.microsoft.com/office/drawing/2014/main" id="{3EDC059B-6FD5-D144-A52D-63C966249A37}"/>
+              </a:ext>
+            </a:extLst>
+          </p:cNvPr>
+          <p:cNvPicPr>
+            <a:picLocks noChangeAspect="1"/>
+          </p:cNvPicPr>
+          <p:nvPr/>
+        </p:nvPicPr>
+        <p:blipFill>
+          <a:blip r:embed="rId2"/>
+          <a:stretch>
+            <a:fillRect/>
+          </a:stretch>
+        </p:blipFill>
+        <p:spPr>
+          <a:xfrm>
+            <a:off x="6557150" y="3352806"/>
+            <a:ext cx="5634850" cy="1343408"/>
+          </a:xfrm>
+          <a:prstGeom prst="rect">
+            <a:avLst/>
+          </a:prstGeom>
+        </p:spPr>
+      </p:pic>
+      <p:pic>
+        <p:nvPicPr>
+          <p:cNvPr id="11" name="Picture 10">
+            <a:extLst>
+              <a:ext uri="{FF2B5EF4-FFF2-40B4-BE49-F238E27FC236}">
+                <a16:creationId xmlns:a16="http://schemas.microsoft.com/office/drawing/2014/main" id="{C3747D46-F75C-244A-8671-261437596055}"/>
+              </a:ext>
+            </a:extLst>
+          </p:cNvPr>
+          <p:cNvPicPr>
+            <a:picLocks noChangeAspect="1"/>
+          </p:cNvPicPr>
+          <p:nvPr/>
+        </p:nvPicPr>
+        <p:blipFill>
+          <a:blip r:embed="rId3"/>
+          <a:stretch>
+            <a:fillRect/>
+          </a:stretch>
+        </p:blipFill>
+        <p:spPr>
+          <a:xfrm>
+            <a:off x="342899" y="1250950"/>
+            <a:ext cx="5859887" cy="5200650"/>
+          </a:xfrm>
+          <a:prstGeom prst="rect">
+            <a:avLst/>
+          </a:prstGeom>
+        </p:spPr>
+      </p:pic>
     </p:spTree>
     <p:extLst>
       <p:ext uri="{BB962C8B-B14F-4D97-AF65-F5344CB8AC3E}">
-        <p14:creationId xmlns:p14="http://schemas.microsoft.com/office/powerpoint/2010/main" val="3576358113"/>
+        <p14:creationId xmlns:p14="http://schemas.microsoft.com/office/powerpoint/2010/main" val="196559877"/>
       </p:ext>
     </p:extLst>
   </p:cSld>
@@ -6708,6 +6730,257 @@
       </p:grpSpPr>
       <p:sp>
         <p:nvSpPr>
+          <p:cNvPr id="6" name="Title 1">
+            <a:extLst>
+              <a:ext uri="{FF2B5EF4-FFF2-40B4-BE49-F238E27FC236}">
+                <a16:creationId xmlns:a16="http://schemas.microsoft.com/office/drawing/2014/main" id="{5D2ABDC9-5163-DC4C-AFD9-CFE4FFECDDA5}"/>
+              </a:ext>
+            </a:extLst>
+          </p:cNvPr>
+          <p:cNvSpPr>
+            <a:spLocks noGrp="1"/>
+          </p:cNvSpPr>
+          <p:nvPr>
+            <p:ph type="title"/>
+          </p:nvPr>
+        </p:nvSpPr>
+        <p:spPr>
+          <a:xfrm>
+            <a:off x="3402610" y="217962"/>
+            <a:ext cx="8294648" cy="1733500"/>
+          </a:xfrm>
+        </p:spPr>
+        <p:txBody>
+          <a:bodyPr>
+            <a:noAutofit/>
+          </a:bodyPr>
+          <a:lstStyle/>
+          <a:p>
+            <a:r>
+              <a:rPr lang="en-US" sz="3600" dirty="0">
+                <a:solidFill>
+                  <a:srgbClr val="0D009F"/>
+                </a:solidFill>
+              </a:rPr>
+              <a:t>Practical Considerations </a:t>
+            </a:r>
+            <a:r>
+              <a:rPr lang="en-US" sz="3600" dirty="0">
+                <a:solidFill>
+                  <a:srgbClr val="FF32B4"/>
+                </a:solidFill>
+              </a:rPr>
+              <a:t> </a:t>
+            </a:r>
+            <a:r>
+              <a:rPr lang="en-US" sz="3600" dirty="0" err="1">
+                <a:solidFill>
+                  <a:srgbClr val="FF32B4"/>
+                </a:solidFill>
+              </a:rPr>
+              <a:t>Stateful</a:t>
+            </a:r>
+            <a:r>
+              <a:rPr lang="en-US" sz="3600" dirty="0">
+                <a:solidFill>
+                  <a:srgbClr val="FF32B4"/>
+                </a:solidFill>
+              </a:rPr>
+              <a:t> Expressions</a:t>
+            </a:r>
+          </a:p>
+        </p:txBody>
+      </p:sp>
+      <p:cxnSp>
+        <p:nvCxnSpPr>
+          <p:cNvPr id="7" name="Straight Arrow Connector 6">
+            <a:extLst>
+              <a:ext uri="{FF2B5EF4-FFF2-40B4-BE49-F238E27FC236}">
+                <a16:creationId xmlns:a16="http://schemas.microsoft.com/office/drawing/2014/main" id="{50BD4293-C5B2-754F-AD4F-1D45912F3DDE}"/>
+              </a:ext>
+            </a:extLst>
+          </p:cNvPr>
+          <p:cNvCxnSpPr>
+            <a:cxnSpLocks/>
+          </p:cNvCxnSpPr>
+          <p:nvPr/>
+        </p:nvCxnSpPr>
+        <p:spPr>
+          <a:xfrm>
+            <a:off x="2697760" y="3702050"/>
+            <a:ext cx="5163540" cy="1479550"/>
+          </a:xfrm>
+          <a:prstGeom prst="straightConnector1">
+            <a:avLst/>
+          </a:prstGeom>
+          <a:ln>
+            <a:solidFill>
+              <a:srgbClr val="FF32B4"/>
+            </a:solidFill>
+            <a:tailEnd type="triangle"/>
+          </a:ln>
+        </p:spPr>
+        <p:style>
+          <a:lnRef idx="1">
+            <a:schemeClr val="accent1"/>
+          </a:lnRef>
+          <a:fillRef idx="0">
+            <a:schemeClr val="accent1"/>
+          </a:fillRef>
+          <a:effectRef idx="0">
+            <a:schemeClr val="accent1"/>
+          </a:effectRef>
+          <a:fontRef idx="minor">
+            <a:schemeClr val="tx1"/>
+          </a:fontRef>
+        </p:style>
+      </p:cxnSp>
+      <p:sp>
+        <p:nvSpPr>
+          <p:cNvPr id="9" name="TextBox 8">
+            <a:extLst>
+              <a:ext uri="{FF2B5EF4-FFF2-40B4-BE49-F238E27FC236}">
+                <a16:creationId xmlns:a16="http://schemas.microsoft.com/office/drawing/2014/main" id="{204671EF-7129-6C43-81FB-CF5028A0DAE8}"/>
+              </a:ext>
+            </a:extLst>
+          </p:cNvPr>
+          <p:cNvSpPr txBox="1"/>
+          <p:nvPr/>
+        </p:nvSpPr>
+        <p:spPr>
+          <a:xfrm>
+            <a:off x="3865012" y="4404320"/>
+            <a:ext cx="1541518" cy="923330"/>
+          </a:xfrm>
+          <a:prstGeom prst="rect">
+            <a:avLst/>
+          </a:prstGeom>
+          <a:noFill/>
+        </p:spPr>
+        <p:txBody>
+          <a:bodyPr wrap="square" rtlCol="0">
+            <a:spAutoFit/>
+          </a:bodyPr>
+          <a:lstStyle/>
+          <a:p>
+            <a:r>
+              <a:rPr lang="en-US" dirty="0">
+                <a:solidFill>
+                  <a:srgbClr val="FF32B4"/>
+                </a:solidFill>
+              </a:rPr>
+              <a:t>Run in 10 </a:t>
+            </a:r>
+            <a:r>
+              <a:rPr lang="en-US" dirty="0" err="1">
+                <a:solidFill>
+                  <a:srgbClr val="FF32B4"/>
+                </a:solidFill>
+              </a:rPr>
+              <a:t>interation</a:t>
+            </a:r>
+            <a:r>
+              <a:rPr lang="en-US" dirty="0">
+                <a:solidFill>
+                  <a:srgbClr val="FF32B4"/>
+                </a:solidFill>
+              </a:rPr>
+              <a:t> loop</a:t>
+            </a:r>
+          </a:p>
+        </p:txBody>
+      </p:sp>
+      <p:pic>
+        <p:nvPicPr>
+          <p:cNvPr id="10" name="Picture 9">
+            <a:extLst>
+              <a:ext uri="{FF2B5EF4-FFF2-40B4-BE49-F238E27FC236}">
+                <a16:creationId xmlns:a16="http://schemas.microsoft.com/office/drawing/2014/main" id="{B19F6320-7753-2445-889C-FD5F6E834578}"/>
+              </a:ext>
+            </a:extLst>
+          </p:cNvPr>
+          <p:cNvPicPr>
+            <a:picLocks noChangeAspect="1"/>
+          </p:cNvPicPr>
+          <p:nvPr/>
+        </p:nvPicPr>
+        <p:blipFill>
+          <a:blip r:embed="rId2"/>
+          <a:stretch>
+            <a:fillRect/>
+          </a:stretch>
+        </p:blipFill>
+        <p:spPr>
+          <a:xfrm>
+            <a:off x="260349" y="2144672"/>
+            <a:ext cx="6596983" cy="1557378"/>
+          </a:xfrm>
+          <a:prstGeom prst="rect">
+            <a:avLst/>
+          </a:prstGeom>
+        </p:spPr>
+      </p:pic>
+      <p:pic>
+        <p:nvPicPr>
+          <p:cNvPr id="11" name="Picture 10">
+            <a:extLst>
+              <a:ext uri="{FF2B5EF4-FFF2-40B4-BE49-F238E27FC236}">
+                <a16:creationId xmlns:a16="http://schemas.microsoft.com/office/drawing/2014/main" id="{169DBCB5-7F5B-8842-A195-E09F6FFD8CBD}"/>
+              </a:ext>
+            </a:extLst>
+          </p:cNvPr>
+          <p:cNvPicPr>
+            <a:picLocks noChangeAspect="1"/>
+          </p:cNvPicPr>
+          <p:nvPr/>
+        </p:nvPicPr>
+        <p:blipFill rotWithShape="1">
+          <a:blip r:embed="rId3"/>
+          <a:srcRect t="1563"/>
+          <a:stretch/>
+        </p:blipFill>
+        <p:spPr>
+          <a:xfrm>
+            <a:off x="8153399" y="4043680"/>
+            <a:ext cx="2849113" cy="2719070"/>
+          </a:xfrm>
+          <a:prstGeom prst="rect">
+            <a:avLst/>
+          </a:prstGeom>
+        </p:spPr>
+      </p:pic>
+    </p:spTree>
+    <p:extLst>
+      <p:ext uri="{BB962C8B-B14F-4D97-AF65-F5344CB8AC3E}">
+        <p14:creationId xmlns:p14="http://schemas.microsoft.com/office/powerpoint/2010/main" val="3576358113"/>
+      </p:ext>
+    </p:extLst>
+  </p:cSld>
+  <p:clrMapOvr>
+    <a:masterClrMapping/>
+  </p:clrMapOvr>
+</p:sld>
+</file>
+
+<file path=ppt/slides/slide12.xml><?xml version="1.0" encoding="utf-8"?>
+<p:sld xmlns:a="http://schemas.openxmlformats.org/drawingml/2006/main" xmlns:r="http://schemas.openxmlformats.org/officeDocument/2006/relationships" xmlns:p="http://schemas.openxmlformats.org/presentationml/2006/main">
+  <p:cSld>
+    <p:spTree>
+      <p:nvGrpSpPr>
+        <p:cNvPr id="1" name=""/>
+        <p:cNvGrpSpPr/>
+        <p:nvPr/>
+      </p:nvGrpSpPr>
+      <p:grpSpPr>
+        <a:xfrm>
+          <a:off x="0" y="0"/>
+          <a:ext cx="0" cy="0"/>
+          <a:chOff x="0" y="0"/>
+          <a:chExt cx="0" cy="0"/>
+        </a:xfrm>
+      </p:grpSpPr>
+      <p:sp>
+        <p:nvSpPr>
           <p:cNvPr id="2" name="Title 1">
             <a:extLst>
               <a:ext uri="{FF2B5EF4-FFF2-40B4-BE49-F238E27FC236}">
@@ -6761,7 +7034,7 @@
         </p:nvSpPr>
         <p:spPr>
           <a:xfrm>
-            <a:off x="685800" y="2622823"/>
+            <a:off x="673100" y="2279923"/>
             <a:ext cx="10820400" cy="4024125"/>
           </a:xfrm>
         </p:spPr>
@@ -6827,6 +7100,29 @@
                 </a:solidFill>
               </a:rPr>
               <a:t>Don’t make mistakes</a:t>
+            </a:r>
+          </a:p>
+          <a:p>
+            <a:pPr marL="0" indent="0" algn="ctr">
+              <a:buNone/>
+            </a:pPr>
+            <a:endParaRPr lang="en-US" sz="3200" dirty="0">
+              <a:solidFill>
+                <a:srgbClr val="FF32B4"/>
+              </a:solidFill>
+            </a:endParaRPr>
+          </a:p>
+          <a:p>
+            <a:pPr marL="0" indent="0" algn="ctr">
+              <a:buNone/>
+            </a:pPr>
+            <a:r>
+              <a:rPr lang="en-US" sz="3200" dirty="0">
+                <a:solidFill>
+                  <a:srgbClr val="FF32B4"/>
+                </a:solidFill>
+              </a:rPr>
+              <a:t>Questions?</a:t>
             </a:r>
           </a:p>
         </p:txBody>
@@ -6866,6 +7162,141 @@
           <p:cNvPr id="2" name="Title 1">
             <a:extLst>
               <a:ext uri="{FF2B5EF4-FFF2-40B4-BE49-F238E27FC236}">
+                <a16:creationId xmlns:a16="http://schemas.microsoft.com/office/drawing/2014/main" id="{2256FADF-52C9-B043-9CF7-F833DDEAE678}"/>
+              </a:ext>
+            </a:extLst>
+          </p:cNvPr>
+          <p:cNvSpPr>
+            <a:spLocks noGrp="1"/>
+          </p:cNvSpPr>
+          <p:nvPr>
+            <p:ph type="title"/>
+          </p:nvPr>
+        </p:nvSpPr>
+        <p:spPr/>
+        <p:txBody>
+          <a:bodyPr/>
+          <a:lstStyle/>
+          <a:p>
+            <a:r>
+              <a:rPr lang="en-US" dirty="0">
+                <a:solidFill>
+                  <a:srgbClr val="0D009F"/>
+                </a:solidFill>
+              </a:rPr>
+              <a:t>Topics</a:t>
+            </a:r>
+          </a:p>
+        </p:txBody>
+      </p:sp>
+      <p:sp>
+        <p:nvSpPr>
+          <p:cNvPr id="3" name="Content Placeholder 2">
+            <a:extLst>
+              <a:ext uri="{FF2B5EF4-FFF2-40B4-BE49-F238E27FC236}">
+                <a16:creationId xmlns:a16="http://schemas.microsoft.com/office/drawing/2014/main" id="{F411D346-2189-B14A-9923-041D8CB04ED9}"/>
+              </a:ext>
+            </a:extLst>
+          </p:cNvPr>
+          <p:cNvSpPr>
+            <a:spLocks noGrp="1"/>
+          </p:cNvSpPr>
+          <p:nvPr>
+            <p:ph idx="1"/>
+          </p:nvPr>
+        </p:nvSpPr>
+        <p:spPr/>
+        <p:txBody>
+          <a:bodyPr/>
+          <a:lstStyle/>
+          <a:p>
+            <a:pPr marL="457200" indent="-457200">
+              <a:buFont typeface="+mj-lt"/>
+              <a:buAutoNum type="arabicPeriod"/>
+            </a:pPr>
+            <a:r>
+              <a:rPr lang="en-US" dirty="0"/>
+              <a:t>How to utilize parallel streams</a:t>
+            </a:r>
+          </a:p>
+          <a:p>
+            <a:pPr marL="457200" indent="-457200">
+              <a:buFont typeface="+mj-lt"/>
+              <a:buAutoNum type="arabicPeriod"/>
+            </a:pPr>
+            <a:r>
+              <a:rPr lang="en-US" dirty="0"/>
+              <a:t>Overview on how they work</a:t>
+            </a:r>
+          </a:p>
+          <a:p>
+            <a:pPr marL="457200" indent="-457200">
+              <a:buFont typeface="+mj-lt"/>
+              <a:buAutoNum type="arabicPeriod"/>
+            </a:pPr>
+            <a:r>
+              <a:rPr lang="en-US" dirty="0"/>
+              <a:t>Explanation of Spliterator</a:t>
+            </a:r>
+          </a:p>
+          <a:p>
+            <a:pPr marL="457200" indent="-457200">
+              <a:buFont typeface="+mj-lt"/>
+              <a:buAutoNum type="arabicPeriod"/>
+            </a:pPr>
+            <a:r>
+              <a:rPr lang="en-US" dirty="0"/>
+              <a:t>Explanation of Collector</a:t>
+            </a:r>
+          </a:p>
+          <a:p>
+            <a:pPr marL="457200" indent="-457200">
+              <a:buFont typeface="+mj-lt"/>
+              <a:buAutoNum type="arabicPeriod"/>
+            </a:pPr>
+            <a:r>
+              <a:rPr lang="en-US"/>
+              <a:t>Common mistakes </a:t>
+            </a:r>
+            <a:endParaRPr lang="en-US" dirty="0"/>
+          </a:p>
+        </p:txBody>
+      </p:sp>
+    </p:spTree>
+    <p:extLst>
+      <p:ext uri="{BB962C8B-B14F-4D97-AF65-F5344CB8AC3E}">
+        <p14:creationId xmlns:p14="http://schemas.microsoft.com/office/powerpoint/2010/main" val="863941090"/>
+      </p:ext>
+    </p:extLst>
+  </p:cSld>
+  <p:clrMapOvr>
+    <a:masterClrMapping/>
+  </p:clrMapOvr>
+</p:sld>
+</file>
+
+<file path=ppt/slides/slide3.xml><?xml version="1.0" encoding="utf-8"?>
+<p:sld xmlns:a="http://schemas.openxmlformats.org/drawingml/2006/main" xmlns:r="http://schemas.openxmlformats.org/officeDocument/2006/relationships" xmlns:p="http://schemas.openxmlformats.org/presentationml/2006/main">
+  <p:cSld>
+    <p:spTree>
+      <p:nvGrpSpPr>
+        <p:cNvPr id="1" name=""/>
+        <p:cNvGrpSpPr/>
+        <p:nvPr/>
+      </p:nvGrpSpPr>
+      <p:grpSpPr>
+        <a:xfrm>
+          <a:off x="0" y="0"/>
+          <a:ext cx="0" cy="0"/>
+          <a:chOff x="0" y="0"/>
+          <a:chExt cx="0" cy="0"/>
+        </a:xfrm>
+      </p:grpSpPr>
+      <p:sp>
+        <p:nvSpPr>
+          <p:cNvPr id="2" name="Title 1">
+            <a:extLst>
+              <a:ext uri="{FF2B5EF4-FFF2-40B4-BE49-F238E27FC236}">
                 <a16:creationId xmlns:a16="http://schemas.microsoft.com/office/drawing/2014/main" id="{22BD710D-8FFB-244D-8A7F-C295DE83DAF9}"/>
               </a:ext>
             </a:extLst>
@@ -7098,306 +7529,6 @@
     <p:extLst>
       <p:ext uri="{BB962C8B-B14F-4D97-AF65-F5344CB8AC3E}">
         <p14:creationId xmlns:p14="http://schemas.microsoft.com/office/powerpoint/2010/main" val="517127859"/>
-      </p:ext>
-    </p:extLst>
-  </p:cSld>
-  <p:clrMapOvr>
-    <a:masterClrMapping/>
-  </p:clrMapOvr>
-</p:sld>
-</file>
-
-<file path=ppt/slides/slide3.xml><?xml version="1.0" encoding="utf-8"?>
-<p:sld xmlns:a="http://schemas.openxmlformats.org/drawingml/2006/main" xmlns:r="http://schemas.openxmlformats.org/officeDocument/2006/relationships" xmlns:p="http://schemas.openxmlformats.org/presentationml/2006/main">
-  <p:cSld>
-    <p:bg>
-      <p:bgPr>
-        <a:solidFill>
-          <a:schemeClr val="bg1"/>
-        </a:solidFill>
-        <a:effectLst/>
-      </p:bgPr>
-    </p:bg>
-    <p:spTree>
-      <p:nvGrpSpPr>
-        <p:cNvPr id="1" name=""/>
-        <p:cNvGrpSpPr/>
-        <p:nvPr/>
-      </p:nvGrpSpPr>
-      <p:grpSpPr>
-        <a:xfrm>
-          <a:off x="0" y="0"/>
-          <a:ext cx="0" cy="0"/>
-          <a:chOff x="0" y="0"/>
-          <a:chExt cx="0" cy="0"/>
-        </a:xfrm>
-      </p:grpSpPr>
-      <p:sp>
-        <p:nvSpPr>
-          <p:cNvPr id="13" name="Rectangle 12">
-            <a:extLst>
-              <a:ext uri="{FF2B5EF4-FFF2-40B4-BE49-F238E27FC236}">
-                <a16:creationId xmlns:a16="http://schemas.microsoft.com/office/drawing/2014/main" id="{86817BFA-9939-42FC-97E6-1DDD23A38EB9}"/>
-              </a:ext>
-            </a:extLst>
-          </p:cNvPr>
-          <p:cNvSpPr>
-            <a:spLocks noGrp="1" noRot="1" noChangeAspect="1" noMove="1" noResize="1" noEditPoints="1" noAdjustHandles="1" noChangeArrowheads="1" noChangeShapeType="1" noTextEdit="1"/>
-          </p:cNvSpPr>
-          <p:nvPr>
-            <p:extLst>
-              <p:ext uri="{386F3935-93C4-4BCD-93E2-E3B085C9AB24}">
-                <p16:designElem xmlns:p16="http://schemas.microsoft.com/office/powerpoint/2015/main" val="1"/>
-              </p:ext>
-            </p:extLst>
-          </p:nvPr>
-        </p:nvSpPr>
-        <p:spPr>
-          <a:xfrm>
-            <a:off x="0" y="0"/>
-            <a:ext cx="12192000" cy="6858000"/>
-          </a:xfrm>
-          <a:prstGeom prst="rect">
-            <a:avLst/>
-          </a:prstGeom>
-          <a:solidFill>
-            <a:schemeClr val="bg1"/>
-          </a:solidFill>
-          <a:ln>
-            <a:noFill/>
-          </a:ln>
-        </p:spPr>
-        <p:style>
-          <a:lnRef idx="2">
-            <a:schemeClr val="accent1">
-              <a:shade val="50000"/>
-            </a:schemeClr>
-          </a:lnRef>
-          <a:fillRef idx="1">
-            <a:schemeClr val="accent1"/>
-          </a:fillRef>
-          <a:effectRef idx="0">
-            <a:schemeClr val="accent1"/>
-          </a:effectRef>
-          <a:fontRef idx="minor">
-            <a:schemeClr val="lt1"/>
-          </a:fontRef>
-        </p:style>
-        <p:txBody>
-          <a:bodyPr rtlCol="0" anchor="ctr"/>
-          <a:lstStyle/>
-          <a:p>
-            <a:pPr algn="ctr"/>
-            <a:endParaRPr lang="en-US"/>
-          </a:p>
-        </p:txBody>
-      </p:sp>
-      <p:pic>
-        <p:nvPicPr>
-          <p:cNvPr id="15" name="Picture 14">
-            <a:extLst>
-              <a:ext uri="{FF2B5EF4-FFF2-40B4-BE49-F238E27FC236}">
-                <a16:creationId xmlns:a16="http://schemas.microsoft.com/office/drawing/2014/main" id="{A4C4F977-CDDE-402E-B4F0-84B5572E77C3}"/>
-              </a:ext>
-            </a:extLst>
-          </p:cNvPr>
-          <p:cNvPicPr>
-            <a:picLocks noGrp="1" noRot="1" noChangeAspect="1" noMove="1" noResize="1" noEditPoints="1" noAdjustHandles="1" noChangeArrowheads="1" noChangeShapeType="1" noCrop="1"/>
-          </p:cNvPicPr>
-          <p:nvPr>
-            <p:extLst>
-              <p:ext uri="{386F3935-93C4-4BCD-93E2-E3B085C9AB24}">
-                <p16:designElem xmlns:p16="http://schemas.microsoft.com/office/powerpoint/2015/main" val="1"/>
-              </p:ext>
-            </p:extLst>
-          </p:nvPr>
-        </p:nvPicPr>
-        <p:blipFill>
-          <a:blip r:embed="rId3">
-            <a:extLst>
-              <a:ext uri="{28A0092B-C50C-407E-A947-70E740481C1C}">
-                <a14:useLocalDpi xmlns:a14="http://schemas.microsoft.com/office/drawing/2010/main" val="0"/>
-              </a:ext>
-            </a:extLst>
-          </a:blip>
-          <a:stretch>
-            <a:fillRect/>
-          </a:stretch>
-        </p:blipFill>
-        <p:spPr>
-          <a:xfrm>
-            <a:off x="0" y="0"/>
-            <a:ext cx="12192000" cy="1441450"/>
-          </a:xfrm>
-          <a:prstGeom prst="rect">
-            <a:avLst/>
-          </a:prstGeom>
-        </p:spPr>
-      </p:pic>
-      <p:sp>
-        <p:nvSpPr>
-          <p:cNvPr id="2" name="Title 1">
-            <a:extLst>
-              <a:ext uri="{FF2B5EF4-FFF2-40B4-BE49-F238E27FC236}">
-                <a16:creationId xmlns:a16="http://schemas.microsoft.com/office/drawing/2014/main" id="{EF04A279-BD41-8346-A75D-603BC6CA6228}"/>
-              </a:ext>
-            </a:extLst>
-          </p:cNvPr>
-          <p:cNvSpPr>
-            <a:spLocks noGrp="1"/>
-          </p:cNvSpPr>
-          <p:nvPr>
-            <p:ph type="title"/>
-          </p:nvPr>
-        </p:nvSpPr>
-        <p:spPr>
-          <a:xfrm>
-            <a:off x="312234" y="764373"/>
-            <a:ext cx="4594303" cy="1600200"/>
-          </a:xfrm>
-        </p:spPr>
-        <p:txBody>
-          <a:bodyPr anchor="b">
-            <a:normAutofit/>
-          </a:bodyPr>
-          <a:lstStyle/>
-          <a:p>
-            <a:pPr algn="l"/>
-            <a:r>
-              <a:rPr lang="en-US" dirty="0">
-                <a:solidFill>
-                  <a:srgbClr val="0D009F"/>
-                </a:solidFill>
-              </a:rPr>
-              <a:t>How they work</a:t>
-            </a:r>
-          </a:p>
-        </p:txBody>
-      </p:sp>
-      <p:sp>
-        <p:nvSpPr>
-          <p:cNvPr id="10" name="Content Placeholder 9">
-            <a:extLst>
-              <a:ext uri="{FF2B5EF4-FFF2-40B4-BE49-F238E27FC236}">
-                <a16:creationId xmlns:a16="http://schemas.microsoft.com/office/drawing/2014/main" id="{566A5FDE-D08E-4A9E-917A-44A1E586D1C5}"/>
-              </a:ext>
-            </a:extLst>
-          </p:cNvPr>
-          <p:cNvSpPr>
-            <a:spLocks noGrp="1"/>
-          </p:cNvSpPr>
-          <p:nvPr>
-            <p:ph idx="1"/>
-          </p:nvPr>
-        </p:nvSpPr>
-        <p:spPr>
-          <a:xfrm>
-            <a:off x="620565" y="2515684"/>
-            <a:ext cx="3977639" cy="3854112"/>
-          </a:xfrm>
-        </p:spPr>
-        <p:txBody>
-          <a:bodyPr>
-            <a:normAutofit fontScale="92500" lnSpcReduction="10000"/>
-          </a:bodyPr>
-          <a:lstStyle/>
-          <a:p>
-            <a:r>
-              <a:rPr lang="en-US" sz="2400" dirty="0"/>
-              <a:t>Stream is broken up by the Spliterator into </a:t>
-            </a:r>
-            <a:r>
-              <a:rPr lang="en-US" sz="2400" dirty="0" err="1"/>
-              <a:t>substreams</a:t>
-            </a:r>
-            <a:endParaRPr lang="en-US" sz="2400" dirty="0"/>
-          </a:p>
-          <a:p>
-            <a:r>
-              <a:rPr lang="en-US" sz="2400" dirty="0"/>
-              <a:t>Extra </a:t>
-            </a:r>
-            <a:r>
-              <a:rPr lang="en-US" sz="2400" dirty="0" err="1"/>
-              <a:t>substreams</a:t>
-            </a:r>
-            <a:r>
-              <a:rPr lang="en-US" sz="2400" dirty="0"/>
-              <a:t> are handed to </a:t>
-            </a:r>
-            <a:r>
-              <a:rPr lang="en-US" sz="2400" dirty="0" err="1"/>
-              <a:t>ForkJoinPool.common</a:t>
-            </a:r>
-            <a:r>
-              <a:rPr lang="en-US" sz="2400" dirty="0"/>
-              <a:t>()</a:t>
-            </a:r>
-          </a:p>
-          <a:p>
-            <a:r>
-              <a:rPr lang="en-US" sz="2400" dirty="0"/>
-              <a:t>Each </a:t>
-            </a:r>
-            <a:r>
-              <a:rPr lang="en-US" sz="2400" dirty="0" err="1"/>
-              <a:t>substream</a:t>
-            </a:r>
-            <a:r>
-              <a:rPr lang="en-US" sz="2400" dirty="0"/>
-              <a:t> is processed like a singular serial stream</a:t>
-            </a:r>
-          </a:p>
-          <a:p>
-            <a:r>
-              <a:rPr lang="en-US" sz="2400" dirty="0"/>
-              <a:t>JVM combines all </a:t>
-            </a:r>
-            <a:r>
-              <a:rPr lang="en-US" sz="2400" dirty="0" err="1"/>
-              <a:t>substreams</a:t>
-            </a:r>
-            <a:r>
-              <a:rPr lang="en-US" sz="2400" dirty="0"/>
-              <a:t> together to serialize the stream</a:t>
-            </a:r>
-          </a:p>
-        </p:txBody>
-      </p:sp>
-      <p:pic>
-        <p:nvPicPr>
-          <p:cNvPr id="4" name="Picture 3">
-            <a:extLst>
-              <a:ext uri="{FF2B5EF4-FFF2-40B4-BE49-F238E27FC236}">
-                <a16:creationId xmlns:a16="http://schemas.microsoft.com/office/drawing/2014/main" id="{46EE2368-68B2-2849-B72D-74CF5FFFDE1D}"/>
-              </a:ext>
-            </a:extLst>
-          </p:cNvPr>
-          <p:cNvPicPr>
-            <a:picLocks noChangeAspect="1"/>
-          </p:cNvPicPr>
-          <p:nvPr/>
-        </p:nvPicPr>
-        <p:blipFill>
-          <a:blip r:embed="rId4"/>
-          <a:stretch>
-            <a:fillRect/>
-          </a:stretch>
-        </p:blipFill>
-        <p:spPr>
-          <a:xfrm>
-            <a:off x="5218769" y="963752"/>
-            <a:ext cx="6246813" cy="5193979"/>
-          </a:xfrm>
-          <a:prstGeom prst="rect">
-            <a:avLst/>
-          </a:prstGeom>
-        </p:spPr>
-      </p:pic>
-    </p:spTree>
-    <p:extLst>
-      <p:ext uri="{BB962C8B-B14F-4D97-AF65-F5344CB8AC3E}">
-        <p14:creationId xmlns:p14="http://schemas.microsoft.com/office/powerpoint/2010/main" val="3171065684"/>
       </p:ext>
     </p:extLst>
   </p:cSld>
@@ -7434,7 +7565,7 @@
       </p:grpSpPr>
       <p:sp>
         <p:nvSpPr>
-          <p:cNvPr id="17" name="Rectangle 16">
+          <p:cNvPr id="13" name="Rectangle 12">
             <a:extLst>
               <a:ext uri="{FF2B5EF4-FFF2-40B4-BE49-F238E27FC236}">
                 <a16:creationId xmlns:a16="http://schemas.microsoft.com/office/drawing/2014/main" id="{86817BFA-9939-42FC-97E6-1DDD23A38EB9}"/>
@@ -7494,7 +7625,7 @@
       </p:sp>
       <p:pic>
         <p:nvPicPr>
-          <p:cNvPr id="19" name="Picture 18">
+          <p:cNvPr id="15" name="Picture 14">
             <a:extLst>
               <a:ext uri="{FF2B5EF4-FFF2-40B4-BE49-F238E27FC236}">
                 <a16:creationId xmlns:a16="http://schemas.microsoft.com/office/drawing/2014/main" id="{A4C4F977-CDDE-402E-B4F0-84B5572E77C3}"/>
@@ -7513,7 +7644,7 @@
           </p:nvPr>
         </p:nvPicPr>
         <p:blipFill>
-          <a:blip r:embed="rId2">
+          <a:blip r:embed="rId3">
             <a:extLst>
               <a:ext uri="{28A0092B-C50C-407E-A947-70E740481C1C}">
                 <a14:useLocalDpi xmlns:a14="http://schemas.microsoft.com/office/drawing/2010/main" val="0"/>
@@ -7539,7 +7670,7 @@
           <p:cNvPr id="2" name="Title 1">
             <a:extLst>
               <a:ext uri="{FF2B5EF4-FFF2-40B4-BE49-F238E27FC236}">
-                <a16:creationId xmlns:a16="http://schemas.microsoft.com/office/drawing/2014/main" id="{46B0BF59-18F4-644D-B0C0-B97E8C40FFE3}"/>
+                <a16:creationId xmlns:a16="http://schemas.microsoft.com/office/drawing/2014/main" id="{EF04A279-BD41-8346-A75D-603BC6CA6228}"/>
               </a:ext>
             </a:extLst>
           </p:cNvPr>
@@ -7552,8 +7683,8 @@
         </p:nvSpPr>
         <p:spPr>
           <a:xfrm>
-            <a:off x="685799" y="764373"/>
-            <a:ext cx="3977639" cy="1600200"/>
+            <a:off x="312234" y="764373"/>
+            <a:ext cx="4594303" cy="1600200"/>
           </a:xfrm>
         </p:spPr>
         <p:txBody>
@@ -7569,14 +7700,20 @@
                   <a:srgbClr val="0D009F"/>
                 </a:solidFill>
               </a:rPr>
-              <a:t>Spliterator</a:t>
-            </a:r>
-          </a:p>
-        </p:txBody>
-      </p:sp>
-      <p:sp>
-        <p:nvSpPr>
-          <p:cNvPr id="14" name="Content Placeholder 13"/>
+              <a:t>How they work</a:t>
+            </a:r>
+          </a:p>
+        </p:txBody>
+      </p:sp>
+      <p:sp>
+        <p:nvSpPr>
+          <p:cNvPr id="10" name="Content Placeholder 9">
+            <a:extLst>
+              <a:ext uri="{FF2B5EF4-FFF2-40B4-BE49-F238E27FC236}">
+                <a16:creationId xmlns:a16="http://schemas.microsoft.com/office/drawing/2014/main" id="{566A5FDE-D08E-4A9E-917A-44A1E586D1C5}"/>
+              </a:ext>
+            </a:extLst>
+          </p:cNvPr>
           <p:cNvSpPr>
             <a:spLocks noGrp="1"/>
           </p:cNvSpPr>
@@ -7586,8 +7723,8 @@
         </p:nvSpPr>
         <p:spPr>
           <a:xfrm>
-            <a:off x="685799" y="2462544"/>
-            <a:ext cx="4176133" cy="4105523"/>
+            <a:off x="620565" y="2515684"/>
+            <a:ext cx="3977639" cy="3854112"/>
           </a:xfrm>
         </p:spPr>
         <p:txBody>
@@ -7598,7 +7735,7 @@
           <a:p>
             <a:r>
               <a:rPr lang="en-US" sz="2400" dirty="0"/>
-              <a:t>”Split + iterator”- Used to traverse and split </a:t>
+              <a:t>Stream is broken up by the Spliterator into </a:t>
             </a:r>
             <a:r>
               <a:rPr lang="en-US" sz="2400" dirty="0" err="1"/>
@@ -7609,19 +7746,19 @@
           <a:p>
             <a:r>
               <a:rPr lang="en-US" sz="2400" dirty="0"/>
-              <a:t>Traverses via </a:t>
+              <a:t>Extra </a:t>
             </a:r>
             <a:r>
               <a:rPr lang="en-US" sz="2400" dirty="0" err="1"/>
-              <a:t>tryAdvance</a:t>
+              <a:t>substreams</a:t>
             </a:r>
             <a:r>
               <a:rPr lang="en-US" sz="2400" dirty="0"/>
-              <a:t>() or </a:t>
+              <a:t> are handed to </a:t>
             </a:r>
             <a:r>
               <a:rPr lang="en-US" sz="2400" dirty="0" err="1"/>
-              <a:t>forEachRemaining</a:t>
+              <a:t>ForkJoinPool.common</a:t>
             </a:r>
             <a:r>
               <a:rPr lang="en-US" sz="2400" dirty="0"/>
@@ -7631,21 +7768,29 @@
           <a:p>
             <a:r>
               <a:rPr lang="en-US" sz="2400" dirty="0"/>
-              <a:t>Can split itself into two spliterators via </a:t>
+              <a:t>Each </a:t>
             </a:r>
             <a:r>
               <a:rPr lang="en-US" sz="2400" dirty="0" err="1"/>
-              <a:t>trySplit</a:t>
+              <a:t>substream</a:t>
             </a:r>
             <a:r>
               <a:rPr lang="en-US" sz="2400" dirty="0"/>
-              <a:t>()</a:t>
+              <a:t> is processed like a singular serial stream</a:t>
             </a:r>
           </a:p>
           <a:p>
             <a:r>
               <a:rPr lang="en-US" sz="2400" dirty="0"/>
-              <a:t>Contains same characteristics as a Stream (ORDERED, DISTINCT, SORTED, SIZED, NONNULL, IMMUTABLE, CONCURRENT, SUBSIZED)</a:t>
+              <a:t>JVM combines all </a:t>
+            </a:r>
+            <a:r>
+              <a:rPr lang="en-US" sz="2400" dirty="0" err="1"/>
+              <a:t>substreams</a:t>
+            </a:r>
+            <a:r>
+              <a:rPr lang="en-US" sz="2400" dirty="0"/>
+              <a:t> together to serialize the stream</a:t>
             </a:r>
           </a:p>
         </p:txBody>
@@ -7655,7 +7800,7 @@
           <p:cNvPr id="4" name="Picture 3">
             <a:extLst>
               <a:ext uri="{FF2B5EF4-FFF2-40B4-BE49-F238E27FC236}">
-                <a16:creationId xmlns:a16="http://schemas.microsoft.com/office/drawing/2014/main" id="{377832FA-B4C2-164D-BFCF-B446A6C5010A}"/>
+                <a16:creationId xmlns:a16="http://schemas.microsoft.com/office/drawing/2014/main" id="{46EE2368-68B2-2849-B72D-74CF5FFFDE1D}"/>
               </a:ext>
             </a:extLst>
           </p:cNvPr>
@@ -7665,15 +7810,15 @@
           <p:nvPr/>
         </p:nvPicPr>
         <p:blipFill>
-          <a:blip r:embed="rId3"/>
+          <a:blip r:embed="rId4"/>
           <a:stretch>
             <a:fillRect/>
           </a:stretch>
         </p:blipFill>
         <p:spPr>
           <a:xfrm>
-            <a:off x="6020170" y="764373"/>
-            <a:ext cx="5150749" cy="5445078"/>
+            <a:off x="5218769" y="963752"/>
+            <a:ext cx="6246813" cy="5193979"/>
           </a:xfrm>
           <a:prstGeom prst="rect">
             <a:avLst/>
@@ -7683,7 +7828,7 @@
     </p:spTree>
     <p:extLst>
       <p:ext uri="{BB962C8B-B14F-4D97-AF65-F5344CB8AC3E}">
-        <p14:creationId xmlns:p14="http://schemas.microsoft.com/office/powerpoint/2010/main" val="4009905473"/>
+        <p14:creationId xmlns:p14="http://schemas.microsoft.com/office/powerpoint/2010/main" val="3171065684"/>
       </p:ext>
     </p:extLst>
   </p:cSld>
@@ -7720,10 +7865,112 @@
       </p:grpSpPr>
       <p:sp>
         <p:nvSpPr>
+          <p:cNvPr id="17" name="Rectangle 16">
+            <a:extLst>
+              <a:ext uri="{FF2B5EF4-FFF2-40B4-BE49-F238E27FC236}">
+                <a16:creationId xmlns:a16="http://schemas.microsoft.com/office/drawing/2014/main" id="{86817BFA-9939-42FC-97E6-1DDD23A38EB9}"/>
+              </a:ext>
+            </a:extLst>
+          </p:cNvPr>
+          <p:cNvSpPr>
+            <a:spLocks noGrp="1" noRot="1" noChangeAspect="1" noMove="1" noResize="1" noEditPoints="1" noAdjustHandles="1" noChangeArrowheads="1" noChangeShapeType="1" noTextEdit="1"/>
+          </p:cNvSpPr>
+          <p:nvPr>
+            <p:extLst>
+              <p:ext uri="{386F3935-93C4-4BCD-93E2-E3B085C9AB24}">
+                <p16:designElem xmlns:p16="http://schemas.microsoft.com/office/powerpoint/2015/main" val="1"/>
+              </p:ext>
+            </p:extLst>
+          </p:nvPr>
+        </p:nvSpPr>
+        <p:spPr>
+          <a:xfrm>
+            <a:off x="0" y="0"/>
+            <a:ext cx="12192000" cy="6858000"/>
+          </a:xfrm>
+          <a:prstGeom prst="rect">
+            <a:avLst/>
+          </a:prstGeom>
+          <a:solidFill>
+            <a:schemeClr val="bg1"/>
+          </a:solidFill>
+          <a:ln>
+            <a:noFill/>
+          </a:ln>
+        </p:spPr>
+        <p:style>
+          <a:lnRef idx="2">
+            <a:schemeClr val="accent1">
+              <a:shade val="50000"/>
+            </a:schemeClr>
+          </a:lnRef>
+          <a:fillRef idx="1">
+            <a:schemeClr val="accent1"/>
+          </a:fillRef>
+          <a:effectRef idx="0">
+            <a:schemeClr val="accent1"/>
+          </a:effectRef>
+          <a:fontRef idx="minor">
+            <a:schemeClr val="lt1"/>
+          </a:fontRef>
+        </p:style>
+        <p:txBody>
+          <a:bodyPr rtlCol="0" anchor="ctr"/>
+          <a:lstStyle/>
+          <a:p>
+            <a:pPr algn="ctr"/>
+            <a:endParaRPr lang="en-US"/>
+          </a:p>
+        </p:txBody>
+      </p:sp>
+      <p:pic>
+        <p:nvPicPr>
+          <p:cNvPr id="19" name="Picture 18">
+            <a:extLst>
+              <a:ext uri="{FF2B5EF4-FFF2-40B4-BE49-F238E27FC236}">
+                <a16:creationId xmlns:a16="http://schemas.microsoft.com/office/drawing/2014/main" id="{A4C4F977-CDDE-402E-B4F0-84B5572E77C3}"/>
+              </a:ext>
+            </a:extLst>
+          </p:cNvPr>
+          <p:cNvPicPr>
+            <a:picLocks noGrp="1" noRot="1" noChangeAspect="1" noMove="1" noResize="1" noEditPoints="1" noAdjustHandles="1" noChangeArrowheads="1" noChangeShapeType="1" noCrop="1"/>
+          </p:cNvPicPr>
+          <p:nvPr>
+            <p:extLst>
+              <p:ext uri="{386F3935-93C4-4BCD-93E2-E3B085C9AB24}">
+                <p16:designElem xmlns:p16="http://schemas.microsoft.com/office/powerpoint/2015/main" val="1"/>
+              </p:ext>
+            </p:extLst>
+          </p:nvPr>
+        </p:nvPicPr>
+        <p:blipFill>
+          <a:blip r:embed="rId2">
+            <a:extLst>
+              <a:ext uri="{28A0092B-C50C-407E-A947-70E740481C1C}">
+                <a14:useLocalDpi xmlns:a14="http://schemas.microsoft.com/office/drawing/2010/main" val="0"/>
+              </a:ext>
+            </a:extLst>
+          </a:blip>
+          <a:stretch>
+            <a:fillRect/>
+          </a:stretch>
+        </p:blipFill>
+        <p:spPr>
+          <a:xfrm>
+            <a:off x="0" y="0"/>
+            <a:ext cx="12192000" cy="1441450"/>
+          </a:xfrm>
+          <a:prstGeom prst="rect">
+            <a:avLst/>
+          </a:prstGeom>
+        </p:spPr>
+      </p:pic>
+      <p:sp>
+        <p:nvSpPr>
           <p:cNvPr id="2" name="Title 1">
             <a:extLst>
               <a:ext uri="{FF2B5EF4-FFF2-40B4-BE49-F238E27FC236}">
-                <a16:creationId xmlns:a16="http://schemas.microsoft.com/office/drawing/2014/main" id="{0A373FDB-51C1-D047-A9AB-0A34B3201FF9}"/>
+                <a16:creationId xmlns:a16="http://schemas.microsoft.com/office/drawing/2014/main" id="{46B0BF59-18F4-644D-B0C0-B97E8C40FFE3}"/>
               </a:ext>
             </a:extLst>
           </p:cNvPr>
@@ -7736,16 +7983,17 @@
         </p:nvSpPr>
         <p:spPr>
           <a:xfrm>
-            <a:off x="1958474" y="188036"/>
-            <a:ext cx="8567854" cy="1499326"/>
-          </a:xfrm>
-        </p:spPr>
-        <p:txBody>
-          <a:bodyPr>
+            <a:off x="685799" y="764373"/>
+            <a:ext cx="3977639" cy="1600200"/>
+          </a:xfrm>
+        </p:spPr>
+        <p:txBody>
+          <a:bodyPr anchor="b">
             <a:normAutofit/>
           </a:bodyPr>
           <a:lstStyle/>
           <a:p>
+            <a:pPr algn="l"/>
             <a:r>
               <a:rPr lang="en-US" dirty="0">
                 <a:solidFill>
@@ -7754,142 +8002,91 @@
               </a:rPr>
               <a:t>Spliterator</a:t>
             </a:r>
-            <a:br>
-              <a:rPr lang="en-US" dirty="0">
-                <a:solidFill>
-                  <a:srgbClr val="0D009F"/>
-                </a:solidFill>
-              </a:rPr>
-            </a:br>
-            <a:r>
-              <a:rPr lang="en-US" dirty="0">
-                <a:solidFill>
-                  <a:srgbClr val="FF32B4"/>
-                </a:solidFill>
-              </a:rPr>
-              <a:t>Continued</a:t>
+          </a:p>
+        </p:txBody>
+      </p:sp>
+      <p:sp>
+        <p:nvSpPr>
+          <p:cNvPr id="14" name="Content Placeholder 13"/>
+          <p:cNvSpPr>
+            <a:spLocks noGrp="1"/>
+          </p:cNvSpPr>
+          <p:nvPr>
+            <p:ph idx="1"/>
+          </p:nvPr>
+        </p:nvSpPr>
+        <p:spPr>
+          <a:xfrm>
+            <a:off x="685799" y="2462544"/>
+            <a:ext cx="4176133" cy="4105523"/>
+          </a:xfrm>
+        </p:spPr>
+        <p:txBody>
+          <a:bodyPr>
+            <a:normAutofit/>
+          </a:bodyPr>
+          <a:lstStyle/>
+          <a:p>
+            <a:r>
+              <a:rPr lang="en-US" sz="2400" dirty="0"/>
+              <a:t>”Split + iterator”- Used to traverse and split </a:t>
+            </a:r>
+            <a:r>
+              <a:rPr lang="en-US" sz="2400" dirty="0" err="1"/>
+              <a:t>substreams</a:t>
+            </a:r>
+            <a:endParaRPr lang="en-US" sz="2400" dirty="0"/>
+          </a:p>
+          <a:p>
+            <a:r>
+              <a:rPr lang="en-US" sz="2400" dirty="0"/>
+              <a:t>Traverses via </a:t>
+            </a:r>
+            <a:r>
+              <a:rPr lang="en-US" sz="2400" dirty="0" err="1"/>
+              <a:t>tryAdvance</a:t>
+            </a:r>
+            <a:r>
+              <a:rPr lang="en-US" sz="2400" dirty="0"/>
+              <a:t>() or </a:t>
+            </a:r>
+            <a:r>
+              <a:rPr lang="en-US" sz="2400" dirty="0" err="1"/>
+              <a:t>forEachRemaining</a:t>
+            </a:r>
+            <a:r>
+              <a:rPr lang="en-US" sz="2400" dirty="0"/>
+              <a:t>()</a:t>
+            </a:r>
+          </a:p>
+          <a:p>
+            <a:r>
+              <a:rPr lang="en-US" sz="2400" dirty="0"/>
+              <a:t>Can split itself into two spliterators via </a:t>
+            </a:r>
+            <a:r>
+              <a:rPr lang="en-US" sz="2400" dirty="0" err="1"/>
+              <a:t>trySplit</a:t>
+            </a:r>
+            <a:r>
+              <a:rPr lang="en-US" sz="2400" dirty="0"/>
+              <a:t>()</a:t>
+            </a:r>
+          </a:p>
+          <a:p>
+            <a:r>
+              <a:rPr lang="en-US" sz="2400" dirty="0"/>
+              <a:t>Contains same characteristics as a Stream</a:t>
             </a:r>
           </a:p>
         </p:txBody>
       </p:sp>
       <p:pic>
         <p:nvPicPr>
-          <p:cNvPr id="11" name="Picture 10">
+          <p:cNvPr id="4" name="Picture 3">
             <a:extLst>
               <a:ext uri="{FF2B5EF4-FFF2-40B4-BE49-F238E27FC236}">
-                <a16:creationId xmlns:a16="http://schemas.microsoft.com/office/drawing/2014/main" id="{90B5701D-AD11-7D4B-97D1-FEA00A9A5EA2}"/>
-              </a:ext>
-            </a:extLst>
-          </p:cNvPr>
-          <p:cNvPicPr>
-            <a:picLocks noChangeAspect="1"/>
-          </p:cNvPicPr>
-          <p:nvPr/>
-        </p:nvPicPr>
-        <p:blipFill rotWithShape="1">
-          <a:blip r:embed="rId2"/>
-          <a:srcRect r="8426"/>
-          <a:stretch/>
-        </p:blipFill>
-        <p:spPr>
-          <a:xfrm>
-            <a:off x="7747321" y="3393502"/>
-            <a:ext cx="4444679" cy="1697638"/>
-          </a:xfrm>
-          <a:prstGeom prst="rect">
-            <a:avLst/>
-          </a:prstGeom>
-        </p:spPr>
-      </p:pic>
-      <p:cxnSp>
-        <p:nvCxnSpPr>
-          <p:cNvPr id="13" name="Straight Arrow Connector 12">
-            <a:extLst>
-              <a:ext uri="{FF2B5EF4-FFF2-40B4-BE49-F238E27FC236}">
-                <a16:creationId xmlns:a16="http://schemas.microsoft.com/office/drawing/2014/main" id="{6551FB2B-6138-C544-8578-5D91186372E4}"/>
-              </a:ext>
-            </a:extLst>
-          </p:cNvPr>
-          <p:cNvCxnSpPr>
-            <a:cxnSpLocks/>
-          </p:cNvCxnSpPr>
-          <p:nvPr/>
-        </p:nvCxnSpPr>
-        <p:spPr>
-          <a:xfrm>
-            <a:off x="5529998" y="4317357"/>
-            <a:ext cx="2062994" cy="0"/>
-          </a:xfrm>
-          <a:prstGeom prst="straightConnector1">
-            <a:avLst/>
-          </a:prstGeom>
-          <a:ln>
-            <a:solidFill>
-              <a:srgbClr val="FF32B4"/>
-            </a:solidFill>
-            <a:tailEnd type="triangle"/>
-          </a:ln>
-        </p:spPr>
-        <p:style>
-          <a:lnRef idx="1">
-            <a:schemeClr val="accent1"/>
-          </a:lnRef>
-          <a:fillRef idx="0">
-            <a:schemeClr val="accent1"/>
-          </a:fillRef>
-          <a:effectRef idx="0">
-            <a:schemeClr val="accent1"/>
-          </a:effectRef>
-          <a:fontRef idx="minor">
-            <a:schemeClr val="tx1"/>
-          </a:fontRef>
-        </p:style>
-      </p:cxnSp>
-      <p:sp>
-        <p:nvSpPr>
-          <p:cNvPr id="20" name="TextBox 19">
-            <a:extLst>
-              <a:ext uri="{FF2B5EF4-FFF2-40B4-BE49-F238E27FC236}">
-                <a16:creationId xmlns:a16="http://schemas.microsoft.com/office/drawing/2014/main" id="{A977AE86-0FA3-8541-9725-F817B5920664}"/>
-              </a:ext>
-            </a:extLst>
-          </p:cNvPr>
-          <p:cNvSpPr txBox="1"/>
-          <p:nvPr/>
-        </p:nvSpPr>
-        <p:spPr>
-          <a:xfrm>
-            <a:off x="5924153" y="4490976"/>
-            <a:ext cx="1541518" cy="1200329"/>
-          </a:xfrm>
-          <a:prstGeom prst="rect">
-            <a:avLst/>
-          </a:prstGeom>
-          <a:noFill/>
-        </p:spPr>
-        <p:txBody>
-          <a:bodyPr wrap="square" rtlCol="0">
-            <a:spAutoFit/>
-          </a:bodyPr>
-          <a:lstStyle/>
-          <a:p>
-            <a:r>
-              <a:rPr lang="en-US" dirty="0">
-                <a:solidFill>
-                  <a:srgbClr val="FF32B4"/>
-                </a:solidFill>
-              </a:rPr>
-              <a:t>Run on random 10,000 String list</a:t>
-            </a:r>
-          </a:p>
-        </p:txBody>
-      </p:sp>
-      <p:pic>
-        <p:nvPicPr>
-          <p:cNvPr id="21" name="Picture 20">
-            <a:extLst>
-              <a:ext uri="{FF2B5EF4-FFF2-40B4-BE49-F238E27FC236}">
-                <a16:creationId xmlns:a16="http://schemas.microsoft.com/office/drawing/2014/main" id="{9BD695A8-68A6-D945-A775-EFA6067DEC3A}"/>
+                <a16:creationId xmlns:a16="http://schemas.microsoft.com/office/drawing/2014/main" id="{377832FA-B4C2-164D-BFCF-B446A6C5010A}"/>
               </a:ext>
             </a:extLst>
           </p:cNvPr>
@@ -7906,8 +8103,8 @@
         </p:blipFill>
         <p:spPr>
           <a:xfrm>
-            <a:off x="128634" y="1833064"/>
-            <a:ext cx="5247035" cy="4467355"/>
+            <a:off x="6020170" y="764373"/>
+            <a:ext cx="5150749" cy="5445078"/>
           </a:xfrm>
           <a:prstGeom prst="rect">
             <a:avLst/>
@@ -7917,7 +8114,7 @@
     </p:spTree>
     <p:extLst>
       <p:ext uri="{BB962C8B-B14F-4D97-AF65-F5344CB8AC3E}">
-        <p14:creationId xmlns:p14="http://schemas.microsoft.com/office/powerpoint/2010/main" val="2029637267"/>
+        <p14:creationId xmlns:p14="http://schemas.microsoft.com/office/powerpoint/2010/main" val="4009905473"/>
       </p:ext>
     </p:extLst>
   </p:cSld>
@@ -7954,6 +8151,240 @@
       </p:grpSpPr>
       <p:sp>
         <p:nvSpPr>
+          <p:cNvPr id="2" name="Title 1">
+            <a:extLst>
+              <a:ext uri="{FF2B5EF4-FFF2-40B4-BE49-F238E27FC236}">
+                <a16:creationId xmlns:a16="http://schemas.microsoft.com/office/drawing/2014/main" id="{0A373FDB-51C1-D047-A9AB-0A34B3201FF9}"/>
+              </a:ext>
+            </a:extLst>
+          </p:cNvPr>
+          <p:cNvSpPr>
+            <a:spLocks noGrp="1"/>
+          </p:cNvSpPr>
+          <p:nvPr>
+            <p:ph type="title"/>
+          </p:nvPr>
+        </p:nvSpPr>
+        <p:spPr>
+          <a:xfrm>
+            <a:off x="1958474" y="188036"/>
+            <a:ext cx="8567854" cy="1499326"/>
+          </a:xfrm>
+        </p:spPr>
+        <p:txBody>
+          <a:bodyPr>
+            <a:normAutofit/>
+          </a:bodyPr>
+          <a:lstStyle/>
+          <a:p>
+            <a:r>
+              <a:rPr lang="en-US" dirty="0">
+                <a:solidFill>
+                  <a:srgbClr val="0D009F"/>
+                </a:solidFill>
+              </a:rPr>
+              <a:t>Spliterator</a:t>
+            </a:r>
+            <a:br>
+              <a:rPr lang="en-US" dirty="0">
+                <a:solidFill>
+                  <a:srgbClr val="0D009F"/>
+                </a:solidFill>
+              </a:rPr>
+            </a:br>
+            <a:r>
+              <a:rPr lang="en-US" dirty="0">
+                <a:solidFill>
+                  <a:srgbClr val="FF32B4"/>
+                </a:solidFill>
+              </a:rPr>
+              <a:t>Continued</a:t>
+            </a:r>
+          </a:p>
+        </p:txBody>
+      </p:sp>
+      <p:pic>
+        <p:nvPicPr>
+          <p:cNvPr id="11" name="Picture 10">
+            <a:extLst>
+              <a:ext uri="{FF2B5EF4-FFF2-40B4-BE49-F238E27FC236}">
+                <a16:creationId xmlns:a16="http://schemas.microsoft.com/office/drawing/2014/main" id="{90B5701D-AD11-7D4B-97D1-FEA00A9A5EA2}"/>
+              </a:ext>
+            </a:extLst>
+          </p:cNvPr>
+          <p:cNvPicPr>
+            <a:picLocks noChangeAspect="1"/>
+          </p:cNvPicPr>
+          <p:nvPr/>
+        </p:nvPicPr>
+        <p:blipFill rotWithShape="1">
+          <a:blip r:embed="rId2"/>
+          <a:srcRect r="8426"/>
+          <a:stretch/>
+        </p:blipFill>
+        <p:spPr>
+          <a:xfrm>
+            <a:off x="7747321" y="3393502"/>
+            <a:ext cx="4444679" cy="1697638"/>
+          </a:xfrm>
+          <a:prstGeom prst="rect">
+            <a:avLst/>
+          </a:prstGeom>
+        </p:spPr>
+      </p:pic>
+      <p:cxnSp>
+        <p:nvCxnSpPr>
+          <p:cNvPr id="13" name="Straight Arrow Connector 12">
+            <a:extLst>
+              <a:ext uri="{FF2B5EF4-FFF2-40B4-BE49-F238E27FC236}">
+                <a16:creationId xmlns:a16="http://schemas.microsoft.com/office/drawing/2014/main" id="{6551FB2B-6138-C544-8578-5D91186372E4}"/>
+              </a:ext>
+            </a:extLst>
+          </p:cNvPr>
+          <p:cNvCxnSpPr>
+            <a:cxnSpLocks/>
+          </p:cNvCxnSpPr>
+          <p:nvPr/>
+        </p:nvCxnSpPr>
+        <p:spPr>
+          <a:xfrm>
+            <a:off x="5529998" y="4317357"/>
+            <a:ext cx="2062994" cy="0"/>
+          </a:xfrm>
+          <a:prstGeom prst="straightConnector1">
+            <a:avLst/>
+          </a:prstGeom>
+          <a:ln>
+            <a:solidFill>
+              <a:srgbClr val="FF32B4"/>
+            </a:solidFill>
+            <a:tailEnd type="triangle"/>
+          </a:ln>
+        </p:spPr>
+        <p:style>
+          <a:lnRef idx="1">
+            <a:schemeClr val="accent1"/>
+          </a:lnRef>
+          <a:fillRef idx="0">
+            <a:schemeClr val="accent1"/>
+          </a:fillRef>
+          <a:effectRef idx="0">
+            <a:schemeClr val="accent1"/>
+          </a:effectRef>
+          <a:fontRef idx="minor">
+            <a:schemeClr val="tx1"/>
+          </a:fontRef>
+        </p:style>
+      </p:cxnSp>
+      <p:sp>
+        <p:nvSpPr>
+          <p:cNvPr id="20" name="TextBox 19">
+            <a:extLst>
+              <a:ext uri="{FF2B5EF4-FFF2-40B4-BE49-F238E27FC236}">
+                <a16:creationId xmlns:a16="http://schemas.microsoft.com/office/drawing/2014/main" id="{A977AE86-0FA3-8541-9725-F817B5920664}"/>
+              </a:ext>
+            </a:extLst>
+          </p:cNvPr>
+          <p:cNvSpPr txBox="1"/>
+          <p:nvPr/>
+        </p:nvSpPr>
+        <p:spPr>
+          <a:xfrm>
+            <a:off x="5924153" y="4490976"/>
+            <a:ext cx="1541518" cy="1200329"/>
+          </a:xfrm>
+          <a:prstGeom prst="rect">
+            <a:avLst/>
+          </a:prstGeom>
+          <a:noFill/>
+        </p:spPr>
+        <p:txBody>
+          <a:bodyPr wrap="square" rtlCol="0">
+            <a:spAutoFit/>
+          </a:bodyPr>
+          <a:lstStyle/>
+          <a:p>
+            <a:r>
+              <a:rPr lang="en-US" dirty="0">
+                <a:solidFill>
+                  <a:srgbClr val="FF32B4"/>
+                </a:solidFill>
+              </a:rPr>
+              <a:t>Run on random 10,000 String list</a:t>
+            </a:r>
+          </a:p>
+        </p:txBody>
+      </p:sp>
+      <p:pic>
+        <p:nvPicPr>
+          <p:cNvPr id="21" name="Picture 20">
+            <a:extLst>
+              <a:ext uri="{FF2B5EF4-FFF2-40B4-BE49-F238E27FC236}">
+                <a16:creationId xmlns:a16="http://schemas.microsoft.com/office/drawing/2014/main" id="{9BD695A8-68A6-D945-A775-EFA6067DEC3A}"/>
+              </a:ext>
+            </a:extLst>
+          </p:cNvPr>
+          <p:cNvPicPr>
+            <a:picLocks noChangeAspect="1"/>
+          </p:cNvPicPr>
+          <p:nvPr/>
+        </p:nvPicPr>
+        <p:blipFill>
+          <a:blip r:embed="rId3"/>
+          <a:stretch>
+            <a:fillRect/>
+          </a:stretch>
+        </p:blipFill>
+        <p:spPr>
+          <a:xfrm>
+            <a:off x="128634" y="1833064"/>
+            <a:ext cx="5247035" cy="4467355"/>
+          </a:xfrm>
+          <a:prstGeom prst="rect">
+            <a:avLst/>
+          </a:prstGeom>
+        </p:spPr>
+      </p:pic>
+    </p:spTree>
+    <p:extLst>
+      <p:ext uri="{BB962C8B-B14F-4D97-AF65-F5344CB8AC3E}">
+        <p14:creationId xmlns:p14="http://schemas.microsoft.com/office/powerpoint/2010/main" val="2029637267"/>
+      </p:ext>
+    </p:extLst>
+  </p:cSld>
+  <p:clrMapOvr>
+    <a:masterClrMapping/>
+  </p:clrMapOvr>
+</p:sld>
+</file>
+
+<file path=ppt/slides/slide7.xml><?xml version="1.0" encoding="utf-8"?>
+<p:sld xmlns:a="http://schemas.openxmlformats.org/drawingml/2006/main" xmlns:r="http://schemas.openxmlformats.org/officeDocument/2006/relationships" xmlns:p="http://schemas.openxmlformats.org/presentationml/2006/main">
+  <p:cSld>
+    <p:bg>
+      <p:bgPr>
+        <a:solidFill>
+          <a:schemeClr val="bg1"/>
+        </a:solidFill>
+        <a:effectLst/>
+      </p:bgPr>
+    </p:bg>
+    <p:spTree>
+      <p:nvGrpSpPr>
+        <p:cNvPr id="1" name=""/>
+        <p:cNvGrpSpPr/>
+        <p:nvPr/>
+      </p:nvGrpSpPr>
+      <p:grpSpPr>
+        <a:xfrm>
+          <a:off x="0" y="0"/>
+          <a:ext cx="0" cy="0"/>
+          <a:chOff x="0" y="0"/>
+          <a:chExt cx="0" cy="0"/>
+        </a:xfrm>
+      </p:grpSpPr>
+      <p:sp>
+        <p:nvSpPr>
           <p:cNvPr id="13" name="Rectangle 12">
             <a:extLst>
               <a:ext uri="{FF2B5EF4-FFF2-40B4-BE49-F238E27FC236}">
@@ -8181,227 +8612,6 @@
     <p:extLst>
       <p:ext uri="{BB962C8B-B14F-4D97-AF65-F5344CB8AC3E}">
         <p14:creationId xmlns:p14="http://schemas.microsoft.com/office/powerpoint/2010/main" val="3207144312"/>
-      </p:ext>
-    </p:extLst>
-  </p:cSld>
-  <p:clrMapOvr>
-    <a:masterClrMapping/>
-  </p:clrMapOvr>
-</p:sld>
-</file>
-
-<file path=ppt/slides/slide7.xml><?xml version="1.0" encoding="utf-8"?>
-<p:sld xmlns:a="http://schemas.openxmlformats.org/drawingml/2006/main" xmlns:r="http://schemas.openxmlformats.org/officeDocument/2006/relationships" xmlns:p="http://schemas.openxmlformats.org/presentationml/2006/main">
-  <p:cSld>
-    <p:spTree>
-      <p:nvGrpSpPr>
-        <p:cNvPr id="1" name=""/>
-        <p:cNvGrpSpPr/>
-        <p:nvPr/>
-      </p:nvGrpSpPr>
-      <p:grpSpPr>
-        <a:xfrm>
-          <a:off x="0" y="0"/>
-          <a:ext cx="0" cy="0"/>
-          <a:chOff x="0" y="0"/>
-          <a:chExt cx="0" cy="0"/>
-        </a:xfrm>
-      </p:grpSpPr>
-      <p:sp>
-        <p:nvSpPr>
-          <p:cNvPr id="2" name="Title 1">
-            <a:extLst>
-              <a:ext uri="{FF2B5EF4-FFF2-40B4-BE49-F238E27FC236}">
-                <a16:creationId xmlns:a16="http://schemas.microsoft.com/office/drawing/2014/main" id="{DD7E1C04-0460-E645-AA08-45BDCAA2C457}"/>
-              </a:ext>
-            </a:extLst>
-          </p:cNvPr>
-          <p:cNvSpPr>
-            <a:spLocks noGrp="1"/>
-          </p:cNvSpPr>
-          <p:nvPr>
-            <p:ph type="title"/>
-          </p:nvPr>
-        </p:nvSpPr>
-        <p:spPr>
-          <a:xfrm>
-            <a:off x="2159619" y="284869"/>
-            <a:ext cx="8610600" cy="1633139"/>
-          </a:xfrm>
-        </p:spPr>
-        <p:txBody>
-          <a:bodyPr/>
-          <a:lstStyle/>
-          <a:p>
-            <a:r>
-              <a:rPr lang="en-US" dirty="0">
-                <a:solidFill>
-                  <a:srgbClr val="0D009F"/>
-                </a:solidFill>
-              </a:rPr>
-              <a:t>Collector</a:t>
-            </a:r>
-            <a:br>
-              <a:rPr lang="en-US" dirty="0"/>
-            </a:br>
-            <a:r>
-              <a:rPr lang="en-US" dirty="0">
-                <a:solidFill>
-                  <a:srgbClr val="FF32B4"/>
-                </a:solidFill>
-              </a:rPr>
-              <a:t>Continued</a:t>
-            </a:r>
-          </a:p>
-        </p:txBody>
-      </p:sp>
-      <p:pic>
-        <p:nvPicPr>
-          <p:cNvPr id="7" name="Picture 6">
-            <a:extLst>
-              <a:ext uri="{FF2B5EF4-FFF2-40B4-BE49-F238E27FC236}">
-                <a16:creationId xmlns:a16="http://schemas.microsoft.com/office/drawing/2014/main" id="{B9EB1BE8-7B2F-274D-96C4-A41FF1D82B2E}"/>
-              </a:ext>
-            </a:extLst>
-          </p:cNvPr>
-          <p:cNvPicPr>
-            <a:picLocks noChangeAspect="1"/>
-          </p:cNvPicPr>
-          <p:nvPr/>
-        </p:nvPicPr>
-        <p:blipFill>
-          <a:blip r:embed="rId2"/>
-          <a:stretch>
-            <a:fillRect/>
-          </a:stretch>
-        </p:blipFill>
-        <p:spPr>
-          <a:xfrm>
-            <a:off x="7137723" y="5600214"/>
-            <a:ext cx="4914900" cy="1066800"/>
-          </a:xfrm>
-          <a:prstGeom prst="rect">
-            <a:avLst/>
-          </a:prstGeom>
-        </p:spPr>
-      </p:pic>
-      <p:cxnSp>
-        <p:nvCxnSpPr>
-          <p:cNvPr id="9" name="Straight Arrow Connector 8">
-            <a:extLst>
-              <a:ext uri="{FF2B5EF4-FFF2-40B4-BE49-F238E27FC236}">
-                <a16:creationId xmlns:a16="http://schemas.microsoft.com/office/drawing/2014/main" id="{6980298C-C200-A84B-AAAA-2A314CDE113F}"/>
-              </a:ext>
-            </a:extLst>
-          </p:cNvPr>
-          <p:cNvCxnSpPr>
-            <a:cxnSpLocks/>
-          </p:cNvCxnSpPr>
-          <p:nvPr/>
-        </p:nvCxnSpPr>
-        <p:spPr>
-          <a:xfrm>
-            <a:off x="5515395" y="4487476"/>
-            <a:ext cx="1464139" cy="1112738"/>
-          </a:xfrm>
-          <a:prstGeom prst="straightConnector1">
-            <a:avLst/>
-          </a:prstGeom>
-          <a:ln>
-            <a:solidFill>
-              <a:srgbClr val="FF32B4"/>
-            </a:solidFill>
-            <a:tailEnd type="triangle"/>
-          </a:ln>
-        </p:spPr>
-        <p:style>
-          <a:lnRef idx="1">
-            <a:schemeClr val="accent1"/>
-          </a:lnRef>
-          <a:fillRef idx="0">
-            <a:schemeClr val="accent1"/>
-          </a:fillRef>
-          <a:effectRef idx="0">
-            <a:schemeClr val="accent1"/>
-          </a:effectRef>
-          <a:fontRef idx="minor">
-            <a:schemeClr val="tx1"/>
-          </a:fontRef>
-        </p:style>
-      </p:cxnSp>
-      <p:sp>
-        <p:nvSpPr>
-          <p:cNvPr id="10" name="TextBox 9">
-            <a:extLst>
-              <a:ext uri="{FF2B5EF4-FFF2-40B4-BE49-F238E27FC236}">
-                <a16:creationId xmlns:a16="http://schemas.microsoft.com/office/drawing/2014/main" id="{80A4A8B0-AC2E-524A-B302-981FEC5D6C1D}"/>
-              </a:ext>
-            </a:extLst>
-          </p:cNvPr>
-          <p:cNvSpPr txBox="1"/>
-          <p:nvPr/>
-        </p:nvSpPr>
-        <p:spPr>
-          <a:xfrm>
-            <a:off x="4566271" y="5235793"/>
-            <a:ext cx="1898248" cy="923330"/>
-          </a:xfrm>
-          <a:prstGeom prst="rect">
-            <a:avLst/>
-          </a:prstGeom>
-          <a:noFill/>
-        </p:spPr>
-        <p:txBody>
-          <a:bodyPr wrap="square" rtlCol="0">
-            <a:spAutoFit/>
-          </a:bodyPr>
-          <a:lstStyle/>
-          <a:p>
-            <a:r>
-              <a:rPr lang="en-US" dirty="0">
-                <a:solidFill>
-                  <a:srgbClr val="FF32B4"/>
-                </a:solidFill>
-              </a:rPr>
-              <a:t>Run on 26,000 Employee array</a:t>
-            </a:r>
-          </a:p>
-        </p:txBody>
-      </p:sp>
-      <p:pic>
-        <p:nvPicPr>
-          <p:cNvPr id="17" name="Picture 16">
-            <a:extLst>
-              <a:ext uri="{FF2B5EF4-FFF2-40B4-BE49-F238E27FC236}">
-                <a16:creationId xmlns:a16="http://schemas.microsoft.com/office/drawing/2014/main" id="{2817710E-7F87-D045-998A-2BA6696610A4}"/>
-              </a:ext>
-            </a:extLst>
-          </p:cNvPr>
-          <p:cNvPicPr>
-            <a:picLocks noChangeAspect="1"/>
-          </p:cNvPicPr>
-          <p:nvPr/>
-        </p:nvPicPr>
-        <p:blipFill>
-          <a:blip r:embed="rId3"/>
-          <a:stretch>
-            <a:fillRect/>
-          </a:stretch>
-        </p:blipFill>
-        <p:spPr>
-          <a:xfrm>
-            <a:off x="166708" y="1566476"/>
-            <a:ext cx="5816600" cy="2921000"/>
-          </a:xfrm>
-          <a:prstGeom prst="rect">
-            <a:avLst/>
-          </a:prstGeom>
-        </p:spPr>
-      </p:pic>
-    </p:spTree>
-    <p:extLst>
-      <p:ext uri="{BB962C8B-B14F-4D97-AF65-F5344CB8AC3E}">
-        <p14:creationId xmlns:p14="http://schemas.microsoft.com/office/powerpoint/2010/main" val="1675373992"/>
       </p:ext>
     </p:extLst>
   </p:cSld>
@@ -8433,7 +8643,7 @@
           <p:cNvPr id="2" name="Title 1">
             <a:extLst>
               <a:ext uri="{FF2B5EF4-FFF2-40B4-BE49-F238E27FC236}">
-                <a16:creationId xmlns:a16="http://schemas.microsoft.com/office/drawing/2014/main" id="{F0B8AD07-3716-7448-AF3A-D5698F7B6FC3}"/>
+                <a16:creationId xmlns:a16="http://schemas.microsoft.com/office/drawing/2014/main" id="{DD7E1C04-0460-E645-AA08-45BDCAA2C457}"/>
               </a:ext>
             </a:extLst>
           </p:cNvPr>
@@ -8446,14 +8656,12 @@
         </p:nvSpPr>
         <p:spPr>
           <a:xfrm>
-            <a:off x="3424912" y="429836"/>
-            <a:ext cx="8294648" cy="1733500"/>
-          </a:xfrm>
-        </p:spPr>
-        <p:txBody>
-          <a:bodyPr>
-            <a:normAutofit fontScale="90000"/>
-          </a:bodyPr>
+            <a:off x="2159619" y="284869"/>
+            <a:ext cx="8610600" cy="1633139"/>
+          </a:xfrm>
+        </p:spPr>
+        <p:txBody>
+          <a:bodyPr/>
           <a:lstStyle/>
           <a:p>
             <a:r>
@@ -8462,25 +8670,141 @@
                   <a:srgbClr val="0D009F"/>
                 </a:solidFill>
               </a:rPr>
-              <a:t>Practical Considerations </a:t>
-            </a:r>
+              <a:t>Collector</a:t>
+            </a:r>
+            <a:br>
+              <a:rPr lang="en-US" dirty="0"/>
+            </a:br>
             <a:r>
               <a:rPr lang="en-US" dirty="0">
                 <a:solidFill>
                   <a:srgbClr val="FF32B4"/>
                 </a:solidFill>
               </a:rPr>
-              <a:t>Long-Running/Blocking operations</a:t>
+              <a:t>Continued</a:t>
             </a:r>
           </a:p>
         </p:txBody>
       </p:sp>
       <p:pic>
         <p:nvPicPr>
-          <p:cNvPr id="14" name="Picture 13">
+          <p:cNvPr id="7" name="Picture 6">
             <a:extLst>
               <a:ext uri="{FF2B5EF4-FFF2-40B4-BE49-F238E27FC236}">
-                <a16:creationId xmlns:a16="http://schemas.microsoft.com/office/drawing/2014/main" id="{DBB821A3-96B2-7348-98B5-F79F0C94745F}"/>
+                <a16:creationId xmlns:a16="http://schemas.microsoft.com/office/drawing/2014/main" id="{B9EB1BE8-7B2F-274D-96C4-A41FF1D82B2E}"/>
+              </a:ext>
+            </a:extLst>
+          </p:cNvPr>
+          <p:cNvPicPr>
+            <a:picLocks noChangeAspect="1"/>
+          </p:cNvPicPr>
+          <p:nvPr/>
+        </p:nvPicPr>
+        <p:blipFill>
+          <a:blip r:embed="rId2"/>
+          <a:stretch>
+            <a:fillRect/>
+          </a:stretch>
+        </p:blipFill>
+        <p:spPr>
+          <a:xfrm>
+            <a:off x="7137723" y="5600214"/>
+            <a:ext cx="4914900" cy="1066800"/>
+          </a:xfrm>
+          <a:prstGeom prst="rect">
+            <a:avLst/>
+          </a:prstGeom>
+        </p:spPr>
+      </p:pic>
+      <p:cxnSp>
+        <p:nvCxnSpPr>
+          <p:cNvPr id="9" name="Straight Arrow Connector 8">
+            <a:extLst>
+              <a:ext uri="{FF2B5EF4-FFF2-40B4-BE49-F238E27FC236}">
+                <a16:creationId xmlns:a16="http://schemas.microsoft.com/office/drawing/2014/main" id="{6980298C-C200-A84B-AAAA-2A314CDE113F}"/>
+              </a:ext>
+            </a:extLst>
+          </p:cNvPr>
+          <p:cNvCxnSpPr>
+            <a:cxnSpLocks/>
+          </p:cNvCxnSpPr>
+          <p:nvPr/>
+        </p:nvCxnSpPr>
+        <p:spPr>
+          <a:xfrm>
+            <a:off x="5515395" y="4487476"/>
+            <a:ext cx="1464139" cy="1112738"/>
+          </a:xfrm>
+          <a:prstGeom prst="straightConnector1">
+            <a:avLst/>
+          </a:prstGeom>
+          <a:ln>
+            <a:solidFill>
+              <a:srgbClr val="FF32B4"/>
+            </a:solidFill>
+            <a:tailEnd type="triangle"/>
+          </a:ln>
+        </p:spPr>
+        <p:style>
+          <a:lnRef idx="1">
+            <a:schemeClr val="accent1"/>
+          </a:lnRef>
+          <a:fillRef idx="0">
+            <a:schemeClr val="accent1"/>
+          </a:fillRef>
+          <a:effectRef idx="0">
+            <a:schemeClr val="accent1"/>
+          </a:effectRef>
+          <a:fontRef idx="minor">
+            <a:schemeClr val="tx1"/>
+          </a:fontRef>
+        </p:style>
+      </p:cxnSp>
+      <p:sp>
+        <p:nvSpPr>
+          <p:cNvPr id="10" name="TextBox 9">
+            <a:extLst>
+              <a:ext uri="{FF2B5EF4-FFF2-40B4-BE49-F238E27FC236}">
+                <a16:creationId xmlns:a16="http://schemas.microsoft.com/office/drawing/2014/main" id="{80A4A8B0-AC2E-524A-B302-981FEC5D6C1D}"/>
+              </a:ext>
+            </a:extLst>
+          </p:cNvPr>
+          <p:cNvSpPr txBox="1"/>
+          <p:nvPr/>
+        </p:nvSpPr>
+        <p:spPr>
+          <a:xfrm>
+            <a:off x="4566271" y="5235793"/>
+            <a:ext cx="1898248" cy="923330"/>
+          </a:xfrm>
+          <a:prstGeom prst="rect">
+            <a:avLst/>
+          </a:prstGeom>
+          <a:noFill/>
+        </p:spPr>
+        <p:txBody>
+          <a:bodyPr wrap="square" rtlCol="0">
+            <a:spAutoFit/>
+          </a:bodyPr>
+          <a:lstStyle/>
+          <a:p>
+            <a:r>
+              <a:rPr lang="en-US" dirty="0">
+                <a:solidFill>
+                  <a:srgbClr val="FF32B4"/>
+                </a:solidFill>
+              </a:rPr>
+              <a:t>Run on 26,000 Employee array</a:t>
+            </a:r>
+          </a:p>
+        </p:txBody>
+      </p:sp>
+      <p:pic>
+        <p:nvPicPr>
+          <p:cNvPr id="17" name="Picture 16">
+            <a:extLst>
+              <a:ext uri="{FF2B5EF4-FFF2-40B4-BE49-F238E27FC236}">
+                <a16:creationId xmlns:a16="http://schemas.microsoft.com/office/drawing/2014/main" id="{2817710E-7F87-D045-998A-2BA6696610A4}"/>
               </a:ext>
             </a:extLst>
           </p:cNvPr>
@@ -8497,49 +8821,18 @@
         </p:blipFill>
         <p:spPr>
           <a:xfrm>
-            <a:off x="7358875" y="3427762"/>
-            <a:ext cx="4360685" cy="1283589"/>
+            <a:off x="1497796" y="1368084"/>
+            <a:ext cx="5816600" cy="2921000"/>
           </a:xfrm>
           <a:prstGeom prst="rect">
             <a:avLst/>
           </a:prstGeom>
-          <a:ln>
-            <a:noFill/>
-          </a:ln>
         </p:spPr>
       </p:pic>
-      <p:sp>
-        <p:nvSpPr>
-          <p:cNvPr id="4" name="Content Placeholder 3">
-            <a:extLst>
-              <a:ext uri="{FF2B5EF4-FFF2-40B4-BE49-F238E27FC236}">
-                <a16:creationId xmlns:a16="http://schemas.microsoft.com/office/drawing/2014/main" id="{E889ABFB-6A0B-E74A-8A9E-1D0D6D73B6F0}"/>
-              </a:ext>
-            </a:extLst>
-          </p:cNvPr>
-          <p:cNvSpPr>
-            <a:spLocks noGrp="1"/>
-          </p:cNvSpPr>
-          <p:nvPr>
-            <p:ph idx="1"/>
-          </p:nvPr>
-        </p:nvSpPr>
-        <p:spPr/>
-        <p:txBody>
-          <a:bodyPr/>
-          <a:lstStyle/>
-          <a:p>
-            <a:r>
-              <a:rPr lang="en-US" dirty="0"/>
-              <a:t>Make code example more succinct</a:t>
-            </a:r>
-          </a:p>
-        </p:txBody>
-      </p:sp>
     </p:spTree>
     <p:extLst>
       <p:ext uri="{BB962C8B-B14F-4D97-AF65-F5344CB8AC3E}">
-        <p14:creationId xmlns:p14="http://schemas.microsoft.com/office/powerpoint/2010/main" val="1285649568"/>
+        <p14:creationId xmlns:p14="http://schemas.microsoft.com/office/powerpoint/2010/main" val="1675373992"/>
       </p:ext>
     </p:extLst>
   </p:cSld>
@@ -8568,10 +8861,10 @@
       </p:grpSpPr>
       <p:sp>
         <p:nvSpPr>
-          <p:cNvPr id="3" name="Content Placeholder 2">
+          <p:cNvPr id="2" name="Title 1">
             <a:extLst>
               <a:ext uri="{FF2B5EF4-FFF2-40B4-BE49-F238E27FC236}">
-                <a16:creationId xmlns:a16="http://schemas.microsoft.com/office/drawing/2014/main" id="{F825007E-9610-794C-A4FA-CC0B330916B2}"/>
+                <a16:creationId xmlns:a16="http://schemas.microsoft.com/office/drawing/2014/main" id="{F0B8AD07-3716-7448-AF3A-D5698F7B6FC3}"/>
               </a:ext>
             </a:extLst>
           </p:cNvPr>
@@ -8579,51 +8872,23 @@
             <a:spLocks noGrp="1"/>
           </p:cNvSpPr>
           <p:nvPr>
-            <p:ph idx="1"/>
-          </p:nvPr>
-        </p:nvSpPr>
-        <p:spPr/>
-        <p:txBody>
-          <a:bodyPr/>
-          <a:lstStyle/>
-          <a:p>
-            <a:r>
-              <a:rPr lang="en-US" dirty="0"/>
-              <a:t>ADD EXPLANATION OF INTERFERENCE AND CODE EXAMPLE</a:t>
-            </a:r>
-          </a:p>
-        </p:txBody>
-      </p:sp>
-      <p:sp>
-        <p:nvSpPr>
-          <p:cNvPr id="8" name="Title 1">
-            <a:extLst>
-              <a:ext uri="{FF2B5EF4-FFF2-40B4-BE49-F238E27FC236}">
-                <a16:creationId xmlns:a16="http://schemas.microsoft.com/office/drawing/2014/main" id="{F3BDA1AF-0761-244D-97B6-8F65627BDC6F}"/>
-              </a:ext>
-            </a:extLst>
-          </p:cNvPr>
-          <p:cNvSpPr>
-            <a:spLocks noGrp="1"/>
-          </p:cNvSpPr>
-          <p:nvPr>
             <p:ph type="title"/>
           </p:nvPr>
         </p:nvSpPr>
         <p:spPr>
           <a:xfrm>
-            <a:off x="3402610" y="217962"/>
+            <a:off x="3424912" y="429836"/>
             <a:ext cx="8294648" cy="1733500"/>
           </a:xfrm>
         </p:spPr>
         <p:txBody>
           <a:bodyPr>
-            <a:noAutofit/>
+            <a:normAutofit fontScale="90000"/>
           </a:bodyPr>
           <a:lstStyle/>
           <a:p>
             <a:r>
-              <a:rPr lang="en-US" sz="3600" dirty="0">
+              <a:rPr lang="en-US" dirty="0">
                 <a:solidFill>
                   <a:srgbClr val="0D009F"/>
                 </a:solidFill>
@@ -8631,20 +8896,162 @@
               <a:t>Practical Considerations </a:t>
             </a:r>
             <a:r>
-              <a:rPr lang="en-US" sz="3600" dirty="0">
+              <a:rPr lang="en-US" dirty="0">
                 <a:solidFill>
                   <a:srgbClr val="FF32B4"/>
                 </a:solidFill>
               </a:rPr>
-              <a:t> interference</a:t>
-            </a:r>
-          </a:p>
-        </p:txBody>
-      </p:sp>
+              <a:t>Long-Running/Blocking operations</a:t>
+            </a:r>
+          </a:p>
+        </p:txBody>
+      </p:sp>
+      <p:pic>
+        <p:nvPicPr>
+          <p:cNvPr id="10" name="Picture 9">
+            <a:extLst>
+              <a:ext uri="{FF2B5EF4-FFF2-40B4-BE49-F238E27FC236}">
+                <a16:creationId xmlns:a16="http://schemas.microsoft.com/office/drawing/2014/main" id="{DE54F276-E67F-8849-9AB7-98C5836C148E}"/>
+              </a:ext>
+            </a:extLst>
+          </p:cNvPr>
+          <p:cNvPicPr>
+            <a:picLocks noChangeAspect="1"/>
+          </p:cNvPicPr>
+          <p:nvPr/>
+        </p:nvPicPr>
+        <p:blipFill>
+          <a:blip r:embed="rId3"/>
+          <a:stretch>
+            <a:fillRect/>
+          </a:stretch>
+        </p:blipFill>
+        <p:spPr>
+          <a:xfrm>
+            <a:off x="307613" y="2052746"/>
+            <a:ext cx="6234598" cy="2419190"/>
+          </a:xfrm>
+          <a:prstGeom prst="rect">
+            <a:avLst/>
+          </a:prstGeom>
+        </p:spPr>
+      </p:pic>
+      <p:cxnSp>
+        <p:nvCxnSpPr>
+          <p:cNvPr id="12" name="Straight Arrow Connector 11">
+            <a:extLst>
+              <a:ext uri="{FF2B5EF4-FFF2-40B4-BE49-F238E27FC236}">
+                <a16:creationId xmlns:a16="http://schemas.microsoft.com/office/drawing/2014/main" id="{4E263BCA-7BE5-0743-B8F1-2CA059021D2B}"/>
+              </a:ext>
+            </a:extLst>
+          </p:cNvPr>
+          <p:cNvCxnSpPr>
+            <a:cxnSpLocks/>
+          </p:cNvCxnSpPr>
+          <p:nvPr/>
+        </p:nvCxnSpPr>
+        <p:spPr>
+          <a:xfrm>
+            <a:off x="4127500" y="3987800"/>
+            <a:ext cx="2945114" cy="1361422"/>
+          </a:xfrm>
+          <a:prstGeom prst="straightConnector1">
+            <a:avLst/>
+          </a:prstGeom>
+          <a:ln>
+            <a:solidFill>
+              <a:srgbClr val="FF32B4"/>
+            </a:solidFill>
+            <a:tailEnd type="triangle"/>
+          </a:ln>
+        </p:spPr>
+        <p:style>
+          <a:lnRef idx="1">
+            <a:schemeClr val="accent1"/>
+          </a:lnRef>
+          <a:fillRef idx="0">
+            <a:schemeClr val="accent1"/>
+          </a:fillRef>
+          <a:effectRef idx="0">
+            <a:schemeClr val="accent1"/>
+          </a:effectRef>
+          <a:fontRef idx="minor">
+            <a:schemeClr val="tx1"/>
+          </a:fontRef>
+        </p:style>
+      </p:cxnSp>
+      <p:sp>
+        <p:nvSpPr>
+          <p:cNvPr id="13" name="TextBox 12">
+            <a:extLst>
+              <a:ext uri="{FF2B5EF4-FFF2-40B4-BE49-F238E27FC236}">
+                <a16:creationId xmlns:a16="http://schemas.microsoft.com/office/drawing/2014/main" id="{82FF30C7-4B7C-494E-8D51-1C8AD0927006}"/>
+              </a:ext>
+            </a:extLst>
+          </p:cNvPr>
+          <p:cNvSpPr txBox="1"/>
+          <p:nvPr/>
+        </p:nvSpPr>
+        <p:spPr>
+          <a:xfrm>
+            <a:off x="5895077" y="3468182"/>
+            <a:ext cx="1541518" cy="1200329"/>
+          </a:xfrm>
+          <a:prstGeom prst="rect">
+            <a:avLst/>
+          </a:prstGeom>
+          <a:noFill/>
+        </p:spPr>
+        <p:txBody>
+          <a:bodyPr wrap="square" rtlCol="0">
+            <a:spAutoFit/>
+          </a:bodyPr>
+          <a:lstStyle/>
+          <a:p>
+            <a:r>
+              <a:rPr lang="en-US" dirty="0">
+                <a:solidFill>
+                  <a:srgbClr val="FF32B4"/>
+                </a:solidFill>
+              </a:rPr>
+              <a:t>Run on random 10,000 String list</a:t>
+            </a:r>
+          </a:p>
+        </p:txBody>
+      </p:sp>
+      <p:pic>
+        <p:nvPicPr>
+          <p:cNvPr id="15" name="Picture 14">
+            <a:extLst>
+              <a:ext uri="{FF2B5EF4-FFF2-40B4-BE49-F238E27FC236}">
+                <a16:creationId xmlns:a16="http://schemas.microsoft.com/office/drawing/2014/main" id="{D78B3A98-7BAB-BB48-9F96-AE914B1D3954}"/>
+              </a:ext>
+            </a:extLst>
+          </p:cNvPr>
+          <p:cNvPicPr>
+            <a:picLocks noChangeAspect="1"/>
+          </p:cNvPicPr>
+          <p:nvPr/>
+        </p:nvPicPr>
+        <p:blipFill rotWithShape="1">
+          <a:blip r:embed="rId4"/>
+          <a:srcRect t="6532"/>
+          <a:stretch/>
+        </p:blipFill>
+        <p:spPr>
+          <a:xfrm>
+            <a:off x="7282484" y="5397500"/>
+            <a:ext cx="4021367" cy="690784"/>
+          </a:xfrm>
+          <a:prstGeom prst="rect">
+            <a:avLst/>
+          </a:prstGeom>
+        </p:spPr>
+      </p:pic>
     </p:spTree>
     <p:extLst>
       <p:ext uri="{BB962C8B-B14F-4D97-AF65-F5344CB8AC3E}">
-        <p14:creationId xmlns:p14="http://schemas.microsoft.com/office/powerpoint/2010/main" val="196559877"/>
+        <p14:creationId xmlns:p14="http://schemas.microsoft.com/office/powerpoint/2010/main" val="1285649568"/>
       </p:ext>
     </p:extLst>
   </p:cSld>

</xml_diff>

<commit_message>
Got what I think should be the majority of HW3 completed
</commit_message>
<xml_diff>
--- a/src/parallel_streams_presentation/p_stream_presentation.pptx
+++ b/src/parallel_streams_presentation/p_stream_presentation.pptx
@@ -12,8 +12,8 @@
     <p:sldId id="267" r:id="rId3"/>
     <p:sldId id="264" r:id="rId4"/>
     <p:sldId id="260" r:id="rId5"/>
-    <p:sldId id="257" r:id="rId6"/>
-    <p:sldId id="261" r:id="rId7"/>
+    <p:sldId id="261" r:id="rId6"/>
+    <p:sldId id="257" r:id="rId7"/>
     <p:sldId id="258" r:id="rId8"/>
     <p:sldId id="265" r:id="rId9"/>
     <p:sldId id="259" r:id="rId10"/>
@@ -843,6 +843,90 @@
     <p:extLst>
       <p:ext uri="{BB962C8B-B14F-4D97-AF65-F5344CB8AC3E}">
         <p14:creationId xmlns:p14="http://schemas.microsoft.com/office/powerpoint/2010/main" val="733504183"/>
+      </p:ext>
+    </p:extLst>
+  </p:cSld>
+  <p:clrMapOvr>
+    <a:masterClrMapping/>
+  </p:clrMapOvr>
+</p:notes>
+</file>
+
+<file path=ppt/notesSlides/notesSlide5.xml><?xml version="1.0" encoding="utf-8"?>
+<p:notes xmlns:a="http://schemas.openxmlformats.org/drawingml/2006/main" xmlns:r="http://schemas.openxmlformats.org/officeDocument/2006/relationships" xmlns:p="http://schemas.openxmlformats.org/presentationml/2006/main">
+  <p:cSld>
+    <p:spTree>
+      <p:nvGrpSpPr>
+        <p:cNvPr id="1" name=""/>
+        <p:cNvGrpSpPr/>
+        <p:nvPr/>
+      </p:nvGrpSpPr>
+      <p:grpSpPr>
+        <a:xfrm>
+          <a:off x="0" y="0"/>
+          <a:ext cx="0" cy="0"/>
+          <a:chOff x="0" y="0"/>
+          <a:chExt cx="0" cy="0"/>
+        </a:xfrm>
+      </p:grpSpPr>
+      <p:sp>
+        <p:nvSpPr>
+          <p:cNvPr id="2" name="Slide Image Placeholder 1"/>
+          <p:cNvSpPr>
+            <a:spLocks noGrp="1" noRot="1" noChangeAspect="1"/>
+          </p:cNvSpPr>
+          <p:nvPr>
+            <p:ph type="sldImg"/>
+          </p:nvPr>
+        </p:nvSpPr>
+        <p:spPr/>
+      </p:sp>
+      <p:sp>
+        <p:nvSpPr>
+          <p:cNvPr id="3" name="Notes Placeholder 2"/>
+          <p:cNvSpPr>
+            <a:spLocks noGrp="1"/>
+          </p:cNvSpPr>
+          <p:nvPr>
+            <p:ph type="body" idx="1"/>
+          </p:nvPr>
+        </p:nvSpPr>
+        <p:spPr/>
+        <p:txBody>
+          <a:bodyPr/>
+          <a:lstStyle/>
+          <a:p>
+            <a:endParaRPr lang="en-US" dirty="0"/>
+          </a:p>
+        </p:txBody>
+      </p:sp>
+      <p:sp>
+        <p:nvSpPr>
+          <p:cNvPr id="4" name="Slide Number Placeholder 3"/>
+          <p:cNvSpPr>
+            <a:spLocks noGrp="1"/>
+          </p:cNvSpPr>
+          <p:nvPr>
+            <p:ph type="sldNum" sz="quarter" idx="10"/>
+          </p:nvPr>
+        </p:nvSpPr>
+        <p:spPr/>
+        <p:txBody>
+          <a:bodyPr/>
+          <a:lstStyle/>
+          <a:p>
+            <a:fld id="{B1DBF306-6F9F-5B40-90B5-598FDD091CE2}" type="slidenum">
+              <a:rPr lang="en-US" smtClean="0"/>
+              <a:t>11</a:t>
+            </a:fld>
+            <a:endParaRPr lang="en-US"/>
+          </a:p>
+        </p:txBody>
+      </p:sp>
+    </p:spTree>
+    <p:extLst>
+      <p:ext uri="{BB962C8B-B14F-4D97-AF65-F5344CB8AC3E}">
+        <p14:creationId xmlns:p14="http://schemas.microsoft.com/office/powerpoint/2010/main" val="1917572602"/>
       </p:ext>
     </p:extLst>
   </p:cSld>
@@ -6660,7 +6744,7 @@
         </p:blipFill>
         <p:spPr>
           <a:xfrm>
-            <a:off x="6557150" y="3352806"/>
+            <a:off x="6557150" y="3594106"/>
             <a:ext cx="5634850" cy="1343408"/>
           </a:xfrm>
           <a:prstGeom prst="rect">
@@ -6690,8 +6774,8 @@
         </p:blipFill>
         <p:spPr>
           <a:xfrm>
-            <a:off x="342899" y="1250950"/>
-            <a:ext cx="5859887" cy="5200650"/>
+            <a:off x="571499" y="1327150"/>
+            <a:ext cx="6083301" cy="5398930"/>
           </a:xfrm>
           <a:prstGeom prst="rect">
             <a:avLst/>
@@ -6791,50 +6875,6 @@
           </a:p>
         </p:txBody>
       </p:sp>
-      <p:cxnSp>
-        <p:nvCxnSpPr>
-          <p:cNvPr id="7" name="Straight Arrow Connector 6">
-            <a:extLst>
-              <a:ext uri="{FF2B5EF4-FFF2-40B4-BE49-F238E27FC236}">
-                <a16:creationId xmlns:a16="http://schemas.microsoft.com/office/drawing/2014/main" id="{50BD4293-C5B2-754F-AD4F-1D45912F3DDE}"/>
-              </a:ext>
-            </a:extLst>
-          </p:cNvPr>
-          <p:cNvCxnSpPr>
-            <a:cxnSpLocks/>
-          </p:cNvCxnSpPr>
-          <p:nvPr/>
-        </p:nvCxnSpPr>
-        <p:spPr>
-          <a:xfrm>
-            <a:off x="2697760" y="3702050"/>
-            <a:ext cx="5163540" cy="1479550"/>
-          </a:xfrm>
-          <a:prstGeom prst="straightConnector1">
-            <a:avLst/>
-          </a:prstGeom>
-          <a:ln>
-            <a:solidFill>
-              <a:srgbClr val="FF32B4"/>
-            </a:solidFill>
-            <a:tailEnd type="triangle"/>
-          </a:ln>
-        </p:spPr>
-        <p:style>
-          <a:lnRef idx="1">
-            <a:schemeClr val="accent1"/>
-          </a:lnRef>
-          <a:fillRef idx="0">
-            <a:schemeClr val="accent1"/>
-          </a:fillRef>
-          <a:effectRef idx="0">
-            <a:schemeClr val="accent1"/>
-          </a:effectRef>
-          <a:fontRef idx="minor">
-            <a:schemeClr val="tx1"/>
-          </a:fontRef>
-        </p:style>
-      </p:cxnSp>
       <p:sp>
         <p:nvSpPr>
           <p:cNvPr id="9" name="TextBox 8">
@@ -6849,8 +6889,8 @@
         </p:nvSpPr>
         <p:spPr>
           <a:xfrm>
-            <a:off x="3865012" y="4404320"/>
-            <a:ext cx="1541518" cy="923330"/>
+            <a:off x="219121" y="4359735"/>
+            <a:ext cx="3183488" cy="369332"/>
           </a:xfrm>
           <a:prstGeom prst="rect">
             <a:avLst/>
@@ -6904,16 +6944,15 @@
           </p:cNvPicPr>
           <p:nvPr/>
         </p:nvPicPr>
-        <p:blipFill>
-          <a:blip r:embed="rId2"/>
-          <a:stretch>
-            <a:fillRect/>
-          </a:stretch>
+        <p:blipFill rotWithShape="1">
+          <a:blip r:embed="rId3"/>
+          <a:srcRect b="12465"/>
+          <a:stretch/>
         </p:blipFill>
         <p:spPr>
           <a:xfrm>
-            <a:off x="260349" y="2144672"/>
-            <a:ext cx="6596983" cy="1557378"/>
+            <a:off x="219121" y="2903957"/>
+            <a:ext cx="6474068" cy="1337843"/>
           </a:xfrm>
           <a:prstGeom prst="rect">
             <a:avLst/>
@@ -6935,20 +6974,59 @@
           <p:nvPr/>
         </p:nvPicPr>
         <p:blipFill rotWithShape="1">
-          <a:blip r:embed="rId3"/>
+          <a:blip r:embed="rId4"/>
           <a:srcRect t="1563"/>
           <a:stretch/>
         </p:blipFill>
         <p:spPr>
           <a:xfrm>
-            <a:off x="8153399" y="4043680"/>
-            <a:ext cx="2849113" cy="2719070"/>
+            <a:off x="7890942" y="3165544"/>
+            <a:ext cx="3276601" cy="3127046"/>
           </a:xfrm>
           <a:prstGeom prst="rect">
             <a:avLst/>
           </a:prstGeom>
         </p:spPr>
       </p:pic>
+      <p:sp>
+        <p:nvSpPr>
+          <p:cNvPr id="13" name="TextBox 12">
+            <a:extLst>
+              <a:ext uri="{FF2B5EF4-FFF2-40B4-BE49-F238E27FC236}">
+                <a16:creationId xmlns:a16="http://schemas.microsoft.com/office/drawing/2014/main" id="{12013941-1BDA-BD42-91DF-4DF1D218D20F}"/>
+              </a:ext>
+            </a:extLst>
+          </p:cNvPr>
+          <p:cNvSpPr txBox="1"/>
+          <p:nvPr/>
+        </p:nvSpPr>
+        <p:spPr>
+          <a:xfrm>
+            <a:off x="7937498" y="2719291"/>
+            <a:ext cx="3183488" cy="369332"/>
+          </a:xfrm>
+          <a:prstGeom prst="rect">
+            <a:avLst/>
+          </a:prstGeom>
+          <a:noFill/>
+        </p:spPr>
+        <p:txBody>
+          <a:bodyPr wrap="square" rtlCol="0">
+            <a:spAutoFit/>
+          </a:bodyPr>
+          <a:lstStyle/>
+          <a:p>
+            <a:r>
+              <a:rPr lang="en-US" dirty="0">
+                <a:solidFill>
+                  <a:srgbClr val="FF32B4"/>
+                </a:solidFill>
+              </a:rPr>
+              <a:t>Output</a:t>
+            </a:r>
+          </a:p>
+        </p:txBody>
+      </p:sp>
     </p:spTree>
     <p:extLst>
       <p:ext uri="{BB962C8B-B14F-4D97-AF65-F5344CB8AC3E}">
@@ -7173,7 +7251,12 @@
             <p:ph type="title"/>
           </p:nvPr>
         </p:nvSpPr>
-        <p:spPr/>
+        <p:spPr>
+          <a:xfrm>
+            <a:off x="6858000" y="0"/>
+            <a:ext cx="3479800" cy="1963587"/>
+          </a:xfrm>
+        </p:spPr>
         <p:txBody>
           <a:bodyPr/>
           <a:lstStyle/>
@@ -7184,7 +7267,7 @@
                   <a:srgbClr val="0D009F"/>
                 </a:solidFill>
               </a:rPr>
-              <a:t>Topics</a:t>
+              <a:t>Topics Covered</a:t>
             </a:r>
           </a:p>
         </p:txBody>
@@ -7205,60 +7288,122 @@
             <p:ph idx="1"/>
           </p:nvPr>
         </p:nvSpPr>
-        <p:spPr/>
-        <p:txBody>
-          <a:bodyPr/>
+        <p:spPr>
+          <a:xfrm>
+            <a:off x="279400" y="2194560"/>
+            <a:ext cx="11226800" cy="4024125"/>
+          </a:xfrm>
+        </p:spPr>
+        <p:txBody>
+          <a:bodyPr>
+            <a:normAutofit fontScale="92500" lnSpcReduction="10000"/>
+          </a:bodyPr>
           <a:lstStyle/>
           <a:p>
-            <a:pPr marL="457200" indent="-457200">
+            <a:pPr marL="457200" indent="-457200" algn="ctr">
               <a:buFont typeface="+mj-lt"/>
               <a:buAutoNum type="arabicPeriod"/>
             </a:pPr>
             <a:r>
-              <a:rPr lang="en-US" dirty="0"/>
-              <a:t>How to utilize parallel streams</a:t>
-            </a:r>
-          </a:p>
-          <a:p>
-            <a:pPr marL="457200" indent="-457200">
-              <a:buFont typeface="+mj-lt"/>
-              <a:buAutoNum type="arabicPeriod"/>
+              <a:rPr lang="en-US" sz="4000" dirty="0">
+                <a:solidFill>
+                  <a:srgbClr val="FF32B4"/>
+                </a:solidFill>
+              </a:rPr>
+              <a:t> How to utilize parallel streams</a:t>
+            </a:r>
+          </a:p>
+          <a:p>
+            <a:pPr marL="0" indent="0" algn="ctr">
+              <a:buNone/>
             </a:pPr>
-            <a:r>
-              <a:rPr lang="en-US" dirty="0"/>
-              <a:t>Overview on how they work</a:t>
-            </a:r>
-          </a:p>
-          <a:p>
-            <a:pPr marL="457200" indent="-457200">
-              <a:buFont typeface="+mj-lt"/>
-              <a:buAutoNum type="arabicPeriod"/>
+            <a:endParaRPr lang="en-US" sz="1000" dirty="0">
+              <a:solidFill>
+                <a:srgbClr val="FF32B4"/>
+              </a:solidFill>
+            </a:endParaRPr>
+          </a:p>
+          <a:p>
+            <a:pPr marL="0" indent="0" algn="ctr">
+              <a:buNone/>
             </a:pPr>
             <a:r>
-              <a:rPr lang="en-US" dirty="0"/>
-              <a:t>Explanation of Spliterator</a:t>
-            </a:r>
-          </a:p>
-          <a:p>
-            <a:pPr marL="457200" indent="-457200">
-              <a:buFont typeface="+mj-lt"/>
-              <a:buAutoNum type="arabicPeriod"/>
+              <a:rPr lang="en-US" sz="4000" dirty="0">
+                <a:solidFill>
+                  <a:srgbClr val="FF32B4"/>
+                </a:solidFill>
+              </a:rPr>
+              <a:t>2. Overview on how they work</a:t>
+            </a:r>
+          </a:p>
+          <a:p>
+            <a:pPr marL="0" indent="0" algn="ctr">
+              <a:buNone/>
             </a:pPr>
-            <a:r>
-              <a:rPr lang="en-US" dirty="0"/>
-              <a:t>Explanation of Collector</a:t>
-            </a:r>
-          </a:p>
-          <a:p>
-            <a:pPr marL="457200" indent="-457200">
-              <a:buFont typeface="+mj-lt"/>
-              <a:buAutoNum type="arabicPeriod"/>
+            <a:endParaRPr lang="en-US" sz="1000" dirty="0">
+              <a:solidFill>
+                <a:srgbClr val="FF32B4"/>
+              </a:solidFill>
+            </a:endParaRPr>
+          </a:p>
+          <a:p>
+            <a:pPr marL="0" indent="0" algn="ctr">
+              <a:buNone/>
             </a:pPr>
             <a:r>
-              <a:rPr lang="en-US"/>
-              <a:t>Common mistakes </a:t>
-            </a:r>
-            <a:endParaRPr lang="en-US" dirty="0"/>
+              <a:rPr lang="en-US" sz="4000" dirty="0">
+                <a:solidFill>
+                  <a:srgbClr val="FF32B4"/>
+                </a:solidFill>
+              </a:rPr>
+              <a:t>3. Explanation of Spliterator</a:t>
+            </a:r>
+          </a:p>
+          <a:p>
+            <a:pPr marL="0" indent="0" algn="ctr">
+              <a:buNone/>
+            </a:pPr>
+            <a:endParaRPr lang="en-US" sz="1000" dirty="0">
+              <a:solidFill>
+                <a:srgbClr val="FF32B4"/>
+              </a:solidFill>
+            </a:endParaRPr>
+          </a:p>
+          <a:p>
+            <a:pPr marL="0" indent="0" algn="ctr">
+              <a:buNone/>
+            </a:pPr>
+            <a:r>
+              <a:rPr lang="en-US" sz="4000" dirty="0">
+                <a:solidFill>
+                  <a:srgbClr val="FF32B4"/>
+                </a:solidFill>
+              </a:rPr>
+              <a:t>4. Explanation of Collector</a:t>
+            </a:r>
+          </a:p>
+          <a:p>
+            <a:pPr marL="0" indent="0" algn="ctr">
+              <a:buNone/>
+            </a:pPr>
+            <a:endParaRPr lang="en-US" sz="1100" dirty="0">
+              <a:solidFill>
+                <a:srgbClr val="FF32B4"/>
+              </a:solidFill>
+            </a:endParaRPr>
+          </a:p>
+          <a:p>
+            <a:pPr marL="0" indent="0" algn="ctr">
+              <a:buNone/>
+            </a:pPr>
+            <a:r>
+              <a:rPr lang="en-US" sz="4000" dirty="0">
+                <a:solidFill>
+                  <a:srgbClr val="FF32B4"/>
+                </a:solidFill>
+              </a:rPr>
+              <a:t>5. Practical Considerations (easy mistakes)</a:t>
+            </a:r>
           </a:p>
         </p:txBody>
       </p:sp>
@@ -7865,116 +8010,14 @@
       </p:grpSpPr>
       <p:sp>
         <p:nvSpPr>
-          <p:cNvPr id="17" name="Rectangle 16">
+          <p:cNvPr id="2" name="Title 1">
             <a:extLst>
               <a:ext uri="{FF2B5EF4-FFF2-40B4-BE49-F238E27FC236}">
-                <a16:creationId xmlns:a16="http://schemas.microsoft.com/office/drawing/2014/main" id="{86817BFA-9939-42FC-97E6-1DDD23A38EB9}"/>
+                <a16:creationId xmlns:a16="http://schemas.microsoft.com/office/drawing/2014/main" id="{0A373FDB-51C1-D047-A9AB-0A34B3201FF9}"/>
               </a:ext>
             </a:extLst>
           </p:cNvPr>
           <p:cNvSpPr>
-            <a:spLocks noGrp="1" noRot="1" noChangeAspect="1" noMove="1" noResize="1" noEditPoints="1" noAdjustHandles="1" noChangeArrowheads="1" noChangeShapeType="1" noTextEdit="1"/>
-          </p:cNvSpPr>
-          <p:nvPr>
-            <p:extLst>
-              <p:ext uri="{386F3935-93C4-4BCD-93E2-E3B085C9AB24}">
-                <p16:designElem xmlns:p16="http://schemas.microsoft.com/office/powerpoint/2015/main" val="1"/>
-              </p:ext>
-            </p:extLst>
-          </p:nvPr>
-        </p:nvSpPr>
-        <p:spPr>
-          <a:xfrm>
-            <a:off x="0" y="0"/>
-            <a:ext cx="12192000" cy="6858000"/>
-          </a:xfrm>
-          <a:prstGeom prst="rect">
-            <a:avLst/>
-          </a:prstGeom>
-          <a:solidFill>
-            <a:schemeClr val="bg1"/>
-          </a:solidFill>
-          <a:ln>
-            <a:noFill/>
-          </a:ln>
-        </p:spPr>
-        <p:style>
-          <a:lnRef idx="2">
-            <a:schemeClr val="accent1">
-              <a:shade val="50000"/>
-            </a:schemeClr>
-          </a:lnRef>
-          <a:fillRef idx="1">
-            <a:schemeClr val="accent1"/>
-          </a:fillRef>
-          <a:effectRef idx="0">
-            <a:schemeClr val="accent1"/>
-          </a:effectRef>
-          <a:fontRef idx="minor">
-            <a:schemeClr val="lt1"/>
-          </a:fontRef>
-        </p:style>
-        <p:txBody>
-          <a:bodyPr rtlCol="0" anchor="ctr"/>
-          <a:lstStyle/>
-          <a:p>
-            <a:pPr algn="ctr"/>
-            <a:endParaRPr lang="en-US"/>
-          </a:p>
-        </p:txBody>
-      </p:sp>
-      <p:pic>
-        <p:nvPicPr>
-          <p:cNvPr id="19" name="Picture 18">
-            <a:extLst>
-              <a:ext uri="{FF2B5EF4-FFF2-40B4-BE49-F238E27FC236}">
-                <a16:creationId xmlns:a16="http://schemas.microsoft.com/office/drawing/2014/main" id="{A4C4F977-CDDE-402E-B4F0-84B5572E77C3}"/>
-              </a:ext>
-            </a:extLst>
-          </p:cNvPr>
-          <p:cNvPicPr>
-            <a:picLocks noGrp="1" noRot="1" noChangeAspect="1" noMove="1" noResize="1" noEditPoints="1" noAdjustHandles="1" noChangeArrowheads="1" noChangeShapeType="1" noCrop="1"/>
-          </p:cNvPicPr>
-          <p:nvPr>
-            <p:extLst>
-              <p:ext uri="{386F3935-93C4-4BCD-93E2-E3B085C9AB24}">
-                <p16:designElem xmlns:p16="http://schemas.microsoft.com/office/powerpoint/2015/main" val="1"/>
-              </p:ext>
-            </p:extLst>
-          </p:nvPr>
-        </p:nvPicPr>
-        <p:blipFill>
-          <a:blip r:embed="rId2">
-            <a:extLst>
-              <a:ext uri="{28A0092B-C50C-407E-A947-70E740481C1C}">
-                <a14:useLocalDpi xmlns:a14="http://schemas.microsoft.com/office/drawing/2010/main" val="0"/>
-              </a:ext>
-            </a:extLst>
-          </a:blip>
-          <a:stretch>
-            <a:fillRect/>
-          </a:stretch>
-        </p:blipFill>
-        <p:spPr>
-          <a:xfrm>
-            <a:off x="0" y="0"/>
-            <a:ext cx="12192000" cy="1441450"/>
-          </a:xfrm>
-          <a:prstGeom prst="rect">
-            <a:avLst/>
-          </a:prstGeom>
-        </p:spPr>
-      </p:pic>
-      <p:sp>
-        <p:nvSpPr>
-          <p:cNvPr id="2" name="Title 1">
-            <a:extLst>
-              <a:ext uri="{FF2B5EF4-FFF2-40B4-BE49-F238E27FC236}">
-                <a16:creationId xmlns:a16="http://schemas.microsoft.com/office/drawing/2014/main" id="{46B0BF59-18F4-644D-B0C0-B97E8C40FFE3}"/>
-              </a:ext>
-            </a:extLst>
-          </p:cNvPr>
-          <p:cNvSpPr>
             <a:spLocks noGrp="1"/>
           </p:cNvSpPr>
           <p:nvPr>
@@ -7983,110 +8026,239 @@
         </p:nvSpPr>
         <p:spPr>
           <a:xfrm>
-            <a:off x="685799" y="764373"/>
-            <a:ext cx="3977639" cy="1600200"/>
-          </a:xfrm>
-        </p:spPr>
-        <p:txBody>
-          <a:bodyPr anchor="b">
+            <a:off x="1958474" y="188036"/>
+            <a:ext cx="8567854" cy="1499326"/>
+          </a:xfrm>
+        </p:spPr>
+        <p:txBody>
+          <a:bodyPr>
             <a:normAutofit/>
           </a:bodyPr>
           <a:lstStyle/>
           <a:p>
-            <a:pPr algn="l"/>
             <a:r>
               <a:rPr lang="en-US" dirty="0">
                 <a:solidFill>
                   <a:srgbClr val="0D009F"/>
                 </a:solidFill>
               </a:rPr>
-              <a:t>Spliterator</a:t>
-            </a:r>
-          </a:p>
-        </p:txBody>
-      </p:sp>
-      <p:sp>
-        <p:nvSpPr>
-          <p:cNvPr id="14" name="Content Placeholder 13"/>
-          <p:cNvSpPr>
-            <a:spLocks noGrp="1"/>
-          </p:cNvSpPr>
-          <p:nvPr>
-            <p:ph idx="1"/>
-          </p:nvPr>
-        </p:nvSpPr>
-        <p:spPr>
-          <a:xfrm>
-            <a:off x="685799" y="2462544"/>
-            <a:ext cx="4176133" cy="4105523"/>
-          </a:xfrm>
-        </p:spPr>
-        <p:txBody>
-          <a:bodyPr>
-            <a:normAutofit/>
+              <a:t>How they work</a:t>
+            </a:r>
+            <a:br>
+              <a:rPr lang="en-US" dirty="0">
+                <a:solidFill>
+                  <a:srgbClr val="0D009F"/>
+                </a:solidFill>
+              </a:rPr>
+            </a:br>
+            <a:r>
+              <a:rPr lang="en-US" dirty="0">
+                <a:solidFill>
+                  <a:srgbClr val="FF32B4"/>
+                </a:solidFill>
+              </a:rPr>
+              <a:t>Continued</a:t>
+            </a:r>
+          </a:p>
+        </p:txBody>
+      </p:sp>
+      <p:sp>
+        <p:nvSpPr>
+          <p:cNvPr id="20" name="TextBox 19">
+            <a:extLst>
+              <a:ext uri="{FF2B5EF4-FFF2-40B4-BE49-F238E27FC236}">
+                <a16:creationId xmlns:a16="http://schemas.microsoft.com/office/drawing/2014/main" id="{A977AE86-0FA3-8541-9725-F817B5920664}"/>
+              </a:ext>
+            </a:extLst>
+          </p:cNvPr>
+          <p:cNvSpPr txBox="1"/>
+          <p:nvPr/>
+        </p:nvSpPr>
+        <p:spPr>
+          <a:xfrm>
+            <a:off x="7550792" y="5277364"/>
+            <a:ext cx="4228458" cy="369332"/>
+          </a:xfrm>
+          <a:prstGeom prst="rect">
+            <a:avLst/>
+          </a:prstGeom>
+          <a:noFill/>
+        </p:spPr>
+        <p:txBody>
+          <a:bodyPr wrap="square" rtlCol="0">
+            <a:spAutoFit/>
           </a:bodyPr>
           <a:lstStyle/>
           <a:p>
             <a:r>
-              <a:rPr lang="en-US" sz="2400" dirty="0"/>
-              <a:t>”Split + iterator”- Used to traverse and split </a:t>
-            </a:r>
-            <a:r>
-              <a:rPr lang="en-US" sz="2400" dirty="0" err="1"/>
-              <a:t>substreams</a:t>
-            </a:r>
-            <a:endParaRPr lang="en-US" sz="2400" dirty="0"/>
-          </a:p>
-          <a:p>
-            <a:r>
-              <a:rPr lang="en-US" sz="2400" dirty="0"/>
-              <a:t>Traverses via </a:t>
-            </a:r>
-            <a:r>
-              <a:rPr lang="en-US" sz="2400" dirty="0" err="1"/>
-              <a:t>tryAdvance</a:t>
-            </a:r>
-            <a:r>
-              <a:rPr lang="en-US" sz="2400" dirty="0"/>
-              <a:t>() or </a:t>
-            </a:r>
-            <a:r>
-              <a:rPr lang="en-US" sz="2400" dirty="0" err="1"/>
-              <a:t>forEachRemaining</a:t>
-            </a:r>
-            <a:r>
-              <a:rPr lang="en-US" sz="2400" dirty="0"/>
-              <a:t>()</a:t>
-            </a:r>
-          </a:p>
-          <a:p>
-            <a:r>
-              <a:rPr lang="en-US" sz="2400" dirty="0"/>
-              <a:t>Can split itself into two spliterators via </a:t>
-            </a:r>
-            <a:r>
-              <a:rPr lang="en-US" sz="2400" dirty="0" err="1"/>
-              <a:t>trySplit</a:t>
-            </a:r>
-            <a:r>
-              <a:rPr lang="en-US" sz="2400" dirty="0"/>
-              <a:t>()</a:t>
-            </a:r>
-          </a:p>
-          <a:p>
-            <a:r>
-              <a:rPr lang="en-US" sz="2400" dirty="0"/>
-              <a:t>Contains same characteristics as a Stream</a:t>
-            </a:r>
-          </a:p>
-        </p:txBody>
-      </p:sp>
+              <a:rPr lang="en-US" dirty="0">
+                <a:solidFill>
+                  <a:srgbClr val="FF32B4"/>
+                </a:solidFill>
+              </a:rPr>
+              <a:t>Run on random 26,000 Employee list</a:t>
+            </a:r>
+          </a:p>
+        </p:txBody>
+      </p:sp>
+      <p:graphicFrame>
+        <p:nvGraphicFramePr>
+          <p:cNvPr id="10" name="Table 9">
+            <a:extLst>
+              <a:ext uri="{FF2B5EF4-FFF2-40B4-BE49-F238E27FC236}">
+                <a16:creationId xmlns:a16="http://schemas.microsoft.com/office/drawing/2014/main" id="{5FEBD353-2201-0A4C-A001-8F46A08A9725}"/>
+              </a:ext>
+            </a:extLst>
+          </p:cNvPr>
+          <p:cNvGraphicFramePr>
+            <a:graphicFrameLocks noGrp="1"/>
+          </p:cNvGraphicFramePr>
+          <p:nvPr>
+            <p:extLst>
+              <p:ext uri="{D42A27DB-BD31-4B8C-83A1-F6EECF244321}">
+                <p14:modId xmlns:p14="http://schemas.microsoft.com/office/powerpoint/2010/main" val="444603569"/>
+              </p:ext>
+            </p:extLst>
+          </p:nvPr>
+        </p:nvGraphicFramePr>
+        <p:xfrm>
+          <a:off x="7646042" y="2752369"/>
+          <a:ext cx="4037958" cy="2340329"/>
+        </p:xfrm>
+        <a:graphic>
+          <a:graphicData uri="http://schemas.openxmlformats.org/drawingml/2006/table">
+            <a:tbl>
+              <a:tblPr firstRow="1" bandRow="1">
+                <a:tableStyleId>{C4B1156A-380E-4F78-BDF5-A606A8083BF9}</a:tableStyleId>
+              </a:tblPr>
+              <a:tblGrid>
+                <a:gridCol w="2018979">
+                  <a:extLst>
+                    <a:ext uri="{9D8B030D-6E8A-4147-A177-3AD203B41FA5}">
+                      <a16:colId xmlns:a16="http://schemas.microsoft.com/office/drawing/2014/main" val="3333246323"/>
+                    </a:ext>
+                  </a:extLst>
+                </a:gridCol>
+                <a:gridCol w="2018979">
+                  <a:extLst>
+                    <a:ext uri="{9D8B030D-6E8A-4147-A177-3AD203B41FA5}">
+                      <a16:colId xmlns:a16="http://schemas.microsoft.com/office/drawing/2014/main" val="61095332"/>
+                    </a:ext>
+                  </a:extLst>
+                </a:gridCol>
+              </a:tblGrid>
+              <a:tr h="1162094">
+                <a:tc>
+                  <a:txBody>
+                    <a:bodyPr/>
+                    <a:lstStyle/>
+                    <a:p>
+                      <a:pPr algn="ctr"/>
+                      <a:endParaRPr lang="en-US" b="0" dirty="0"/>
+                    </a:p>
+                    <a:p>
+                      <a:pPr algn="ctr"/>
+                      <a:r>
+                        <a:rPr lang="en-US" b="0" dirty="0"/>
+                        <a:t>Serial</a:t>
+                      </a:r>
+                    </a:p>
+                  </a:txBody>
+                  <a:tcPr/>
+                </a:tc>
+                <a:tc>
+                  <a:txBody>
+                    <a:bodyPr/>
+                    <a:lstStyle/>
+                    <a:p>
+                      <a:pPr algn="ctr"/>
+                      <a:endParaRPr lang="en-US" b="0" dirty="0"/>
+                    </a:p>
+                    <a:p>
+                      <a:pPr algn="ctr"/>
+                      <a:r>
+                        <a:rPr lang="en-US" b="0" dirty="0"/>
+                        <a:t>1.516 </a:t>
+                      </a:r>
+                      <a:r>
+                        <a:rPr lang="en-US" b="0" dirty="0" err="1"/>
+                        <a:t>ms</a:t>
+                      </a:r>
+                      <a:r>
+                        <a:rPr lang="en-US" b="0" dirty="0"/>
+                        <a:t>/op</a:t>
+                      </a:r>
+                    </a:p>
+                  </a:txBody>
+                  <a:tcPr/>
+                </a:tc>
+                <a:extLst>
+                  <a:ext uri="{0D108BD9-81ED-4DB2-BD59-A6C34878D82A}">
+                    <a16:rowId xmlns:a16="http://schemas.microsoft.com/office/drawing/2014/main" val="578014337"/>
+                  </a:ext>
+                </a:extLst>
+              </a:tr>
+              <a:tr h="1178235">
+                <a:tc>
+                  <a:txBody>
+                    <a:bodyPr/>
+                    <a:lstStyle/>
+                    <a:p>
+                      <a:pPr algn="ctr"/>
+                      <a:endParaRPr lang="en-US" dirty="0"/>
+                    </a:p>
+                    <a:p>
+                      <a:pPr algn="ctr"/>
+                      <a:r>
+                        <a:rPr lang="en-US" dirty="0"/>
+                        <a:t>Parallel</a:t>
+                      </a:r>
+                    </a:p>
+                  </a:txBody>
+                  <a:tcPr/>
+                </a:tc>
+                <a:tc>
+                  <a:txBody>
+                    <a:bodyPr/>
+                    <a:lstStyle/>
+                    <a:p>
+                      <a:pPr algn="ctr"/>
+                      <a:endParaRPr lang="en-US" dirty="0"/>
+                    </a:p>
+                    <a:p>
+                      <a:pPr algn="ctr"/>
+                      <a:r>
+                        <a:rPr lang="en-US" dirty="0"/>
+                        <a:t>.699 </a:t>
+                      </a:r>
+                      <a:r>
+                        <a:rPr lang="en-US" dirty="0" err="1"/>
+                        <a:t>ms</a:t>
+                      </a:r>
+                      <a:r>
+                        <a:rPr lang="en-US" dirty="0"/>
+                        <a:t>/op</a:t>
+                      </a:r>
+                    </a:p>
+                  </a:txBody>
+                  <a:tcPr/>
+                </a:tc>
+                <a:extLst>
+                  <a:ext uri="{0D108BD9-81ED-4DB2-BD59-A6C34878D82A}">
+                    <a16:rowId xmlns:a16="http://schemas.microsoft.com/office/drawing/2014/main" val="1816897253"/>
+                  </a:ext>
+                </a:extLst>
+              </a:tr>
+            </a:tbl>
+          </a:graphicData>
+        </a:graphic>
+      </p:graphicFrame>
       <p:pic>
         <p:nvPicPr>
-          <p:cNvPr id="4" name="Picture 3">
+          <p:cNvPr id="14" name="Picture 13">
             <a:extLst>
               <a:ext uri="{FF2B5EF4-FFF2-40B4-BE49-F238E27FC236}">
-                <a16:creationId xmlns:a16="http://schemas.microsoft.com/office/drawing/2014/main" id="{377832FA-B4C2-164D-BFCF-B446A6C5010A}"/>
+                <a16:creationId xmlns:a16="http://schemas.microsoft.com/office/drawing/2014/main" id="{7B46C173-288E-0E44-8124-19E2B58E91CB}"/>
               </a:ext>
             </a:extLst>
           </p:cNvPr>
@@ -8095,16 +8267,15 @@
           </p:cNvPicPr>
           <p:nvPr/>
         </p:nvPicPr>
-        <p:blipFill>
-          <a:blip r:embed="rId3"/>
-          <a:stretch>
-            <a:fillRect/>
-          </a:stretch>
+        <p:blipFill rotWithShape="1">
+          <a:blip r:embed="rId2"/>
+          <a:srcRect l="1544"/>
+          <a:stretch/>
         </p:blipFill>
         <p:spPr>
           <a:xfrm>
-            <a:off x="6020170" y="764373"/>
-            <a:ext cx="5150749" cy="5445078"/>
+            <a:off x="310397" y="2585998"/>
+            <a:ext cx="6122253" cy="3060698"/>
           </a:xfrm>
           <a:prstGeom prst="rect">
             <a:avLst/>
@@ -8114,7 +8285,7 @@
     </p:spTree>
     <p:extLst>
       <p:ext uri="{BB962C8B-B14F-4D97-AF65-F5344CB8AC3E}">
-        <p14:creationId xmlns:p14="http://schemas.microsoft.com/office/powerpoint/2010/main" val="4009905473"/>
+        <p14:creationId xmlns:p14="http://schemas.microsoft.com/office/powerpoint/2010/main" val="2029637267"/>
       </p:ext>
     </p:extLst>
   </p:cSld>
@@ -8151,10 +8322,112 @@
       </p:grpSpPr>
       <p:sp>
         <p:nvSpPr>
+          <p:cNvPr id="17" name="Rectangle 16">
+            <a:extLst>
+              <a:ext uri="{FF2B5EF4-FFF2-40B4-BE49-F238E27FC236}">
+                <a16:creationId xmlns:a16="http://schemas.microsoft.com/office/drawing/2014/main" id="{86817BFA-9939-42FC-97E6-1DDD23A38EB9}"/>
+              </a:ext>
+            </a:extLst>
+          </p:cNvPr>
+          <p:cNvSpPr>
+            <a:spLocks noGrp="1" noRot="1" noChangeAspect="1" noMove="1" noResize="1" noEditPoints="1" noAdjustHandles="1" noChangeArrowheads="1" noChangeShapeType="1" noTextEdit="1"/>
+          </p:cNvSpPr>
+          <p:nvPr>
+            <p:extLst>
+              <p:ext uri="{386F3935-93C4-4BCD-93E2-E3B085C9AB24}">
+                <p16:designElem xmlns:p16="http://schemas.microsoft.com/office/powerpoint/2015/main" val="1"/>
+              </p:ext>
+            </p:extLst>
+          </p:nvPr>
+        </p:nvSpPr>
+        <p:spPr>
+          <a:xfrm>
+            <a:off x="0" y="0"/>
+            <a:ext cx="12192000" cy="6858000"/>
+          </a:xfrm>
+          <a:prstGeom prst="rect">
+            <a:avLst/>
+          </a:prstGeom>
+          <a:solidFill>
+            <a:schemeClr val="bg1"/>
+          </a:solidFill>
+          <a:ln>
+            <a:noFill/>
+          </a:ln>
+        </p:spPr>
+        <p:style>
+          <a:lnRef idx="2">
+            <a:schemeClr val="accent1">
+              <a:shade val="50000"/>
+            </a:schemeClr>
+          </a:lnRef>
+          <a:fillRef idx="1">
+            <a:schemeClr val="accent1"/>
+          </a:fillRef>
+          <a:effectRef idx="0">
+            <a:schemeClr val="accent1"/>
+          </a:effectRef>
+          <a:fontRef idx="minor">
+            <a:schemeClr val="lt1"/>
+          </a:fontRef>
+        </p:style>
+        <p:txBody>
+          <a:bodyPr rtlCol="0" anchor="ctr"/>
+          <a:lstStyle/>
+          <a:p>
+            <a:pPr algn="ctr"/>
+            <a:endParaRPr lang="en-US"/>
+          </a:p>
+        </p:txBody>
+      </p:sp>
+      <p:pic>
+        <p:nvPicPr>
+          <p:cNvPr id="19" name="Picture 18">
+            <a:extLst>
+              <a:ext uri="{FF2B5EF4-FFF2-40B4-BE49-F238E27FC236}">
+                <a16:creationId xmlns:a16="http://schemas.microsoft.com/office/drawing/2014/main" id="{A4C4F977-CDDE-402E-B4F0-84B5572E77C3}"/>
+              </a:ext>
+            </a:extLst>
+          </p:cNvPr>
+          <p:cNvPicPr>
+            <a:picLocks noGrp="1" noRot="1" noChangeAspect="1" noMove="1" noResize="1" noEditPoints="1" noAdjustHandles="1" noChangeArrowheads="1" noChangeShapeType="1" noCrop="1"/>
+          </p:cNvPicPr>
+          <p:nvPr>
+            <p:extLst>
+              <p:ext uri="{386F3935-93C4-4BCD-93E2-E3B085C9AB24}">
+                <p16:designElem xmlns:p16="http://schemas.microsoft.com/office/powerpoint/2015/main" val="1"/>
+              </p:ext>
+            </p:extLst>
+          </p:nvPr>
+        </p:nvPicPr>
+        <p:blipFill>
+          <a:blip r:embed="rId2">
+            <a:extLst>
+              <a:ext uri="{28A0092B-C50C-407E-A947-70E740481C1C}">
+                <a14:useLocalDpi xmlns:a14="http://schemas.microsoft.com/office/drawing/2010/main" val="0"/>
+              </a:ext>
+            </a:extLst>
+          </a:blip>
+          <a:stretch>
+            <a:fillRect/>
+          </a:stretch>
+        </p:blipFill>
+        <p:spPr>
+          <a:xfrm>
+            <a:off x="0" y="0"/>
+            <a:ext cx="12192000" cy="1441450"/>
+          </a:xfrm>
+          <a:prstGeom prst="rect">
+            <a:avLst/>
+          </a:prstGeom>
+        </p:spPr>
+      </p:pic>
+      <p:sp>
+        <p:nvSpPr>
           <p:cNvPr id="2" name="Title 1">
             <a:extLst>
               <a:ext uri="{FF2B5EF4-FFF2-40B4-BE49-F238E27FC236}">
-                <a16:creationId xmlns:a16="http://schemas.microsoft.com/office/drawing/2014/main" id="{0A373FDB-51C1-D047-A9AB-0A34B3201FF9}"/>
+                <a16:creationId xmlns:a16="http://schemas.microsoft.com/office/drawing/2014/main" id="{46B0BF59-18F4-644D-B0C0-B97E8C40FFE3}"/>
               </a:ext>
             </a:extLst>
           </p:cNvPr>
@@ -8167,16 +8440,17 @@
         </p:nvSpPr>
         <p:spPr>
           <a:xfrm>
-            <a:off x="1958474" y="188036"/>
-            <a:ext cx="8567854" cy="1499326"/>
-          </a:xfrm>
-        </p:spPr>
-        <p:txBody>
-          <a:bodyPr>
+            <a:off x="685799" y="764373"/>
+            <a:ext cx="3977639" cy="1600200"/>
+          </a:xfrm>
+        </p:spPr>
+        <p:txBody>
+          <a:bodyPr anchor="b">
             <a:normAutofit/>
           </a:bodyPr>
           <a:lstStyle/>
           <a:p>
+            <a:pPr algn="l"/>
             <a:r>
               <a:rPr lang="en-US" dirty="0">
                 <a:solidFill>
@@ -8185,142 +8459,91 @@
               </a:rPr>
               <a:t>Spliterator</a:t>
             </a:r>
-            <a:br>
-              <a:rPr lang="en-US" dirty="0">
-                <a:solidFill>
-                  <a:srgbClr val="0D009F"/>
-                </a:solidFill>
-              </a:rPr>
-            </a:br>
-            <a:r>
-              <a:rPr lang="en-US" dirty="0">
-                <a:solidFill>
-                  <a:srgbClr val="FF32B4"/>
-                </a:solidFill>
-              </a:rPr>
-              <a:t>Continued</a:t>
+          </a:p>
+        </p:txBody>
+      </p:sp>
+      <p:sp>
+        <p:nvSpPr>
+          <p:cNvPr id="14" name="Content Placeholder 13"/>
+          <p:cNvSpPr>
+            <a:spLocks noGrp="1"/>
+          </p:cNvSpPr>
+          <p:nvPr>
+            <p:ph idx="1"/>
+          </p:nvPr>
+        </p:nvSpPr>
+        <p:spPr>
+          <a:xfrm>
+            <a:off x="685799" y="2462544"/>
+            <a:ext cx="4176133" cy="4105523"/>
+          </a:xfrm>
+        </p:spPr>
+        <p:txBody>
+          <a:bodyPr>
+            <a:normAutofit/>
+          </a:bodyPr>
+          <a:lstStyle/>
+          <a:p>
+            <a:r>
+              <a:rPr lang="en-US" sz="2400" dirty="0"/>
+              <a:t>”Split + iterator”- Used to traverse and split </a:t>
+            </a:r>
+            <a:r>
+              <a:rPr lang="en-US" sz="2400" dirty="0" err="1"/>
+              <a:t>substreams</a:t>
+            </a:r>
+            <a:endParaRPr lang="en-US" sz="2400" dirty="0"/>
+          </a:p>
+          <a:p>
+            <a:r>
+              <a:rPr lang="en-US" sz="2400" dirty="0"/>
+              <a:t>Traverses via </a:t>
+            </a:r>
+            <a:r>
+              <a:rPr lang="en-US" sz="2400" dirty="0" err="1"/>
+              <a:t>tryAdvance</a:t>
+            </a:r>
+            <a:r>
+              <a:rPr lang="en-US" sz="2400" dirty="0"/>
+              <a:t>() or </a:t>
+            </a:r>
+            <a:r>
+              <a:rPr lang="en-US" sz="2400" dirty="0" err="1"/>
+              <a:t>forEachRemaining</a:t>
+            </a:r>
+            <a:r>
+              <a:rPr lang="en-US" sz="2400" dirty="0"/>
+              <a:t>()</a:t>
+            </a:r>
+          </a:p>
+          <a:p>
+            <a:r>
+              <a:rPr lang="en-US" sz="2400" dirty="0"/>
+              <a:t>Can split itself into two spliterators via </a:t>
+            </a:r>
+            <a:r>
+              <a:rPr lang="en-US" sz="2400" dirty="0" err="1"/>
+              <a:t>trySplit</a:t>
+            </a:r>
+            <a:r>
+              <a:rPr lang="en-US" sz="2400" dirty="0"/>
+              <a:t>()</a:t>
+            </a:r>
+          </a:p>
+          <a:p>
+            <a:r>
+              <a:rPr lang="en-US" sz="2400" dirty="0"/>
+              <a:t>Contains same characteristics as a Stream</a:t>
             </a:r>
           </a:p>
         </p:txBody>
       </p:sp>
       <p:pic>
         <p:nvPicPr>
-          <p:cNvPr id="11" name="Picture 10">
+          <p:cNvPr id="5" name="Picture 4">
             <a:extLst>
               <a:ext uri="{FF2B5EF4-FFF2-40B4-BE49-F238E27FC236}">
-                <a16:creationId xmlns:a16="http://schemas.microsoft.com/office/drawing/2014/main" id="{90B5701D-AD11-7D4B-97D1-FEA00A9A5EA2}"/>
-              </a:ext>
-            </a:extLst>
-          </p:cNvPr>
-          <p:cNvPicPr>
-            <a:picLocks noChangeAspect="1"/>
-          </p:cNvPicPr>
-          <p:nvPr/>
-        </p:nvPicPr>
-        <p:blipFill rotWithShape="1">
-          <a:blip r:embed="rId2"/>
-          <a:srcRect r="8426"/>
-          <a:stretch/>
-        </p:blipFill>
-        <p:spPr>
-          <a:xfrm>
-            <a:off x="7747321" y="3393502"/>
-            <a:ext cx="4444679" cy="1697638"/>
-          </a:xfrm>
-          <a:prstGeom prst="rect">
-            <a:avLst/>
-          </a:prstGeom>
-        </p:spPr>
-      </p:pic>
-      <p:cxnSp>
-        <p:nvCxnSpPr>
-          <p:cNvPr id="13" name="Straight Arrow Connector 12">
-            <a:extLst>
-              <a:ext uri="{FF2B5EF4-FFF2-40B4-BE49-F238E27FC236}">
-                <a16:creationId xmlns:a16="http://schemas.microsoft.com/office/drawing/2014/main" id="{6551FB2B-6138-C544-8578-5D91186372E4}"/>
-              </a:ext>
-            </a:extLst>
-          </p:cNvPr>
-          <p:cNvCxnSpPr>
-            <a:cxnSpLocks/>
-          </p:cNvCxnSpPr>
-          <p:nvPr/>
-        </p:nvCxnSpPr>
-        <p:spPr>
-          <a:xfrm>
-            <a:off x="5529998" y="4317357"/>
-            <a:ext cx="2062994" cy="0"/>
-          </a:xfrm>
-          <a:prstGeom prst="straightConnector1">
-            <a:avLst/>
-          </a:prstGeom>
-          <a:ln>
-            <a:solidFill>
-              <a:srgbClr val="FF32B4"/>
-            </a:solidFill>
-            <a:tailEnd type="triangle"/>
-          </a:ln>
-        </p:spPr>
-        <p:style>
-          <a:lnRef idx="1">
-            <a:schemeClr val="accent1"/>
-          </a:lnRef>
-          <a:fillRef idx="0">
-            <a:schemeClr val="accent1"/>
-          </a:fillRef>
-          <a:effectRef idx="0">
-            <a:schemeClr val="accent1"/>
-          </a:effectRef>
-          <a:fontRef idx="minor">
-            <a:schemeClr val="tx1"/>
-          </a:fontRef>
-        </p:style>
-      </p:cxnSp>
-      <p:sp>
-        <p:nvSpPr>
-          <p:cNvPr id="20" name="TextBox 19">
-            <a:extLst>
-              <a:ext uri="{FF2B5EF4-FFF2-40B4-BE49-F238E27FC236}">
-                <a16:creationId xmlns:a16="http://schemas.microsoft.com/office/drawing/2014/main" id="{A977AE86-0FA3-8541-9725-F817B5920664}"/>
-              </a:ext>
-            </a:extLst>
-          </p:cNvPr>
-          <p:cNvSpPr txBox="1"/>
-          <p:nvPr/>
-        </p:nvSpPr>
-        <p:spPr>
-          <a:xfrm>
-            <a:off x="5924153" y="4490976"/>
-            <a:ext cx="1541518" cy="1200329"/>
-          </a:xfrm>
-          <a:prstGeom prst="rect">
-            <a:avLst/>
-          </a:prstGeom>
-          <a:noFill/>
-        </p:spPr>
-        <p:txBody>
-          <a:bodyPr wrap="square" rtlCol="0">
-            <a:spAutoFit/>
-          </a:bodyPr>
-          <a:lstStyle/>
-          <a:p>
-            <a:r>
-              <a:rPr lang="en-US" dirty="0">
-                <a:solidFill>
-                  <a:srgbClr val="FF32B4"/>
-                </a:solidFill>
-              </a:rPr>
-              <a:t>Run on random 10,000 String list</a:t>
-            </a:r>
-          </a:p>
-        </p:txBody>
-      </p:sp>
-      <p:pic>
-        <p:nvPicPr>
-          <p:cNvPr id="21" name="Picture 20">
-            <a:extLst>
-              <a:ext uri="{FF2B5EF4-FFF2-40B4-BE49-F238E27FC236}">
-                <a16:creationId xmlns:a16="http://schemas.microsoft.com/office/drawing/2014/main" id="{9BD695A8-68A6-D945-A775-EFA6067DEC3A}"/>
+                <a16:creationId xmlns:a16="http://schemas.microsoft.com/office/drawing/2014/main" id="{71214D31-3595-9142-9219-E88622627B22}"/>
               </a:ext>
             </a:extLst>
           </p:cNvPr>
@@ -8337,8 +8560,8 @@
         </p:blipFill>
         <p:spPr>
           <a:xfrm>
-            <a:off x="128634" y="1833064"/>
-            <a:ext cx="5247035" cy="4467355"/>
+            <a:off x="5158367" y="764372"/>
+            <a:ext cx="5892491" cy="5348569"/>
           </a:xfrm>
           <a:prstGeom prst="rect">
             <a:avLst/>
@@ -8348,7 +8571,7 @@
     </p:spTree>
     <p:extLst>
       <p:ext uri="{BB962C8B-B14F-4D97-AF65-F5344CB8AC3E}">
-        <p14:creationId xmlns:p14="http://schemas.microsoft.com/office/powerpoint/2010/main" val="2029637267"/>
+        <p14:creationId xmlns:p14="http://schemas.microsoft.com/office/powerpoint/2010/main" val="4009905473"/>
       </p:ext>
     </p:extLst>
   </p:cSld>
@@ -8686,12 +8909,341 @@
           </a:p>
         </p:txBody>
       </p:sp>
+      <p:sp>
+        <p:nvSpPr>
+          <p:cNvPr id="10" name="TextBox 9">
+            <a:extLst>
+              <a:ext uri="{FF2B5EF4-FFF2-40B4-BE49-F238E27FC236}">
+                <a16:creationId xmlns:a16="http://schemas.microsoft.com/office/drawing/2014/main" id="{80A4A8B0-AC2E-524A-B302-981FEC5D6C1D}"/>
+              </a:ext>
+            </a:extLst>
+          </p:cNvPr>
+          <p:cNvSpPr txBox="1"/>
+          <p:nvPr/>
+        </p:nvSpPr>
+        <p:spPr>
+          <a:xfrm>
+            <a:off x="7545688" y="5509288"/>
+            <a:ext cx="3897011" cy="369332"/>
+          </a:xfrm>
+          <a:prstGeom prst="rect">
+            <a:avLst/>
+          </a:prstGeom>
+          <a:noFill/>
+        </p:spPr>
+        <p:txBody>
+          <a:bodyPr wrap="square" rtlCol="0">
+            <a:spAutoFit/>
+          </a:bodyPr>
+          <a:lstStyle/>
+          <a:p>
+            <a:r>
+              <a:rPr lang="en-US" dirty="0">
+                <a:solidFill>
+                  <a:srgbClr val="FF32B4"/>
+                </a:solidFill>
+              </a:rPr>
+              <a:t>Run on 26,000 Employee array</a:t>
+            </a:r>
+          </a:p>
+        </p:txBody>
+      </p:sp>
+      <p:graphicFrame>
+        <p:nvGraphicFramePr>
+          <p:cNvPr id="6" name="Table 5">
+            <a:extLst>
+              <a:ext uri="{FF2B5EF4-FFF2-40B4-BE49-F238E27FC236}">
+                <a16:creationId xmlns:a16="http://schemas.microsoft.com/office/drawing/2014/main" id="{5AB3658A-2D77-2041-B090-7FC9EA7FEAC3}"/>
+              </a:ext>
+            </a:extLst>
+          </p:cNvPr>
+          <p:cNvGraphicFramePr>
+            <a:graphicFrameLocks noGrp="1"/>
+          </p:cNvGraphicFramePr>
+          <p:nvPr>
+            <p:extLst>
+              <p:ext uri="{D42A27DB-BD31-4B8C-83A1-F6EECF244321}">
+                <p14:modId xmlns:p14="http://schemas.microsoft.com/office/powerpoint/2010/main" val="1667512366"/>
+              </p:ext>
+            </p:extLst>
+          </p:nvPr>
+        </p:nvGraphicFramePr>
+        <p:xfrm>
+          <a:off x="6937174" y="2513935"/>
+          <a:ext cx="5013526" cy="2843926"/>
+        </p:xfrm>
+        <a:graphic>
+          <a:graphicData uri="http://schemas.openxmlformats.org/drawingml/2006/table">
+            <a:tbl>
+              <a:tblPr firstRow="1" bandRow="1">
+                <a:tableStyleId>{C4B1156A-380E-4F78-BDF5-A606A8083BF9}</a:tableStyleId>
+              </a:tblPr>
+              <a:tblGrid>
+                <a:gridCol w="2506763">
+                  <a:extLst>
+                    <a:ext uri="{9D8B030D-6E8A-4147-A177-3AD203B41FA5}">
+                      <a16:colId xmlns:a16="http://schemas.microsoft.com/office/drawing/2014/main" val="3333246323"/>
+                    </a:ext>
+                  </a:extLst>
+                </a:gridCol>
+                <a:gridCol w="2506763">
+                  <a:extLst>
+                    <a:ext uri="{9D8B030D-6E8A-4147-A177-3AD203B41FA5}">
+                      <a16:colId xmlns:a16="http://schemas.microsoft.com/office/drawing/2014/main" val="61095332"/>
+                    </a:ext>
+                  </a:extLst>
+                </a:gridCol>
+              </a:tblGrid>
+              <a:tr h="939278">
+                <a:tc>
+                  <a:txBody>
+                    <a:bodyPr/>
+                    <a:lstStyle/>
+                    <a:p>
+                      <a:pPr algn="ctr"/>
+                      <a:endParaRPr lang="en-US" b="0" dirty="0"/>
+                    </a:p>
+                    <a:p>
+                      <a:pPr algn="ctr"/>
+                      <a:r>
+                        <a:rPr lang="en-US" b="0" dirty="0"/>
+                        <a:t>Serial</a:t>
+                      </a:r>
+                    </a:p>
+                  </a:txBody>
+                  <a:tcPr/>
+                </a:tc>
+                <a:tc>
+                  <a:txBody>
+                    <a:bodyPr/>
+                    <a:lstStyle/>
+                    <a:p>
+                      <a:pPr algn="ctr"/>
+                      <a:endParaRPr lang="en-US" dirty="0"/>
+                    </a:p>
+                    <a:p>
+                      <a:pPr algn="ctr"/>
+                      <a:r>
+                        <a:rPr lang="en-US" b="0" dirty="0"/>
+                        <a:t>.853</a:t>
+                      </a:r>
+                      <a:r>
+                        <a:rPr lang="en-US" sz="1800" b="0" kern="1200" dirty="0">
+                          <a:solidFill>
+                            <a:schemeClr val="dk1"/>
+                          </a:solidFill>
+                          <a:effectLst/>
+                          <a:latin typeface="+mn-lt"/>
+                          <a:ea typeface="+mn-ea"/>
+                          <a:cs typeface="+mn-cs"/>
+                        </a:rPr>
+                        <a:t> </a:t>
+                      </a:r>
+                      <a:r>
+                        <a:rPr lang="en-US" sz="1800" b="0" kern="1200" dirty="0" err="1">
+                          <a:solidFill>
+                            <a:schemeClr val="dk1"/>
+                          </a:solidFill>
+                          <a:effectLst/>
+                          <a:latin typeface="+mn-lt"/>
+                          <a:ea typeface="+mn-ea"/>
+                          <a:cs typeface="+mn-cs"/>
+                        </a:rPr>
+                        <a:t>ms</a:t>
+                      </a:r>
+                      <a:r>
+                        <a:rPr lang="en-US" sz="1800" b="0" kern="1200" dirty="0">
+                          <a:solidFill>
+                            <a:schemeClr val="dk1"/>
+                          </a:solidFill>
+                          <a:effectLst/>
+                          <a:latin typeface="+mn-lt"/>
+                          <a:ea typeface="+mn-ea"/>
+                          <a:cs typeface="+mn-cs"/>
+                        </a:rPr>
+                        <a:t>/op</a:t>
+                      </a:r>
+                      <a:endParaRPr lang="en-US" b="0" dirty="0"/>
+                    </a:p>
+                  </a:txBody>
+                  <a:tcPr/>
+                </a:tc>
+                <a:extLst>
+                  <a:ext uri="{0D108BD9-81ED-4DB2-BD59-A6C34878D82A}">
+                    <a16:rowId xmlns:a16="http://schemas.microsoft.com/office/drawing/2014/main" val="578014337"/>
+                  </a:ext>
+                </a:extLst>
+              </a:tr>
+              <a:tr h="952324">
+                <a:tc>
+                  <a:txBody>
+                    <a:bodyPr/>
+                    <a:lstStyle/>
+                    <a:p>
+                      <a:pPr algn="ctr"/>
+                      <a:endParaRPr lang="en-US" dirty="0"/>
+                    </a:p>
+                    <a:p>
+                      <a:pPr algn="ctr"/>
+                      <a:r>
+                        <a:rPr lang="en-US" dirty="0"/>
+                        <a:t>Parallel</a:t>
+                      </a:r>
+                    </a:p>
+                  </a:txBody>
+                  <a:tcPr/>
+                </a:tc>
+                <a:tc>
+                  <a:txBody>
+                    <a:bodyPr/>
+                    <a:lstStyle/>
+                    <a:p>
+                      <a:pPr algn="ctr"/>
+                      <a:endParaRPr lang="en-US" dirty="0"/>
+                    </a:p>
+                    <a:p>
+                      <a:pPr algn="ctr"/>
+                      <a:r>
+                        <a:rPr lang="en-US" dirty="0"/>
+                        <a:t>.736</a:t>
+                      </a:r>
+                      <a:r>
+                        <a:rPr lang="en-US" sz="1800" b="0" kern="1200" dirty="0">
+                          <a:solidFill>
+                            <a:schemeClr val="dk1"/>
+                          </a:solidFill>
+                          <a:effectLst/>
+                          <a:latin typeface="+mn-lt"/>
+                          <a:ea typeface="+mn-ea"/>
+                          <a:cs typeface="+mn-cs"/>
+                        </a:rPr>
+                        <a:t> </a:t>
+                      </a:r>
+                      <a:r>
+                        <a:rPr lang="en-US" sz="1800" b="0" kern="1200" dirty="0" err="1">
+                          <a:solidFill>
+                            <a:schemeClr val="dk1"/>
+                          </a:solidFill>
+                          <a:effectLst/>
+                          <a:latin typeface="+mn-lt"/>
+                          <a:ea typeface="+mn-ea"/>
+                          <a:cs typeface="+mn-cs"/>
+                        </a:rPr>
+                        <a:t>ms</a:t>
+                      </a:r>
+                      <a:r>
+                        <a:rPr lang="en-US" sz="1800" b="0" kern="1200" dirty="0">
+                          <a:solidFill>
+                            <a:schemeClr val="dk1"/>
+                          </a:solidFill>
+                          <a:effectLst/>
+                          <a:latin typeface="+mn-lt"/>
+                          <a:ea typeface="+mn-ea"/>
+                          <a:cs typeface="+mn-cs"/>
+                        </a:rPr>
+                        <a:t>/op</a:t>
+                      </a:r>
+                      <a:endParaRPr lang="en-US" dirty="0"/>
+                    </a:p>
+                  </a:txBody>
+                  <a:tcPr/>
+                </a:tc>
+                <a:extLst>
+                  <a:ext uri="{0D108BD9-81ED-4DB2-BD59-A6C34878D82A}">
+                    <a16:rowId xmlns:a16="http://schemas.microsoft.com/office/drawing/2014/main" val="1816897253"/>
+                  </a:ext>
+                </a:extLst>
+              </a:tr>
+              <a:tr h="952324">
+                <a:tc>
+                  <a:txBody>
+                    <a:bodyPr/>
+                    <a:lstStyle/>
+                    <a:p>
+                      <a:pPr algn="ctr"/>
+                      <a:endParaRPr lang="en-US" dirty="0"/>
+                    </a:p>
+                    <a:p>
+                      <a:pPr algn="ctr"/>
+                      <a:r>
+                        <a:rPr lang="en-US" dirty="0"/>
+                        <a:t>Parallel, thread-safe</a:t>
+                      </a:r>
+                    </a:p>
+                  </a:txBody>
+                  <a:tcPr/>
+                </a:tc>
+                <a:tc>
+                  <a:txBody>
+                    <a:bodyPr/>
+                    <a:lstStyle/>
+                    <a:p>
+                      <a:pPr algn="ctr"/>
+                      <a:endParaRPr lang="en-US" dirty="0"/>
+                    </a:p>
+                    <a:p>
+                      <a:pPr algn="ctr"/>
+                      <a:r>
+                        <a:rPr lang="en-US" dirty="0"/>
+                        <a:t>2.533</a:t>
+                      </a:r>
+                      <a:r>
+                        <a:rPr lang="en-US" sz="1800" b="0" kern="1200" dirty="0">
+                          <a:solidFill>
+                            <a:schemeClr val="dk1"/>
+                          </a:solidFill>
+                          <a:effectLst/>
+                          <a:latin typeface="+mn-lt"/>
+                          <a:ea typeface="+mn-ea"/>
+                          <a:cs typeface="+mn-cs"/>
+                        </a:rPr>
+                        <a:t> </a:t>
+                      </a:r>
+                      <a:r>
+                        <a:rPr lang="en-US" sz="1800" b="0" kern="1200" dirty="0" err="1">
+                          <a:solidFill>
+                            <a:schemeClr val="dk1"/>
+                          </a:solidFill>
+                          <a:effectLst/>
+                          <a:latin typeface="+mn-lt"/>
+                          <a:ea typeface="+mn-ea"/>
+                          <a:cs typeface="+mn-cs"/>
+                        </a:rPr>
+                        <a:t>ms</a:t>
+                      </a:r>
+                      <a:r>
+                        <a:rPr lang="en-US" sz="1800" b="0" kern="1200" dirty="0">
+                          <a:solidFill>
+                            <a:schemeClr val="dk1"/>
+                          </a:solidFill>
+                          <a:effectLst/>
+                          <a:latin typeface="+mn-lt"/>
+                          <a:ea typeface="+mn-ea"/>
+                          <a:cs typeface="+mn-cs"/>
+                        </a:rPr>
+                        <a:t>/op</a:t>
+                      </a:r>
+                      <a:endParaRPr lang="en-US" dirty="0"/>
+                    </a:p>
+                  </a:txBody>
+                  <a:tcPr/>
+                </a:tc>
+                <a:extLst>
+                  <a:ext uri="{0D108BD9-81ED-4DB2-BD59-A6C34878D82A}">
+                    <a16:rowId xmlns:a16="http://schemas.microsoft.com/office/drawing/2014/main" val="1066664289"/>
+                  </a:ext>
+                </a:extLst>
+              </a:tr>
+            </a:tbl>
+          </a:graphicData>
+        </a:graphic>
+      </p:graphicFrame>
       <p:pic>
         <p:nvPicPr>
-          <p:cNvPr id="7" name="Picture 6">
+          <p:cNvPr id="14" name="Picture 13">
             <a:extLst>
               <a:ext uri="{FF2B5EF4-FFF2-40B4-BE49-F238E27FC236}">
-                <a16:creationId xmlns:a16="http://schemas.microsoft.com/office/drawing/2014/main" id="{B9EB1BE8-7B2F-274D-96C4-A41FF1D82B2E}"/>
+                <a16:creationId xmlns:a16="http://schemas.microsoft.com/office/drawing/2014/main" id="{80F336F8-3DD8-374F-9AF1-0A5CB7EAE495}"/>
               </a:ext>
             </a:extLst>
           </p:cNvPr>
@@ -8708,121 +9260,8 @@
         </p:blipFill>
         <p:spPr>
           <a:xfrm>
-            <a:off x="7137723" y="5600214"/>
-            <a:ext cx="4914900" cy="1066800"/>
-          </a:xfrm>
-          <a:prstGeom prst="rect">
-            <a:avLst/>
-          </a:prstGeom>
-        </p:spPr>
-      </p:pic>
-      <p:cxnSp>
-        <p:nvCxnSpPr>
-          <p:cNvPr id="9" name="Straight Arrow Connector 8">
-            <a:extLst>
-              <a:ext uri="{FF2B5EF4-FFF2-40B4-BE49-F238E27FC236}">
-                <a16:creationId xmlns:a16="http://schemas.microsoft.com/office/drawing/2014/main" id="{6980298C-C200-A84B-AAAA-2A314CDE113F}"/>
-              </a:ext>
-            </a:extLst>
-          </p:cNvPr>
-          <p:cNvCxnSpPr>
-            <a:cxnSpLocks/>
-          </p:cNvCxnSpPr>
-          <p:nvPr/>
-        </p:nvCxnSpPr>
-        <p:spPr>
-          <a:xfrm>
-            <a:off x="5515395" y="4487476"/>
-            <a:ext cx="1464139" cy="1112738"/>
-          </a:xfrm>
-          <a:prstGeom prst="straightConnector1">
-            <a:avLst/>
-          </a:prstGeom>
-          <a:ln>
-            <a:solidFill>
-              <a:srgbClr val="FF32B4"/>
-            </a:solidFill>
-            <a:tailEnd type="triangle"/>
-          </a:ln>
-        </p:spPr>
-        <p:style>
-          <a:lnRef idx="1">
-            <a:schemeClr val="accent1"/>
-          </a:lnRef>
-          <a:fillRef idx="0">
-            <a:schemeClr val="accent1"/>
-          </a:fillRef>
-          <a:effectRef idx="0">
-            <a:schemeClr val="accent1"/>
-          </a:effectRef>
-          <a:fontRef idx="minor">
-            <a:schemeClr val="tx1"/>
-          </a:fontRef>
-        </p:style>
-      </p:cxnSp>
-      <p:sp>
-        <p:nvSpPr>
-          <p:cNvPr id="10" name="TextBox 9">
-            <a:extLst>
-              <a:ext uri="{FF2B5EF4-FFF2-40B4-BE49-F238E27FC236}">
-                <a16:creationId xmlns:a16="http://schemas.microsoft.com/office/drawing/2014/main" id="{80A4A8B0-AC2E-524A-B302-981FEC5D6C1D}"/>
-              </a:ext>
-            </a:extLst>
-          </p:cNvPr>
-          <p:cNvSpPr txBox="1"/>
-          <p:nvPr/>
-        </p:nvSpPr>
-        <p:spPr>
-          <a:xfrm>
-            <a:off x="4566271" y="5235793"/>
-            <a:ext cx="1898248" cy="923330"/>
-          </a:xfrm>
-          <a:prstGeom prst="rect">
-            <a:avLst/>
-          </a:prstGeom>
-          <a:noFill/>
-        </p:spPr>
-        <p:txBody>
-          <a:bodyPr wrap="square" rtlCol="0">
-            <a:spAutoFit/>
-          </a:bodyPr>
-          <a:lstStyle/>
-          <a:p>
-            <a:r>
-              <a:rPr lang="en-US" dirty="0">
-                <a:solidFill>
-                  <a:srgbClr val="FF32B4"/>
-                </a:solidFill>
-              </a:rPr>
-              <a:t>Run on 26,000 Employee array</a:t>
-            </a:r>
-          </a:p>
-        </p:txBody>
-      </p:sp>
-      <p:pic>
-        <p:nvPicPr>
-          <p:cNvPr id="17" name="Picture 16">
-            <a:extLst>
-              <a:ext uri="{FF2B5EF4-FFF2-40B4-BE49-F238E27FC236}">
-                <a16:creationId xmlns:a16="http://schemas.microsoft.com/office/drawing/2014/main" id="{2817710E-7F87-D045-998A-2BA6696610A4}"/>
-              </a:ext>
-            </a:extLst>
-          </p:cNvPr>
-          <p:cNvPicPr>
-            <a:picLocks noChangeAspect="1"/>
-          </p:cNvPicPr>
-          <p:nvPr/>
-        </p:nvPicPr>
-        <p:blipFill>
-          <a:blip r:embed="rId3"/>
-          <a:stretch>
-            <a:fillRect/>
-          </a:stretch>
-        </p:blipFill>
-        <p:spPr>
-          <a:xfrm>
-            <a:off x="1497796" y="1368084"/>
-            <a:ext cx="5816600" cy="2921000"/>
+            <a:off x="236499" y="2245659"/>
+            <a:ext cx="5840916" cy="3263629"/>
           </a:xfrm>
           <a:prstGeom prst="rect">
             <a:avLst/>
@@ -8928,58 +9367,14 @@
         </p:blipFill>
         <p:spPr>
           <a:xfrm>
-            <a:off x="307613" y="2052746"/>
-            <a:ext cx="6234598" cy="2419190"/>
+            <a:off x="80915" y="2759154"/>
+            <a:ext cx="7290340" cy="2828846"/>
           </a:xfrm>
           <a:prstGeom prst="rect">
             <a:avLst/>
           </a:prstGeom>
         </p:spPr>
       </p:pic>
-      <p:cxnSp>
-        <p:nvCxnSpPr>
-          <p:cNvPr id="12" name="Straight Arrow Connector 11">
-            <a:extLst>
-              <a:ext uri="{FF2B5EF4-FFF2-40B4-BE49-F238E27FC236}">
-                <a16:creationId xmlns:a16="http://schemas.microsoft.com/office/drawing/2014/main" id="{4E263BCA-7BE5-0743-B8F1-2CA059021D2B}"/>
-              </a:ext>
-            </a:extLst>
-          </p:cNvPr>
-          <p:cNvCxnSpPr>
-            <a:cxnSpLocks/>
-          </p:cNvCxnSpPr>
-          <p:nvPr/>
-        </p:nvCxnSpPr>
-        <p:spPr>
-          <a:xfrm>
-            <a:off x="4127500" y="3987800"/>
-            <a:ext cx="2945114" cy="1361422"/>
-          </a:xfrm>
-          <a:prstGeom prst="straightConnector1">
-            <a:avLst/>
-          </a:prstGeom>
-          <a:ln>
-            <a:solidFill>
-              <a:srgbClr val="FF32B4"/>
-            </a:solidFill>
-            <a:tailEnd type="triangle"/>
-          </a:ln>
-        </p:spPr>
-        <p:style>
-          <a:lnRef idx="1">
-            <a:schemeClr val="accent1"/>
-          </a:lnRef>
-          <a:fillRef idx="0">
-            <a:schemeClr val="accent1"/>
-          </a:fillRef>
-          <a:effectRef idx="0">
-            <a:schemeClr val="accent1"/>
-          </a:effectRef>
-          <a:fontRef idx="minor">
-            <a:schemeClr val="tx1"/>
-          </a:fontRef>
-        </p:style>
-      </p:cxnSp>
       <p:sp>
         <p:nvSpPr>
           <p:cNvPr id="13" name="TextBox 12">
@@ -8994,8 +9389,8 @@
         </p:nvSpPr>
         <p:spPr>
           <a:xfrm>
-            <a:off x="5895077" y="3468182"/>
-            <a:ext cx="1541518" cy="1200329"/>
+            <a:off x="7773217" y="5349222"/>
+            <a:ext cx="4037958" cy="369332"/>
           </a:xfrm>
           <a:prstGeom prst="rect">
             <a:avLst/>
@@ -9019,35 +9414,294 @@
           </a:p>
         </p:txBody>
       </p:sp>
-      <p:pic>
-        <p:nvPicPr>
-          <p:cNvPr id="15" name="Picture 14">
+      <p:graphicFrame>
+        <p:nvGraphicFramePr>
+          <p:cNvPr id="20" name="Table 19">
             <a:extLst>
               <a:ext uri="{FF2B5EF4-FFF2-40B4-BE49-F238E27FC236}">
-                <a16:creationId xmlns:a16="http://schemas.microsoft.com/office/drawing/2014/main" id="{D78B3A98-7BAB-BB48-9F96-AE914B1D3954}"/>
+                <a16:creationId xmlns:a16="http://schemas.microsoft.com/office/drawing/2014/main" id="{FA69C902-644E-064D-989F-CDEE4586E958}"/>
               </a:ext>
             </a:extLst>
           </p:cNvPr>
-          <p:cNvPicPr>
-            <a:picLocks noChangeAspect="1"/>
-          </p:cNvPicPr>
-          <p:nvPr/>
-        </p:nvPicPr>
-        <p:blipFill rotWithShape="1">
-          <a:blip r:embed="rId4"/>
-          <a:srcRect t="6532"/>
-          <a:stretch/>
-        </p:blipFill>
-        <p:spPr>
-          <a:xfrm>
-            <a:off x="7282484" y="5397500"/>
-            <a:ext cx="4021367" cy="690784"/>
-          </a:xfrm>
-          <a:prstGeom prst="rect">
-            <a:avLst/>
-          </a:prstGeom>
-        </p:spPr>
-      </p:pic>
+          <p:cNvGraphicFramePr>
+            <a:graphicFrameLocks noGrp="1"/>
+          </p:cNvGraphicFramePr>
+          <p:nvPr>
+            <p:extLst>
+              <p:ext uri="{D42A27DB-BD31-4B8C-83A1-F6EECF244321}">
+                <p14:modId xmlns:p14="http://schemas.microsoft.com/office/powerpoint/2010/main" val="1164360295"/>
+              </p:ext>
+            </p:extLst>
+          </p:nvPr>
+        </p:nvGraphicFramePr>
+        <p:xfrm>
+          <a:off x="7572236" y="3008893"/>
+          <a:ext cx="4037958" cy="2340329"/>
+        </p:xfrm>
+        <a:graphic>
+          <a:graphicData uri="http://schemas.openxmlformats.org/drawingml/2006/table">
+            <a:tbl>
+              <a:tblPr firstRow="1" bandRow="1">
+                <a:tableStyleId>{C4B1156A-380E-4F78-BDF5-A606A8083BF9}</a:tableStyleId>
+              </a:tblPr>
+              <a:tblGrid>
+                <a:gridCol w="2018979">
+                  <a:extLst>
+                    <a:ext uri="{9D8B030D-6E8A-4147-A177-3AD203B41FA5}">
+                      <a16:colId xmlns:a16="http://schemas.microsoft.com/office/drawing/2014/main" val="3333246323"/>
+                    </a:ext>
+                  </a:extLst>
+                </a:gridCol>
+                <a:gridCol w="2018979">
+                  <a:extLst>
+                    <a:ext uri="{9D8B030D-6E8A-4147-A177-3AD203B41FA5}">
+                      <a16:colId xmlns:a16="http://schemas.microsoft.com/office/drawing/2014/main" val="61095332"/>
+                    </a:ext>
+                  </a:extLst>
+                </a:gridCol>
+              </a:tblGrid>
+              <a:tr h="1162094">
+                <a:tc>
+                  <a:txBody>
+                    <a:bodyPr/>
+                    <a:lstStyle/>
+                    <a:p>
+                      <a:pPr algn="ctr"/>
+                      <a:endParaRPr lang="en-US" b="0" dirty="0"/>
+                    </a:p>
+                    <a:p>
+                      <a:pPr algn="ctr"/>
+                      <a:r>
+                        <a:rPr lang="en-US" b="0" dirty="0"/>
+                        <a:t>Serial</a:t>
+                      </a:r>
+                    </a:p>
+                  </a:txBody>
+                  <a:tcPr/>
+                </a:tc>
+                <a:tc>
+                  <a:txBody>
+                    <a:bodyPr/>
+                    <a:lstStyle/>
+                    <a:p>
+                      <a:pPr marL="0" marR="0" lvl="0" indent="0" algn="ctr" defTabSz="914400" rtl="0" eaLnBrk="1" fontAlgn="auto" latinLnBrk="0" hangingPunct="1">
+                        <a:lnSpc>
+                          <a:spcPct val="100000"/>
+                        </a:lnSpc>
+                        <a:spcBef>
+                          <a:spcPts val="0"/>
+                        </a:spcBef>
+                        <a:spcAft>
+                          <a:spcPts val="0"/>
+                        </a:spcAft>
+                        <a:buClrTx/>
+                        <a:buSzTx/>
+                        <a:buFontTx/>
+                        <a:buNone/>
+                        <a:tabLst/>
+                        <a:defRPr/>
+                      </a:pPr>
+                      <a:endParaRPr lang="en-US" sz="1800" b="0" kern="1200" dirty="0">
+                        <a:solidFill>
+                          <a:schemeClr val="dk1"/>
+                        </a:solidFill>
+                        <a:effectLst/>
+                        <a:latin typeface="+mn-lt"/>
+                        <a:ea typeface="+mn-ea"/>
+                        <a:cs typeface="+mn-cs"/>
+                      </a:endParaRPr>
+                    </a:p>
+                    <a:p>
+                      <a:pPr marL="0" marR="0" lvl="0" indent="0" algn="ctr" defTabSz="914400" rtl="0" eaLnBrk="1" fontAlgn="auto" latinLnBrk="0" hangingPunct="1">
+                        <a:lnSpc>
+                          <a:spcPct val="100000"/>
+                        </a:lnSpc>
+                        <a:spcBef>
+                          <a:spcPts val="0"/>
+                        </a:spcBef>
+                        <a:spcAft>
+                          <a:spcPts val="0"/>
+                        </a:spcAft>
+                        <a:buClrTx/>
+                        <a:buSzTx/>
+                        <a:buFontTx/>
+                        <a:buNone/>
+                        <a:tabLst/>
+                        <a:defRPr/>
+                      </a:pPr>
+                      <a:r>
+                        <a:rPr lang="en-US" sz="1800" b="0" kern="1200" dirty="0">
+                          <a:solidFill>
+                            <a:schemeClr val="dk1"/>
+                          </a:solidFill>
+                          <a:effectLst/>
+                          <a:latin typeface="+mn-lt"/>
+                          <a:ea typeface="+mn-ea"/>
+                          <a:cs typeface="+mn-cs"/>
+                        </a:rPr>
+                        <a:t>3503.359 </a:t>
+                      </a:r>
+                      <a:r>
+                        <a:rPr lang="en-US" sz="1800" b="0" kern="1200" dirty="0" err="1">
+                          <a:solidFill>
+                            <a:schemeClr val="dk1"/>
+                          </a:solidFill>
+                          <a:effectLst/>
+                          <a:latin typeface="+mn-lt"/>
+                          <a:ea typeface="+mn-ea"/>
+                          <a:cs typeface="+mn-cs"/>
+                        </a:rPr>
+                        <a:t>ms</a:t>
+                      </a:r>
+                      <a:r>
+                        <a:rPr lang="en-US" sz="1800" b="0" kern="1200" dirty="0">
+                          <a:solidFill>
+                            <a:schemeClr val="dk1"/>
+                          </a:solidFill>
+                          <a:effectLst/>
+                          <a:latin typeface="+mn-lt"/>
+                          <a:ea typeface="+mn-ea"/>
+                          <a:cs typeface="+mn-cs"/>
+                        </a:rPr>
+                        <a:t>/op</a:t>
+                      </a:r>
+                    </a:p>
+                    <a:p>
+                      <a:pPr algn="ctr"/>
+                      <a:endParaRPr lang="en-US" dirty="0"/>
+                    </a:p>
+                  </a:txBody>
+                  <a:tcPr/>
+                </a:tc>
+                <a:extLst>
+                  <a:ext uri="{0D108BD9-81ED-4DB2-BD59-A6C34878D82A}">
+                    <a16:rowId xmlns:a16="http://schemas.microsoft.com/office/drawing/2014/main" val="578014337"/>
+                  </a:ext>
+                </a:extLst>
+              </a:tr>
+              <a:tr h="1178235">
+                <a:tc>
+                  <a:txBody>
+                    <a:bodyPr/>
+                    <a:lstStyle/>
+                    <a:p>
+                      <a:pPr algn="ctr"/>
+                      <a:endParaRPr lang="en-US" dirty="0"/>
+                    </a:p>
+                    <a:p>
+                      <a:pPr algn="ctr"/>
+                      <a:r>
+                        <a:rPr lang="en-US" dirty="0"/>
+                        <a:t>Parallel</a:t>
+                      </a:r>
+                    </a:p>
+                  </a:txBody>
+                  <a:tcPr/>
+                </a:tc>
+                <a:tc>
+                  <a:txBody>
+                    <a:bodyPr/>
+                    <a:lstStyle/>
+                    <a:p>
+                      <a:pPr marL="0" marR="0" lvl="0" indent="0" algn="ctr" defTabSz="914400" rtl="0" eaLnBrk="1" fontAlgn="auto" latinLnBrk="0" hangingPunct="1">
+                        <a:lnSpc>
+                          <a:spcPct val="100000"/>
+                        </a:lnSpc>
+                        <a:spcBef>
+                          <a:spcPts val="0"/>
+                        </a:spcBef>
+                        <a:spcAft>
+                          <a:spcPts val="0"/>
+                        </a:spcAft>
+                        <a:buClrTx/>
+                        <a:buSzTx/>
+                        <a:buFontTx/>
+                        <a:buNone/>
+                        <a:tabLst/>
+                        <a:defRPr/>
+                      </a:pPr>
+                      <a:endParaRPr lang="en-US" sz="1800" kern="1200" dirty="0">
+                        <a:solidFill>
+                          <a:schemeClr val="dk1"/>
+                        </a:solidFill>
+                        <a:effectLst/>
+                        <a:latin typeface="+mn-lt"/>
+                        <a:ea typeface="+mn-ea"/>
+                        <a:cs typeface="+mn-cs"/>
+                      </a:endParaRPr>
+                    </a:p>
+                    <a:p>
+                      <a:pPr marL="0" marR="0" lvl="0" indent="0" algn="ctr" defTabSz="914400" rtl="0" eaLnBrk="1" fontAlgn="auto" latinLnBrk="0" hangingPunct="1">
+                        <a:lnSpc>
+                          <a:spcPct val="100000"/>
+                        </a:lnSpc>
+                        <a:spcBef>
+                          <a:spcPts val="0"/>
+                        </a:spcBef>
+                        <a:spcAft>
+                          <a:spcPts val="0"/>
+                        </a:spcAft>
+                        <a:buClrTx/>
+                        <a:buSzTx/>
+                        <a:buFontTx/>
+                        <a:buNone/>
+                        <a:tabLst/>
+                        <a:defRPr/>
+                      </a:pPr>
+                      <a:r>
+                        <a:rPr lang="en-US" sz="1800" kern="1200" dirty="0">
+                          <a:solidFill>
+                            <a:schemeClr val="dk1"/>
+                          </a:solidFill>
+                          <a:effectLst/>
+                          <a:latin typeface="+mn-lt"/>
+                          <a:ea typeface="+mn-ea"/>
+                          <a:cs typeface="+mn-cs"/>
+                        </a:rPr>
+                        <a:t>3502.663 </a:t>
+                      </a:r>
+                      <a:r>
+                        <a:rPr lang="en-US" sz="1800" kern="1200" dirty="0" err="1">
+                          <a:solidFill>
+                            <a:schemeClr val="dk1"/>
+                          </a:solidFill>
+                          <a:effectLst/>
+                          <a:latin typeface="+mn-lt"/>
+                          <a:ea typeface="+mn-ea"/>
+                          <a:cs typeface="+mn-cs"/>
+                        </a:rPr>
+                        <a:t>ms</a:t>
+                      </a:r>
+                      <a:r>
+                        <a:rPr lang="en-US" sz="1800" kern="1200" dirty="0">
+                          <a:solidFill>
+                            <a:schemeClr val="dk1"/>
+                          </a:solidFill>
+                          <a:effectLst/>
+                          <a:latin typeface="+mn-lt"/>
+                          <a:ea typeface="+mn-ea"/>
+                          <a:cs typeface="+mn-cs"/>
+                        </a:rPr>
+                        <a:t>/op</a:t>
+                      </a:r>
+                    </a:p>
+                    <a:p>
+                      <a:pPr algn="ctr"/>
+                      <a:endParaRPr lang="en-US" dirty="0"/>
+                    </a:p>
+                  </a:txBody>
+                  <a:tcPr/>
+                </a:tc>
+                <a:extLst>
+                  <a:ext uri="{0D108BD9-81ED-4DB2-BD59-A6C34878D82A}">
+                    <a16:rowId xmlns:a16="http://schemas.microsoft.com/office/drawing/2014/main" val="1816897253"/>
+                  </a:ext>
+                </a:extLst>
+              </a:tr>
+            </a:tbl>
+          </a:graphicData>
+        </a:graphic>
+      </p:graphicFrame>
     </p:spTree>
     <p:extLst>
       <p:ext uri="{BB962C8B-B14F-4D97-AF65-F5344CB8AC3E}">

</xml_diff>